<commit_message>
Costfunction 2 + pp 2 deel
</commit_message>
<xml_diff>
--- a/verslaglegging en presentaties/Powerpont 1.pptx
+++ b/verslaglegging en presentaties/Powerpont 1.pptx
@@ -9,13 +9,15 @@
     <p:sldId id="257" r:id="rId3"/>
     <p:sldId id="260" r:id="rId4"/>
     <p:sldId id="258" r:id="rId5"/>
-    <p:sldId id="261" r:id="rId6"/>
-    <p:sldId id="262" r:id="rId7"/>
-    <p:sldId id="268" r:id="rId8"/>
-    <p:sldId id="264" r:id="rId9"/>
-    <p:sldId id="265" r:id="rId10"/>
-    <p:sldId id="267" r:id="rId11"/>
+    <p:sldId id="262" r:id="rId6"/>
+    <p:sldId id="269" r:id="rId7"/>
+    <p:sldId id="272" r:id="rId8"/>
+    <p:sldId id="274" r:id="rId9"/>
+    <p:sldId id="275" r:id="rId10"/>
+    <p:sldId id="271" r:id="rId11"/>
     <p:sldId id="263" r:id="rId12"/>
+    <p:sldId id="270" r:id="rId13"/>
+    <p:sldId id="264" r:id="rId14"/>
   </p:sldIdLst>
   <p:sldSz cx="12192000" cy="6858000"/>
   <p:notesSz cx="6858000" cy="9144000"/>
@@ -253,7 +255,7 @@
           <a:p>
             <a:fld id="{F2B6AC3F-E101-4B39-86B2-43B73117F4A4}" type="datetimeFigureOut">
               <a:rPr lang="nl-NL" smtClean="0"/>
-              <a:t>2-5-2017</a:t>
+              <a:t>17-5-2017</a:t>
             </a:fld>
             <a:endParaRPr lang="nl-NL"/>
           </a:p>
@@ -295,7 +297,7 @@
           <a:p>
             <a:fld id="{7FF7895B-90F1-4A08-8B09-7A24A444AEF5}" type="slidenum">
               <a:rPr lang="nl-NL" smtClean="0"/>
-              <a:t>‹#›</a:t>
+              <a:t>‹nr.›</a:t>
             </a:fld>
             <a:endParaRPr lang="nl-NL"/>
           </a:p>
@@ -423,7 +425,7 @@
           <a:p>
             <a:fld id="{F2B6AC3F-E101-4B39-86B2-43B73117F4A4}" type="datetimeFigureOut">
               <a:rPr lang="nl-NL" smtClean="0"/>
-              <a:t>2-5-2017</a:t>
+              <a:t>17-5-2017</a:t>
             </a:fld>
             <a:endParaRPr lang="nl-NL"/>
           </a:p>
@@ -465,7 +467,7 @@
           <a:p>
             <a:fld id="{7FF7895B-90F1-4A08-8B09-7A24A444AEF5}" type="slidenum">
               <a:rPr lang="nl-NL" smtClean="0"/>
-              <a:t>‹#›</a:t>
+              <a:t>‹nr.›</a:t>
             </a:fld>
             <a:endParaRPr lang="nl-NL"/>
           </a:p>
@@ -603,7 +605,7 @@
           <a:p>
             <a:fld id="{F2B6AC3F-E101-4B39-86B2-43B73117F4A4}" type="datetimeFigureOut">
               <a:rPr lang="nl-NL" smtClean="0"/>
-              <a:t>2-5-2017</a:t>
+              <a:t>17-5-2017</a:t>
             </a:fld>
             <a:endParaRPr lang="nl-NL"/>
           </a:p>
@@ -645,7 +647,7 @@
           <a:p>
             <a:fld id="{7FF7895B-90F1-4A08-8B09-7A24A444AEF5}" type="slidenum">
               <a:rPr lang="nl-NL" smtClean="0"/>
-              <a:t>‹#›</a:t>
+              <a:t>‹nr.›</a:t>
             </a:fld>
             <a:endParaRPr lang="nl-NL"/>
           </a:p>
@@ -773,7 +775,7 @@
           <a:p>
             <a:fld id="{F2B6AC3F-E101-4B39-86B2-43B73117F4A4}" type="datetimeFigureOut">
               <a:rPr lang="nl-NL" smtClean="0"/>
-              <a:t>2-5-2017</a:t>
+              <a:t>17-5-2017</a:t>
             </a:fld>
             <a:endParaRPr lang="nl-NL"/>
           </a:p>
@@ -815,7 +817,7 @@
           <a:p>
             <a:fld id="{7FF7895B-90F1-4A08-8B09-7A24A444AEF5}" type="slidenum">
               <a:rPr lang="nl-NL" smtClean="0"/>
-              <a:t>‹#›</a:t>
+              <a:t>‹nr.›</a:t>
             </a:fld>
             <a:endParaRPr lang="nl-NL"/>
           </a:p>
@@ -1019,7 +1021,7 @@
           <a:p>
             <a:fld id="{F2B6AC3F-E101-4B39-86B2-43B73117F4A4}" type="datetimeFigureOut">
               <a:rPr lang="nl-NL" smtClean="0"/>
-              <a:t>2-5-2017</a:t>
+              <a:t>17-5-2017</a:t>
             </a:fld>
             <a:endParaRPr lang="nl-NL"/>
           </a:p>
@@ -1061,7 +1063,7 @@
           <a:p>
             <a:fld id="{7FF7895B-90F1-4A08-8B09-7A24A444AEF5}" type="slidenum">
               <a:rPr lang="nl-NL" smtClean="0"/>
-              <a:t>‹#›</a:t>
+              <a:t>‹nr.›</a:t>
             </a:fld>
             <a:endParaRPr lang="nl-NL"/>
           </a:p>
@@ -1251,7 +1253,7 @@
           <a:p>
             <a:fld id="{F2B6AC3F-E101-4B39-86B2-43B73117F4A4}" type="datetimeFigureOut">
               <a:rPr lang="nl-NL" smtClean="0"/>
-              <a:t>2-5-2017</a:t>
+              <a:t>17-5-2017</a:t>
             </a:fld>
             <a:endParaRPr lang="nl-NL"/>
           </a:p>
@@ -1293,7 +1295,7 @@
           <a:p>
             <a:fld id="{7FF7895B-90F1-4A08-8B09-7A24A444AEF5}" type="slidenum">
               <a:rPr lang="nl-NL" smtClean="0"/>
-              <a:t>‹#›</a:t>
+              <a:t>‹nr.›</a:t>
             </a:fld>
             <a:endParaRPr lang="nl-NL"/>
           </a:p>
@@ -1618,7 +1620,7 @@
           <a:p>
             <a:fld id="{F2B6AC3F-E101-4B39-86B2-43B73117F4A4}" type="datetimeFigureOut">
               <a:rPr lang="nl-NL" smtClean="0"/>
-              <a:t>2-5-2017</a:t>
+              <a:t>17-5-2017</a:t>
             </a:fld>
             <a:endParaRPr lang="nl-NL"/>
           </a:p>
@@ -1660,7 +1662,7 @@
           <a:p>
             <a:fld id="{7FF7895B-90F1-4A08-8B09-7A24A444AEF5}" type="slidenum">
               <a:rPr lang="nl-NL" smtClean="0"/>
-              <a:t>‹#›</a:t>
+              <a:t>‹nr.›</a:t>
             </a:fld>
             <a:endParaRPr lang="nl-NL"/>
           </a:p>
@@ -1736,7 +1738,7 @@
           <a:p>
             <a:fld id="{F2B6AC3F-E101-4B39-86B2-43B73117F4A4}" type="datetimeFigureOut">
               <a:rPr lang="nl-NL" smtClean="0"/>
-              <a:t>2-5-2017</a:t>
+              <a:t>17-5-2017</a:t>
             </a:fld>
             <a:endParaRPr lang="nl-NL"/>
           </a:p>
@@ -1778,7 +1780,7 @@
           <a:p>
             <a:fld id="{7FF7895B-90F1-4A08-8B09-7A24A444AEF5}" type="slidenum">
               <a:rPr lang="nl-NL" smtClean="0"/>
-              <a:t>‹#›</a:t>
+              <a:t>‹nr.›</a:t>
             </a:fld>
             <a:endParaRPr lang="nl-NL"/>
           </a:p>
@@ -1831,7 +1833,7 @@
           <a:p>
             <a:fld id="{F2B6AC3F-E101-4B39-86B2-43B73117F4A4}" type="datetimeFigureOut">
               <a:rPr lang="nl-NL" smtClean="0"/>
-              <a:t>2-5-2017</a:t>
+              <a:t>17-5-2017</a:t>
             </a:fld>
             <a:endParaRPr lang="nl-NL"/>
           </a:p>
@@ -1873,7 +1875,7 @@
           <a:p>
             <a:fld id="{7FF7895B-90F1-4A08-8B09-7A24A444AEF5}" type="slidenum">
               <a:rPr lang="nl-NL" smtClean="0"/>
-              <a:t>‹#›</a:t>
+              <a:t>‹nr.›</a:t>
             </a:fld>
             <a:endParaRPr lang="nl-NL"/>
           </a:p>
@@ -2108,7 +2110,7 @@
           <a:p>
             <a:fld id="{F2B6AC3F-E101-4B39-86B2-43B73117F4A4}" type="datetimeFigureOut">
               <a:rPr lang="nl-NL" smtClean="0"/>
-              <a:t>2-5-2017</a:t>
+              <a:t>17-5-2017</a:t>
             </a:fld>
             <a:endParaRPr lang="nl-NL"/>
           </a:p>
@@ -2150,7 +2152,7 @@
           <a:p>
             <a:fld id="{7FF7895B-90F1-4A08-8B09-7A24A444AEF5}" type="slidenum">
               <a:rPr lang="nl-NL" smtClean="0"/>
-              <a:t>‹#›</a:t>
+              <a:t>‹nr.›</a:t>
             </a:fld>
             <a:endParaRPr lang="nl-NL"/>
           </a:p>
@@ -2361,7 +2363,7 @@
           <a:p>
             <a:fld id="{F2B6AC3F-E101-4B39-86B2-43B73117F4A4}" type="datetimeFigureOut">
               <a:rPr lang="nl-NL" smtClean="0"/>
-              <a:t>2-5-2017</a:t>
+              <a:t>17-5-2017</a:t>
             </a:fld>
             <a:endParaRPr lang="nl-NL"/>
           </a:p>
@@ -2403,7 +2405,7 @@
           <a:p>
             <a:fld id="{7FF7895B-90F1-4A08-8B09-7A24A444AEF5}" type="slidenum">
               <a:rPr lang="nl-NL" smtClean="0"/>
-              <a:t>‹#›</a:t>
+              <a:t>‹nr.›</a:t>
             </a:fld>
             <a:endParaRPr lang="nl-NL"/>
           </a:p>
@@ -2574,7 +2576,7 @@
           <a:p>
             <a:fld id="{F2B6AC3F-E101-4B39-86B2-43B73117F4A4}" type="datetimeFigureOut">
               <a:rPr lang="nl-NL" smtClean="0"/>
-              <a:t>2-5-2017</a:t>
+              <a:t>17-5-2017</a:t>
             </a:fld>
             <a:endParaRPr lang="nl-NL"/>
           </a:p>
@@ -2652,7 +2654,7 @@
           <a:p>
             <a:fld id="{7FF7895B-90F1-4A08-8B09-7A24A444AEF5}" type="slidenum">
               <a:rPr lang="nl-NL" smtClean="0"/>
-              <a:t>‹#›</a:t>
+              <a:t>‹nr.›</a:t>
             </a:fld>
             <a:endParaRPr lang="nl-NL"/>
           </a:p>
@@ -3254,23 +3256,13 @@
           <a:bodyPr/>
           <a:lstStyle/>
           <a:p>
-            <a:r>
-              <a:rPr lang="nl-NL" dirty="0" smtClean="0">
-                <a:latin typeface="Times New Roman" panose="02020603050405020304" pitchFamily="18" charset="0"/>
-                <a:cs typeface="Times New Roman" panose="02020603050405020304" pitchFamily="18" charset="0"/>
-              </a:rPr>
-              <a:t>OPLOSSING</a:t>
-            </a:r>
-            <a:endParaRPr lang="nl-NL" dirty="0">
-              <a:latin typeface="Times New Roman" panose="02020603050405020304" pitchFamily="18" charset="0"/>
-              <a:cs typeface="Times New Roman" panose="02020603050405020304" pitchFamily="18" charset="0"/>
-            </a:endParaRPr>
-          </a:p>
-        </p:txBody>
-      </p:sp>
-      <p:sp>
-        <p:nvSpPr>
-          <p:cNvPr id="5" name="Tijdelijke aanduiding voor inhoud 4"/>
+            <a:endParaRPr lang="nl-NL"/>
+          </a:p>
+        </p:txBody>
+      </p:sp>
+      <p:sp>
+        <p:nvSpPr>
+          <p:cNvPr id="3" name="Tijdelijke aanduiding voor inhoud 2"/>
           <p:cNvSpPr>
             <a:spLocks noGrp="1"/>
           </p:cNvSpPr>
@@ -3280,136 +3272,17 @@
         </p:nvSpPr>
         <p:spPr/>
         <p:txBody>
-          <a:bodyPr>
-            <a:normAutofit/>
-          </a:bodyPr>
+          <a:bodyPr/>
           <a:lstStyle/>
           <a:p>
-            <a:r>
-              <a:rPr lang="nl-NL" dirty="0" err="1" smtClean="0">
-                <a:latin typeface="Times New Roman" panose="02020603050405020304" pitchFamily="18" charset="0"/>
-                <a:cs typeface="Times New Roman" panose="02020603050405020304" pitchFamily="18" charset="0"/>
-              </a:rPr>
-              <a:t>Breadth</a:t>
-            </a:r>
-            <a:r>
-              <a:rPr lang="nl-NL" dirty="0" smtClean="0">
-                <a:latin typeface="Times New Roman" panose="02020603050405020304" pitchFamily="18" charset="0"/>
-                <a:cs typeface="Times New Roman" panose="02020603050405020304" pitchFamily="18" charset="0"/>
-              </a:rPr>
-              <a:t>-first algoritme met als beste oplossing een zo laag mogelijke </a:t>
-            </a:r>
-            <a:r>
-              <a:rPr lang="nl-NL" b="1" dirty="0" smtClean="0">
-                <a:latin typeface="Times New Roman" panose="02020603050405020304" pitchFamily="18" charset="0"/>
-                <a:cs typeface="Times New Roman" panose="02020603050405020304" pitchFamily="18" charset="0"/>
-              </a:rPr>
-              <a:t>totale aantal </a:t>
-            </a:r>
-            <a:r>
-              <a:rPr lang="nl-NL" b="1" dirty="0" err="1" smtClean="0">
-                <a:latin typeface="Times New Roman" panose="02020603050405020304" pitchFamily="18" charset="0"/>
-                <a:cs typeface="Times New Roman" panose="02020603050405020304" pitchFamily="18" charset="0"/>
-              </a:rPr>
-              <a:t>flips</a:t>
-            </a:r>
-            <a:r>
-              <a:rPr lang="nl-NL" dirty="0" smtClean="0">
-                <a:latin typeface="Times New Roman" panose="02020603050405020304" pitchFamily="18" charset="0"/>
-                <a:cs typeface="Times New Roman" panose="02020603050405020304" pitchFamily="18" charset="0"/>
-              </a:rPr>
-              <a:t> of een zo laag mogelijke </a:t>
-            </a:r>
-            <a:r>
-              <a:rPr lang="nl-NL" b="1" dirty="0" smtClean="0">
-                <a:latin typeface="Times New Roman" panose="02020603050405020304" pitchFamily="18" charset="0"/>
-                <a:cs typeface="Times New Roman" panose="02020603050405020304" pitchFamily="18" charset="0"/>
-              </a:rPr>
-              <a:t>mutatiepunt-score</a:t>
-            </a:r>
-            <a:r>
-              <a:rPr lang="nl-NL" dirty="0" smtClean="0">
-                <a:latin typeface="Times New Roman" panose="02020603050405020304" pitchFamily="18" charset="0"/>
-                <a:cs typeface="Times New Roman" panose="02020603050405020304" pitchFamily="18" charset="0"/>
-              </a:rPr>
-              <a:t>.</a:t>
-            </a:r>
-          </a:p>
-          <a:p>
-            <a:pPr marL="457200" lvl="1" indent="0">
-              <a:buNone/>
-            </a:pPr>
-            <a:r>
-              <a:rPr lang="nl-NL" sz="2000" dirty="0" smtClean="0">
-                <a:latin typeface="Times New Roman" panose="02020603050405020304" pitchFamily="18" charset="0"/>
-                <a:cs typeface="Times New Roman" panose="02020603050405020304" pitchFamily="18" charset="0"/>
-              </a:rPr>
-              <a:t>maar geheugenproblemen bij lange sequenties, eerst proberen met kortere en dan </a:t>
-            </a:r>
-            <a:r>
-              <a:rPr lang="nl-NL" sz="2000" i="1" dirty="0" smtClean="0">
-                <a:latin typeface="Times New Roman" panose="02020603050405020304" pitchFamily="18" charset="0"/>
-                <a:cs typeface="Times New Roman" panose="02020603050405020304" pitchFamily="18" charset="0"/>
-              </a:rPr>
-              <a:t>slimme</a:t>
-            </a:r>
-            <a:r>
-              <a:rPr lang="nl-NL" sz="2000" dirty="0" smtClean="0">
-                <a:latin typeface="Times New Roman" panose="02020603050405020304" pitchFamily="18" charset="0"/>
-                <a:cs typeface="Times New Roman" panose="02020603050405020304" pitchFamily="18" charset="0"/>
-              </a:rPr>
-              <a:t> heuristieken:</a:t>
-            </a:r>
-          </a:p>
-          <a:p>
-            <a:endParaRPr lang="nl-NL" dirty="0">
-              <a:latin typeface="Times New Roman" panose="02020603050405020304" pitchFamily="18" charset="0"/>
-              <a:cs typeface="Times New Roman" panose="02020603050405020304" pitchFamily="18" charset="0"/>
-            </a:endParaRPr>
-          </a:p>
-          <a:p>
-            <a:r>
-              <a:rPr lang="nl-NL" b="1" dirty="0" err="1" smtClean="0">
-                <a:latin typeface="Times New Roman" panose="02020603050405020304" pitchFamily="18" charset="0"/>
-                <a:cs typeface="Times New Roman" panose="02020603050405020304" pitchFamily="18" charset="0"/>
-              </a:rPr>
-              <a:t>Pruning</a:t>
-            </a:r>
-            <a:endParaRPr lang="nl-NL" b="1" dirty="0" smtClean="0">
-              <a:latin typeface="Times New Roman" panose="02020603050405020304" pitchFamily="18" charset="0"/>
-              <a:cs typeface="Times New Roman" panose="02020603050405020304" pitchFamily="18" charset="0"/>
-            </a:endParaRPr>
-          </a:p>
-          <a:p>
-            <a:endParaRPr lang="nl-NL" b="1" dirty="0">
-              <a:latin typeface="Times New Roman" panose="02020603050405020304" pitchFamily="18" charset="0"/>
-              <a:cs typeface="Times New Roman" panose="02020603050405020304" pitchFamily="18" charset="0"/>
-            </a:endParaRPr>
-          </a:p>
-          <a:p>
-            <a:r>
-              <a:rPr lang="nl-NL" b="1" dirty="0" smtClean="0">
-                <a:latin typeface="Times New Roman" panose="02020603050405020304" pitchFamily="18" charset="0"/>
-                <a:cs typeface="Times New Roman" panose="02020603050405020304" pitchFamily="18" charset="0"/>
-              </a:rPr>
-              <a:t>Archief</a:t>
-            </a:r>
-          </a:p>
-          <a:p>
-            <a:pPr marL="0" indent="0">
-              <a:buNone/>
-            </a:pPr>
-            <a:endParaRPr lang="nl-NL" dirty="0">
-              <a:latin typeface="Times New Roman" panose="02020603050405020304" pitchFamily="18" charset="0"/>
-              <a:cs typeface="Times New Roman" panose="02020603050405020304" pitchFamily="18" charset="0"/>
-            </a:endParaRPr>
+            <a:endParaRPr lang="nl-NL"/>
           </a:p>
         </p:txBody>
       </p:sp>
     </p:spTree>
     <p:extLst>
       <p:ext uri="{BB962C8B-B14F-4D97-AF65-F5344CB8AC3E}">
-        <p14:creationId xmlns:p14="http://schemas.microsoft.com/office/powerpoint/2010/main" val="1462278851"/>
+        <p14:creationId xmlns:p14="http://schemas.microsoft.com/office/powerpoint/2010/main" val="2299815648"/>
       </p:ext>
     </p:extLst>
   </p:cSld>
@@ -3463,7 +3336,7 @@
                 <a:latin typeface="Times New Roman" panose="02020603050405020304" pitchFamily="18" charset="0"/>
                 <a:cs typeface="Times New Roman" panose="02020603050405020304" pitchFamily="18" charset="0"/>
               </a:rPr>
-              <a:t>Einde</a:t>
+              <a:t>EINDE……</a:t>
             </a:r>
             <a:endParaRPr lang="nl-NL" dirty="0">
               <a:latin typeface="Times New Roman" panose="02020603050405020304" pitchFamily="18" charset="0"/>
@@ -3532,18 +3405,660 @@
         </p:blipFill>
         <p:spPr>
           <a:xfrm>
-            <a:off x="4244197" y="1246105"/>
+            <a:off x="4472797" y="923375"/>
             <a:ext cx="7868458" cy="5503152"/>
           </a:xfrm>
           <a:prstGeom prst="rect">
             <a:avLst/>
           </a:prstGeom>
+        </p:spPr>
+      </p:pic>
+      <p:sp>
+        <p:nvSpPr>
+          <p:cNvPr id="5" name="Tekstvak 4"/>
+          <p:cNvSpPr txBox="1"/>
+          <p:nvPr/>
+        </p:nvSpPr>
+        <p:spPr>
+          <a:xfrm>
+            <a:off x="9326204" y="5988734"/>
+            <a:ext cx="2407024" cy="646331"/>
+          </a:xfrm>
+          <a:prstGeom prst="rect">
+            <a:avLst/>
+          </a:prstGeom>
+          <a:noFill/>
+        </p:spPr>
+        <p:txBody>
+          <a:bodyPr wrap="square" rtlCol="0">
+            <a:spAutoFit/>
+          </a:bodyPr>
+          <a:lstStyle/>
+          <a:p>
+            <a:pPr algn="just"/>
+            <a:r>
+              <a:rPr lang="nl-NL" dirty="0" smtClean="0">
+                <a:solidFill>
+                  <a:schemeClr val="bg1">
+                    <a:lumMod val="65000"/>
+                  </a:schemeClr>
+                </a:solidFill>
+                <a:latin typeface="Times New Roman" panose="02020603050405020304" pitchFamily="18" charset="0"/>
+                <a:cs typeface="Times New Roman" panose="02020603050405020304" pitchFamily="18" charset="0"/>
+              </a:rPr>
+              <a:t>de Aziatische fruitvlieg  </a:t>
+            </a:r>
+            <a:r>
+              <a:rPr lang="nl-NL" i="1" dirty="0" err="1" smtClean="0">
+                <a:latin typeface="Times New Roman" panose="02020603050405020304" pitchFamily="18" charset="0"/>
+                <a:cs typeface="Times New Roman" panose="02020603050405020304" pitchFamily="18" charset="0"/>
+              </a:rPr>
+              <a:t>Bactrocera</a:t>
+            </a:r>
+            <a:r>
+              <a:rPr lang="nl-NL" i="1" dirty="0" smtClean="0">
+                <a:latin typeface="Times New Roman" panose="02020603050405020304" pitchFamily="18" charset="0"/>
+                <a:cs typeface="Times New Roman" panose="02020603050405020304" pitchFamily="18" charset="0"/>
+              </a:rPr>
+              <a:t> </a:t>
+            </a:r>
+            <a:r>
+              <a:rPr lang="nl-NL" i="1" dirty="0" err="1" smtClean="0">
+                <a:latin typeface="Times New Roman" panose="02020603050405020304" pitchFamily="18" charset="0"/>
+                <a:cs typeface="Times New Roman" panose="02020603050405020304" pitchFamily="18" charset="0"/>
+              </a:rPr>
+              <a:t>dorsalis</a:t>
+            </a:r>
+            <a:endParaRPr lang="nl-NL" i="1" dirty="0">
+              <a:latin typeface="Times New Roman" panose="02020603050405020304" pitchFamily="18" charset="0"/>
+              <a:cs typeface="Times New Roman" panose="02020603050405020304" pitchFamily="18" charset="0"/>
+            </a:endParaRPr>
+          </a:p>
+        </p:txBody>
+      </p:sp>
+    </p:spTree>
+    <p:extLst>
+      <p:ext uri="{BB962C8B-B14F-4D97-AF65-F5344CB8AC3E}">
+        <p14:creationId xmlns:p14="http://schemas.microsoft.com/office/powerpoint/2010/main" val="1455812123"/>
+      </p:ext>
+    </p:extLst>
+  </p:cSld>
+  <p:clrMapOvr>
+    <a:masterClrMapping/>
+  </p:clrMapOvr>
+  <p:timing>
+    <p:tnLst>
+      <p:par>
+        <p:cTn id="1" dur="indefinite" restart="never" nodeType="tmRoot"/>
+      </p:par>
+    </p:tnLst>
+  </p:timing>
+</p:sld>
+</file>
+
+<file path=ppt/slides/slide12.xml><?xml version="1.0" encoding="utf-8"?>
+<p:sld xmlns:a="http://schemas.openxmlformats.org/drawingml/2006/main" xmlns:r="http://schemas.openxmlformats.org/officeDocument/2006/relationships" xmlns:p="http://schemas.openxmlformats.org/presentationml/2006/main">
+  <p:cSld>
+    <p:spTree>
+      <p:nvGrpSpPr>
+        <p:cNvPr id="1" name=""/>
+        <p:cNvGrpSpPr/>
+        <p:nvPr/>
+      </p:nvGrpSpPr>
+      <p:grpSpPr>
+        <a:xfrm>
+          <a:off x="0" y="0"/>
+          <a:ext cx="0" cy="0"/>
+          <a:chOff x="0" y="0"/>
+          <a:chExt cx="0" cy="0"/>
+        </a:xfrm>
+      </p:grpSpPr>
+      <p:pic>
+        <p:nvPicPr>
+          <p:cNvPr id="3074" name="Picture 2" descr="Image result for SAD FRUITFLY"/>
+          <p:cNvPicPr>
+            <a:picLocks noChangeAspect="1" noChangeArrowheads="1"/>
+          </p:cNvPicPr>
+          <p:nvPr/>
+        </p:nvPicPr>
+        <p:blipFill>
+          <a:blip r:embed="rId2">
+            <a:extLst>
+              <a:ext uri="{28A0092B-C50C-407E-A947-70E740481C1C}">
+                <a14:useLocalDpi xmlns:a14="http://schemas.microsoft.com/office/drawing/2010/main" val="0"/>
+              </a:ext>
+            </a:extLst>
+          </a:blip>
+          <a:srcRect/>
+          <a:stretch>
+            <a:fillRect/>
+          </a:stretch>
+        </p:blipFill>
+        <p:spPr bwMode="auto">
+          <a:xfrm>
+            <a:off x="3473823" y="409341"/>
+            <a:ext cx="4867835" cy="5817064"/>
+          </a:xfrm>
+          <a:prstGeom prst="rect">
+            <a:avLst/>
+          </a:prstGeom>
+          <a:noFill/>
+          <a:extLst>
+            <a:ext uri="{909E8E84-426E-40DD-AFC4-6F175D3DCCD1}">
+              <a14:hiddenFill xmlns:a14="http://schemas.microsoft.com/office/drawing/2010/main">
+                <a:solidFill>
+                  <a:srgbClr val="FFFFFF"/>
+                </a:solidFill>
+              </a14:hiddenFill>
+            </a:ext>
+          </a:extLst>
         </p:spPr>
       </p:pic>
     </p:spTree>
     <p:extLst>
       <p:ext uri="{BB962C8B-B14F-4D97-AF65-F5344CB8AC3E}">
-        <p14:creationId xmlns:p14="http://schemas.microsoft.com/office/powerpoint/2010/main" val="1455812123"/>
+        <p14:creationId xmlns:p14="http://schemas.microsoft.com/office/powerpoint/2010/main" val="2470423456"/>
+      </p:ext>
+    </p:extLst>
+  </p:cSld>
+  <p:clrMapOvr>
+    <a:masterClrMapping/>
+  </p:clrMapOvr>
+  <p:timing>
+    <p:tnLst>
+      <p:par>
+        <p:cTn id="1" dur="indefinite" restart="never" nodeType="tmRoot"/>
+      </p:par>
+    </p:tnLst>
+  </p:timing>
+</p:sld>
+</file>
+
+<file path=ppt/slides/slide13.xml><?xml version="1.0" encoding="utf-8"?>
+<p:sld xmlns:a="http://schemas.openxmlformats.org/drawingml/2006/main" xmlns:r="http://schemas.openxmlformats.org/officeDocument/2006/relationships" xmlns:p="http://schemas.openxmlformats.org/presentationml/2006/main">
+  <p:cSld>
+    <p:spTree>
+      <p:nvGrpSpPr>
+        <p:cNvPr id="1" name=""/>
+        <p:cNvGrpSpPr/>
+        <p:nvPr/>
+      </p:nvGrpSpPr>
+      <p:grpSpPr>
+        <a:xfrm>
+          <a:off x="0" y="0"/>
+          <a:ext cx="0" cy="0"/>
+          <a:chOff x="0" y="0"/>
+          <a:chExt cx="0" cy="0"/>
+        </a:xfrm>
+      </p:grpSpPr>
+      <p:sp>
+        <p:nvSpPr>
+          <p:cNvPr id="5" name="Tijdelijke aanduiding voor inhoud 4"/>
+          <p:cNvSpPr>
+            <a:spLocks noGrp="1"/>
+          </p:cNvSpPr>
+          <p:nvPr>
+            <p:ph idx="1"/>
+          </p:nvPr>
+        </p:nvSpPr>
+        <p:spPr>
+          <a:xfrm>
+            <a:off x="838200" y="1825624"/>
+            <a:ext cx="6127376" cy="4857563"/>
+          </a:xfrm>
+        </p:spPr>
+        <p:txBody>
+          <a:bodyPr>
+            <a:normAutofit/>
+          </a:bodyPr>
+          <a:lstStyle/>
+          <a:p>
+            <a:pPr marL="0" indent="0">
+              <a:buNone/>
+            </a:pPr>
+            <a:endParaRPr lang="nl-NL" dirty="0" smtClean="0">
+              <a:latin typeface="Times New Roman" panose="02020603050405020304" pitchFamily="18" charset="0"/>
+              <a:cs typeface="Times New Roman" panose="02020603050405020304" pitchFamily="18" charset="0"/>
+            </a:endParaRPr>
+          </a:p>
+          <a:p>
+            <a:pPr lvl="1"/>
+            <a:r>
+              <a:rPr lang="nl-NL" dirty="0" err="1" smtClean="0">
+                <a:latin typeface="Times New Roman" panose="02020603050405020304" pitchFamily="18" charset="0"/>
+                <a:cs typeface="Times New Roman" panose="02020603050405020304" pitchFamily="18" charset="0"/>
+              </a:rPr>
+              <a:t>Flips</a:t>
+            </a:r>
+            <a:r>
+              <a:rPr lang="nl-NL" dirty="0">
+                <a:latin typeface="Times New Roman" panose="02020603050405020304" pitchFamily="18" charset="0"/>
+                <a:cs typeface="Times New Roman" panose="02020603050405020304" pitchFamily="18" charset="0"/>
+              </a:rPr>
+              <a:t> </a:t>
+            </a:r>
+            <a:r>
+              <a:rPr lang="nl-NL" dirty="0" smtClean="0">
+                <a:latin typeface="Times New Roman" panose="02020603050405020304" pitchFamily="18" charset="0"/>
+                <a:cs typeface="Times New Roman" panose="02020603050405020304" pitchFamily="18" charset="0"/>
+              </a:rPr>
+              <a:t>= </a:t>
+            </a:r>
+            <a:r>
+              <a:rPr lang="nl-NL" b="1" dirty="0" smtClean="0">
+                <a:latin typeface="Times New Roman" panose="02020603050405020304" pitchFamily="18" charset="0"/>
+                <a:cs typeface="Times New Roman" panose="02020603050405020304" pitchFamily="18" charset="0"/>
+              </a:rPr>
+              <a:t>18</a:t>
+            </a:r>
+          </a:p>
+          <a:p>
+            <a:pPr lvl="1"/>
+            <a:r>
+              <a:rPr lang="nl-NL" dirty="0" smtClean="0">
+                <a:latin typeface="Times New Roman" panose="02020603050405020304" pitchFamily="18" charset="0"/>
+                <a:cs typeface="Times New Roman" panose="02020603050405020304" pitchFamily="18" charset="0"/>
+              </a:rPr>
+              <a:t>Mutatiepunten </a:t>
+            </a:r>
+            <a:r>
+              <a:rPr lang="nl-NL" dirty="0">
+                <a:latin typeface="Times New Roman" panose="02020603050405020304" pitchFamily="18" charset="0"/>
+                <a:cs typeface="Times New Roman" panose="02020603050405020304" pitchFamily="18" charset="0"/>
+              </a:rPr>
+              <a:t>= lengte van flip. </a:t>
+            </a:r>
+          </a:p>
+          <a:p>
+            <a:pPr marL="0" indent="0">
+              <a:buNone/>
+            </a:pPr>
+            <a:r>
+              <a:rPr lang="nl-NL" sz="2400" dirty="0">
+                <a:latin typeface="Times New Roman" panose="02020603050405020304" pitchFamily="18" charset="0"/>
+                <a:cs typeface="Times New Roman" panose="02020603050405020304" pitchFamily="18" charset="0"/>
+              </a:rPr>
+              <a:t>	totaal = </a:t>
+            </a:r>
+            <a:r>
+              <a:rPr lang="nl-NL" sz="2400" b="1" dirty="0" smtClean="0">
+                <a:latin typeface="Times New Roman" panose="02020603050405020304" pitchFamily="18" charset="0"/>
+                <a:cs typeface="Times New Roman" panose="02020603050405020304" pitchFamily="18" charset="0"/>
+              </a:rPr>
+              <a:t>147</a:t>
+            </a:r>
+          </a:p>
+          <a:p>
+            <a:pPr lvl="1"/>
+            <a:r>
+              <a:rPr lang="nl-NL" dirty="0" smtClean="0">
+                <a:latin typeface="Times New Roman" panose="02020603050405020304" pitchFamily="18" charset="0"/>
+                <a:cs typeface="Times New Roman" panose="02020603050405020304" pitchFamily="18" charset="0"/>
+              </a:rPr>
+              <a:t>Hoe </a:t>
+            </a:r>
+            <a:r>
+              <a:rPr lang="nl-NL" dirty="0">
+                <a:latin typeface="Times New Roman" panose="02020603050405020304" pitchFamily="18" charset="0"/>
+                <a:cs typeface="Times New Roman" panose="02020603050405020304" pitchFamily="18" charset="0"/>
+              </a:rPr>
+              <a:t>groter hoe onwaarschijnlijker = </a:t>
+            </a:r>
+            <a:r>
+              <a:rPr lang="nl-NL" dirty="0">
+                <a:solidFill>
+                  <a:srgbClr val="000000"/>
+                </a:solidFill>
+                <a:latin typeface="Times New Roman" panose="02020603050405020304" pitchFamily="18" charset="0"/>
+                <a:cs typeface="Times New Roman" panose="02020603050405020304" pitchFamily="18" charset="0"/>
+              </a:rPr>
+              <a:t>½n</a:t>
+            </a:r>
+            <a:r>
+              <a:rPr lang="nl-NL" baseline="30000" dirty="0">
+                <a:solidFill>
+                  <a:srgbClr val="000000"/>
+                </a:solidFill>
+                <a:latin typeface="Times New Roman" panose="02020603050405020304" pitchFamily="18" charset="0"/>
+                <a:cs typeface="Times New Roman" panose="02020603050405020304" pitchFamily="18" charset="0"/>
+              </a:rPr>
+              <a:t>2 </a:t>
+            </a:r>
+            <a:r>
+              <a:rPr lang="nl-NL" dirty="0">
+                <a:latin typeface="Times New Roman" panose="02020603050405020304" pitchFamily="18" charset="0"/>
+                <a:cs typeface="Times New Roman" panose="02020603050405020304" pitchFamily="18" charset="0"/>
+              </a:rPr>
+              <a:t> = </a:t>
+            </a:r>
+            <a:r>
+              <a:rPr lang="nl-NL" b="1" dirty="0" smtClean="0">
+                <a:latin typeface="Times New Roman" panose="02020603050405020304" pitchFamily="18" charset="0"/>
+                <a:cs typeface="Times New Roman" panose="02020603050405020304" pitchFamily="18" charset="0"/>
+              </a:rPr>
+              <a:t>963.5</a:t>
+            </a:r>
+          </a:p>
+          <a:p>
+            <a:pPr lvl="1"/>
+            <a:endParaRPr lang="nl-NL" b="1" dirty="0">
+              <a:latin typeface="Times New Roman" panose="02020603050405020304" pitchFamily="18" charset="0"/>
+              <a:cs typeface="Times New Roman" panose="02020603050405020304" pitchFamily="18" charset="0"/>
+            </a:endParaRPr>
+          </a:p>
+          <a:p>
+            <a:pPr marL="457200" lvl="1" indent="0">
+              <a:buNone/>
+            </a:pPr>
+            <a:endParaRPr lang="nl-NL" dirty="0" smtClean="0">
+              <a:latin typeface="Times New Roman" panose="02020603050405020304" pitchFamily="18" charset="0"/>
+              <a:cs typeface="Times New Roman" panose="02020603050405020304" pitchFamily="18" charset="0"/>
+            </a:endParaRPr>
+          </a:p>
+          <a:p>
+            <a:pPr marL="457200" lvl="1" indent="0">
+              <a:buNone/>
+            </a:pPr>
+            <a:r>
+              <a:rPr lang="nl-NL" b="1" cap="all" dirty="0" smtClean="0">
+                <a:latin typeface="Times New Roman" panose="02020603050405020304" pitchFamily="18" charset="0"/>
+                <a:cs typeface="Times New Roman" panose="02020603050405020304" pitchFamily="18" charset="0"/>
+              </a:rPr>
+              <a:t>Bovengrens van de oplossing! </a:t>
+            </a:r>
+            <a:endParaRPr lang="nl-NL" b="1" cap="all" dirty="0">
+              <a:latin typeface="Times New Roman" panose="02020603050405020304" pitchFamily="18" charset="0"/>
+              <a:cs typeface="Times New Roman" panose="02020603050405020304" pitchFamily="18" charset="0"/>
+            </a:endParaRPr>
+          </a:p>
+          <a:p>
+            <a:pPr marL="457200" lvl="1" indent="0">
+              <a:buNone/>
+            </a:pPr>
+            <a:endParaRPr lang="nl-NL" dirty="0" smtClean="0">
+              <a:latin typeface="Times New Roman" panose="02020603050405020304" pitchFamily="18" charset="0"/>
+              <a:cs typeface="Times New Roman" panose="02020603050405020304" pitchFamily="18" charset="0"/>
+            </a:endParaRPr>
+          </a:p>
+          <a:p>
+            <a:pPr marL="457200" lvl="1" indent="0">
+              <a:buNone/>
+            </a:pPr>
+            <a:endParaRPr lang="nl-NL" dirty="0" smtClean="0">
+              <a:latin typeface="Times New Roman" panose="02020603050405020304" pitchFamily="18" charset="0"/>
+              <a:cs typeface="Times New Roman" panose="02020603050405020304" pitchFamily="18" charset="0"/>
+            </a:endParaRPr>
+          </a:p>
+          <a:p>
+            <a:pPr marL="0" indent="0">
+              <a:buNone/>
+            </a:pPr>
+            <a:endParaRPr lang="nl-NL" sz="2400" b="1" dirty="0" smtClean="0">
+              <a:latin typeface="Times New Roman" panose="02020603050405020304" pitchFamily="18" charset="0"/>
+              <a:cs typeface="Times New Roman" panose="02020603050405020304" pitchFamily="18" charset="0"/>
+            </a:endParaRPr>
+          </a:p>
+          <a:p>
+            <a:pPr marL="0" indent="0">
+              <a:buNone/>
+            </a:pPr>
+            <a:endParaRPr lang="nl-NL" sz="2400" dirty="0" smtClean="0">
+              <a:latin typeface="Times New Roman" panose="02020603050405020304" pitchFamily="18" charset="0"/>
+              <a:cs typeface="Times New Roman" panose="02020603050405020304" pitchFamily="18" charset="0"/>
+            </a:endParaRPr>
+          </a:p>
+          <a:p>
+            <a:pPr marL="457200" lvl="1" indent="0">
+              <a:buNone/>
+            </a:pPr>
+            <a:endParaRPr lang="nl-NL" dirty="0" smtClean="0">
+              <a:latin typeface="Times New Roman" panose="02020603050405020304" pitchFamily="18" charset="0"/>
+              <a:cs typeface="Times New Roman" panose="02020603050405020304" pitchFamily="18" charset="0"/>
+            </a:endParaRPr>
+          </a:p>
+          <a:p>
+            <a:pPr marL="457200" lvl="1" indent="0">
+              <a:buNone/>
+            </a:pPr>
+            <a:endParaRPr lang="nl-NL" dirty="0" smtClean="0">
+              <a:latin typeface="Times New Roman" panose="02020603050405020304" pitchFamily="18" charset="0"/>
+              <a:cs typeface="Times New Roman" panose="02020603050405020304" pitchFamily="18" charset="0"/>
+            </a:endParaRPr>
+          </a:p>
+          <a:p>
+            <a:pPr lvl="1"/>
+            <a:endParaRPr lang="nl-NL" dirty="0">
+              <a:latin typeface="Times New Roman" panose="02020603050405020304" pitchFamily="18" charset="0"/>
+              <a:cs typeface="Times New Roman" panose="02020603050405020304" pitchFamily="18" charset="0"/>
+            </a:endParaRPr>
+          </a:p>
+        </p:txBody>
+      </p:sp>
+      <p:pic>
+        <p:nvPicPr>
+          <p:cNvPr id="3" name="Afbeelding 2"/>
+          <p:cNvPicPr>
+            <a:picLocks noChangeAspect="1"/>
+          </p:cNvPicPr>
+          <p:nvPr/>
+        </p:nvPicPr>
+        <p:blipFill rotWithShape="1">
+          <a:blip r:embed="rId2"/>
+          <a:srcRect l="54655" t="30245" r="25958" b="27577"/>
+          <a:stretch/>
+        </p:blipFill>
+        <p:spPr>
+          <a:xfrm>
+            <a:off x="6753725" y="128336"/>
+            <a:ext cx="5502115" cy="6729663"/>
+          </a:xfrm>
+          <a:prstGeom prst="rect">
+            <a:avLst/>
+          </a:prstGeom>
+        </p:spPr>
+      </p:pic>
+      <p:pic>
+        <p:nvPicPr>
+          <p:cNvPr id="6" name="Picture 5"/>
+          <p:cNvPicPr>
+            <a:picLocks noChangeAspect="1"/>
+          </p:cNvPicPr>
+          <p:nvPr/>
+        </p:nvPicPr>
+        <p:blipFill>
+          <a:blip r:embed="rId3">
+            <a:extLst>
+              <a:ext uri="{28A0092B-C50C-407E-A947-70E740481C1C}">
+                <a14:useLocalDpi xmlns:a14="http://schemas.microsoft.com/office/drawing/2010/main" val="0"/>
+              </a:ext>
+            </a:extLst>
+          </a:blip>
+          <a:stretch>
+            <a:fillRect/>
+          </a:stretch>
+        </p:blipFill>
+        <p:spPr>
+          <a:xfrm>
+            <a:off x="6711782" y="64167"/>
+            <a:ext cx="5544058" cy="6858000"/>
+          </a:xfrm>
+          <a:prstGeom prst="rect">
+            <a:avLst/>
+          </a:prstGeom>
+        </p:spPr>
+      </p:pic>
+      <p:sp>
+        <p:nvSpPr>
+          <p:cNvPr id="8" name="Titel 1"/>
+          <p:cNvSpPr txBox="1">
+            <a:spLocks/>
+          </p:cNvSpPr>
+          <p:nvPr/>
+        </p:nvSpPr>
+        <p:spPr>
+          <a:xfrm>
+            <a:off x="838200" y="500061"/>
+            <a:ext cx="5737412" cy="1325563"/>
+          </a:xfrm>
+          <a:prstGeom prst="rect">
+            <a:avLst/>
+          </a:prstGeom>
+        </p:spPr>
+        <p:txBody>
+          <a:bodyPr vert="horz" lIns="91440" tIns="45720" rIns="91440" bIns="45720" rtlCol="0" anchor="ctr">
+            <a:noAutofit/>
+          </a:bodyPr>
+          <a:lstStyle>
+            <a:lvl1pPr algn="l" defTabSz="914400" rtl="0" eaLnBrk="1" latinLnBrk="0" hangingPunct="1">
+              <a:lnSpc>
+                <a:spcPct val="90000"/>
+              </a:lnSpc>
+              <a:spcBef>
+                <a:spcPct val="0"/>
+              </a:spcBef>
+              <a:buNone/>
+              <a:defRPr sz="4400" kern="1200">
+                <a:solidFill>
+                  <a:schemeClr val="tx1"/>
+                </a:solidFill>
+                <a:latin typeface="+mj-lt"/>
+                <a:ea typeface="+mj-ea"/>
+                <a:cs typeface="+mj-cs"/>
+              </a:defRPr>
+            </a:lvl1pPr>
+          </a:lstStyle>
+          <a:p>
+            <a:r>
+              <a:rPr lang="nl-NL" sz="2400" dirty="0" smtClean="0">
+                <a:solidFill>
+                  <a:schemeClr val="bg1">
+                    <a:lumMod val="65000"/>
+                  </a:schemeClr>
+                </a:solidFill>
+                <a:latin typeface="Times New Roman" panose="02020603050405020304" pitchFamily="18" charset="0"/>
+                <a:cs typeface="Times New Roman" panose="02020603050405020304" pitchFamily="18" charset="0"/>
+              </a:rPr>
+              <a:t>van </a:t>
+            </a:r>
+            <a:r>
+              <a:rPr lang="nl-NL" sz="2400" i="1" dirty="0" smtClean="0">
+                <a:solidFill>
+                  <a:schemeClr val="bg1">
+                    <a:lumMod val="65000"/>
+                  </a:schemeClr>
+                </a:solidFill>
+                <a:latin typeface="Times New Roman" panose="02020603050405020304" pitchFamily="18" charset="0"/>
+                <a:cs typeface="Times New Roman" panose="02020603050405020304" pitchFamily="18" charset="0"/>
+              </a:rPr>
+              <a:t>D. </a:t>
+            </a:r>
+            <a:r>
+              <a:rPr lang="nl-NL" sz="2400" i="1" dirty="0" err="1" smtClean="0">
+                <a:solidFill>
+                  <a:schemeClr val="bg1">
+                    <a:lumMod val="65000"/>
+                  </a:schemeClr>
+                </a:solidFill>
+                <a:latin typeface="Times New Roman" panose="02020603050405020304" pitchFamily="18" charset="0"/>
+                <a:cs typeface="Times New Roman" panose="02020603050405020304" pitchFamily="18" charset="0"/>
+              </a:rPr>
+              <a:t>melanogaster</a:t>
+            </a:r>
+            <a:r>
+              <a:rPr lang="nl-NL" sz="2400" i="1" dirty="0" smtClean="0">
+                <a:solidFill>
+                  <a:schemeClr val="bg1">
+                    <a:lumMod val="65000"/>
+                  </a:schemeClr>
+                </a:solidFill>
+                <a:latin typeface="Times New Roman" panose="02020603050405020304" pitchFamily="18" charset="0"/>
+                <a:cs typeface="Times New Roman" panose="02020603050405020304" pitchFamily="18" charset="0"/>
+              </a:rPr>
+              <a:t> </a:t>
+            </a:r>
+            <a:r>
+              <a:rPr lang="nl-NL" sz="2400" dirty="0" smtClean="0">
+                <a:solidFill>
+                  <a:schemeClr val="bg1">
+                    <a:lumMod val="65000"/>
+                  </a:schemeClr>
+                </a:solidFill>
+                <a:latin typeface="Times New Roman" panose="02020603050405020304" pitchFamily="18" charset="0"/>
+                <a:cs typeface="Times New Roman" panose="02020603050405020304" pitchFamily="18" charset="0"/>
+              </a:rPr>
+              <a:t>naar </a:t>
+            </a:r>
+            <a:r>
+              <a:rPr lang="nl-NL" sz="2400" i="1" dirty="0" smtClean="0">
+                <a:solidFill>
+                  <a:schemeClr val="bg1">
+                    <a:lumMod val="65000"/>
+                  </a:schemeClr>
+                </a:solidFill>
+                <a:latin typeface="Times New Roman" panose="02020603050405020304" pitchFamily="18" charset="0"/>
+                <a:cs typeface="Times New Roman" panose="02020603050405020304" pitchFamily="18" charset="0"/>
+              </a:rPr>
+              <a:t>D. </a:t>
+            </a:r>
+            <a:r>
+              <a:rPr lang="nl-NL" sz="2400" i="1" dirty="0" err="1" smtClean="0">
+                <a:solidFill>
+                  <a:schemeClr val="bg1">
+                    <a:lumMod val="65000"/>
+                  </a:schemeClr>
+                </a:solidFill>
+                <a:latin typeface="Times New Roman" panose="02020603050405020304" pitchFamily="18" charset="0"/>
+                <a:cs typeface="Times New Roman" panose="02020603050405020304" pitchFamily="18" charset="0"/>
+              </a:rPr>
+              <a:t>miranda</a:t>
+            </a:r>
+            <a:r>
+              <a:rPr lang="nl-NL" sz="2400" i="1" dirty="0" smtClean="0">
+                <a:solidFill>
+                  <a:schemeClr val="bg1">
+                    <a:lumMod val="65000"/>
+                  </a:schemeClr>
+                </a:solidFill>
+                <a:latin typeface="Times New Roman" panose="02020603050405020304" pitchFamily="18" charset="0"/>
+                <a:cs typeface="Times New Roman" panose="02020603050405020304" pitchFamily="18" charset="0"/>
+              </a:rPr>
+              <a:t> </a:t>
+            </a:r>
+            <a:endParaRPr lang="nl-NL" sz="3600" dirty="0">
+              <a:solidFill>
+                <a:schemeClr val="bg1">
+                  <a:lumMod val="65000"/>
+                </a:schemeClr>
+              </a:solidFill>
+              <a:latin typeface="Times New Roman" panose="02020603050405020304" pitchFamily="18" charset="0"/>
+              <a:cs typeface="Times New Roman" panose="02020603050405020304" pitchFamily="18" charset="0"/>
+            </a:endParaRPr>
+          </a:p>
+          <a:p>
+            <a:endParaRPr lang="nl-NL" sz="700" dirty="0" smtClean="0">
+              <a:latin typeface="Times New Roman" panose="02020603050405020304" pitchFamily="18" charset="0"/>
+              <a:cs typeface="Times New Roman" panose="02020603050405020304" pitchFamily="18" charset="0"/>
+            </a:endParaRPr>
+          </a:p>
+          <a:p>
+            <a:r>
+              <a:rPr lang="nl-NL" sz="3600" dirty="0" smtClean="0">
+                <a:latin typeface="Times New Roman" panose="02020603050405020304" pitchFamily="18" charset="0"/>
+                <a:cs typeface="Times New Roman" panose="02020603050405020304" pitchFamily="18" charset="0"/>
+              </a:rPr>
+              <a:t>FLIP SORTER</a:t>
+            </a:r>
+            <a:endParaRPr lang="nl-NL" sz="3600" dirty="0">
+              <a:latin typeface="Times New Roman" panose="02020603050405020304" pitchFamily="18" charset="0"/>
+              <a:cs typeface="Times New Roman" panose="02020603050405020304" pitchFamily="18" charset="0"/>
+            </a:endParaRPr>
+          </a:p>
+        </p:txBody>
+      </p:sp>
+    </p:spTree>
+    <p:extLst>
+      <p:ext uri="{BB962C8B-B14F-4D97-AF65-F5344CB8AC3E}">
+        <p14:creationId xmlns:p14="http://schemas.microsoft.com/office/powerpoint/2010/main" val="523632840"/>
       </p:ext>
     </p:extLst>
   </p:cSld>
@@ -3919,134 +4434,17 @@
             <p:ph idx="1"/>
           </p:nvPr>
         </p:nvSpPr>
-        <p:spPr/>
+        <p:spPr>
+          <a:xfrm>
+            <a:off x="838200" y="1825625"/>
+            <a:ext cx="7458635" cy="4351338"/>
+          </a:xfrm>
+        </p:spPr>
         <p:txBody>
           <a:bodyPr>
             <a:normAutofit/>
           </a:bodyPr>
           <a:lstStyle/>
-          <a:p>
-            <a:r>
-              <a:rPr lang="nl-NL" dirty="0" smtClean="0">
-                <a:latin typeface="Times New Roman" panose="02020603050405020304" pitchFamily="18" charset="0"/>
-                <a:cs typeface="Times New Roman" panose="02020603050405020304" pitchFamily="18" charset="0"/>
-              </a:rPr>
-              <a:t>Toestandsruimte en oplossingskwaliteit</a:t>
-            </a:r>
-          </a:p>
-          <a:p>
-            <a:r>
-              <a:rPr lang="nl-NL" dirty="0" smtClean="0">
-                <a:latin typeface="Times New Roman" panose="02020603050405020304" pitchFamily="18" charset="0"/>
-                <a:cs typeface="Times New Roman" panose="02020603050405020304" pitchFamily="18" charset="0"/>
-              </a:rPr>
-              <a:t>Een sequentie van mutaties dat het genoom van </a:t>
-            </a:r>
-            <a:r>
-              <a:rPr lang="nl-NL" i="1" dirty="0" smtClean="0">
-                <a:latin typeface="Times New Roman" panose="02020603050405020304" pitchFamily="18" charset="0"/>
-                <a:cs typeface="Times New Roman" panose="02020603050405020304" pitchFamily="18" charset="0"/>
-              </a:rPr>
-              <a:t>D. </a:t>
-            </a:r>
-            <a:r>
-              <a:rPr lang="nl-NL" i="1" dirty="0" err="1" smtClean="0">
-                <a:latin typeface="Times New Roman" panose="02020603050405020304" pitchFamily="18" charset="0"/>
-                <a:cs typeface="Times New Roman" panose="02020603050405020304" pitchFamily="18" charset="0"/>
-              </a:rPr>
-              <a:t>melanogaster</a:t>
-            </a:r>
-            <a:r>
-              <a:rPr lang="nl-NL" i="1" dirty="0" smtClean="0">
-                <a:latin typeface="Times New Roman" panose="02020603050405020304" pitchFamily="18" charset="0"/>
-                <a:cs typeface="Times New Roman" panose="02020603050405020304" pitchFamily="18" charset="0"/>
-              </a:rPr>
-              <a:t> </a:t>
-            </a:r>
-            <a:r>
-              <a:rPr lang="nl-NL" dirty="0" smtClean="0">
-                <a:latin typeface="Times New Roman" panose="02020603050405020304" pitchFamily="18" charset="0"/>
-                <a:cs typeface="Times New Roman" panose="02020603050405020304" pitchFamily="18" charset="0"/>
-              </a:rPr>
-              <a:t>in </a:t>
-            </a:r>
-            <a:r>
-              <a:rPr lang="nl-NL" i="1" dirty="0" smtClean="0">
-                <a:latin typeface="Times New Roman" panose="02020603050405020304" pitchFamily="18" charset="0"/>
-                <a:cs typeface="Times New Roman" panose="02020603050405020304" pitchFamily="18" charset="0"/>
-              </a:rPr>
-              <a:t>D. </a:t>
-            </a:r>
-            <a:r>
-              <a:rPr lang="nl-NL" i="1" dirty="0" err="1" smtClean="0">
-                <a:latin typeface="Times New Roman" panose="02020603050405020304" pitchFamily="18" charset="0"/>
-                <a:cs typeface="Times New Roman" panose="02020603050405020304" pitchFamily="18" charset="0"/>
-              </a:rPr>
-              <a:t>miranda</a:t>
-            </a:r>
-            <a:r>
-              <a:rPr lang="nl-NL" i="1" dirty="0" smtClean="0">
-                <a:latin typeface="Times New Roman" panose="02020603050405020304" pitchFamily="18" charset="0"/>
-                <a:cs typeface="Times New Roman" panose="02020603050405020304" pitchFamily="18" charset="0"/>
-              </a:rPr>
-              <a:t> </a:t>
-            </a:r>
-            <a:r>
-              <a:rPr lang="nl-NL" dirty="0" smtClean="0">
-                <a:latin typeface="Times New Roman" panose="02020603050405020304" pitchFamily="18" charset="0"/>
-                <a:cs typeface="Times New Roman" panose="02020603050405020304" pitchFamily="18" charset="0"/>
-              </a:rPr>
-              <a:t>kan laten veranderen</a:t>
-            </a:r>
-          </a:p>
-          <a:p>
-            <a:r>
-              <a:rPr lang="nl-NL" dirty="0" smtClean="0">
-                <a:latin typeface="Times New Roman" panose="02020603050405020304" pitchFamily="18" charset="0"/>
-                <a:cs typeface="Times New Roman" panose="02020603050405020304" pitchFamily="18" charset="0"/>
-              </a:rPr>
-              <a:t>De </a:t>
-            </a:r>
-            <a:r>
-              <a:rPr lang="nl-NL" b="1" dirty="0" smtClean="0">
-                <a:latin typeface="Times New Roman" panose="02020603050405020304" pitchFamily="18" charset="0"/>
-                <a:cs typeface="Times New Roman" panose="02020603050405020304" pitchFamily="18" charset="0"/>
-              </a:rPr>
-              <a:t>kortste </a:t>
-            </a:r>
-            <a:r>
-              <a:rPr lang="nl-NL" dirty="0" smtClean="0">
-                <a:latin typeface="Times New Roman" panose="02020603050405020304" pitchFamily="18" charset="0"/>
-                <a:cs typeface="Times New Roman" panose="02020603050405020304" pitchFamily="18" charset="0"/>
-              </a:rPr>
-              <a:t>sequentie van mutaties voor verandering</a:t>
-            </a:r>
-          </a:p>
-          <a:p>
-            <a:endParaRPr lang="nl-NL" dirty="0" smtClean="0">
-              <a:latin typeface="Times New Roman" panose="02020603050405020304" pitchFamily="18" charset="0"/>
-              <a:cs typeface="Times New Roman" panose="02020603050405020304" pitchFamily="18" charset="0"/>
-            </a:endParaRPr>
-          </a:p>
-          <a:p>
-            <a:pPr marL="0" indent="0">
-              <a:buNone/>
-            </a:pPr>
-            <a:r>
-              <a:rPr lang="nl-NL" dirty="0">
-                <a:latin typeface="Times New Roman" panose="02020603050405020304" pitchFamily="18" charset="0"/>
-                <a:cs typeface="Times New Roman" panose="02020603050405020304" pitchFamily="18" charset="0"/>
-              </a:rPr>
-              <a:t>	</a:t>
-            </a:r>
-            <a:r>
-              <a:rPr lang="nl-NL" dirty="0" smtClean="0">
-                <a:latin typeface="Times New Roman" panose="02020603050405020304" pitchFamily="18" charset="0"/>
-                <a:cs typeface="Times New Roman" panose="02020603050405020304" pitchFamily="18" charset="0"/>
-              </a:rPr>
-              <a:t>maar… biologische theorie stelt dat kleine mutaties 	waarschijnlijker zijn dan grote mutaties… :</a:t>
-            </a:r>
-          </a:p>
           <a:p>
             <a:pPr marL="0" indent="0">
               <a:buNone/>
@@ -4057,25 +4455,181 @@
             </a:endParaRPr>
           </a:p>
           <a:p>
-            <a:r>
-              <a:rPr lang="nl-NL" dirty="0" smtClean="0">
-                <a:latin typeface="Times New Roman" panose="02020603050405020304" pitchFamily="18" charset="0"/>
-                <a:cs typeface="Times New Roman" panose="02020603050405020304" pitchFamily="18" charset="0"/>
-              </a:rPr>
-              <a:t>Minimale aantal mutatiepunten </a:t>
-            </a:r>
-          </a:p>
-          <a:p>
             <a:pPr marL="0" indent="0">
               <a:buNone/>
             </a:pPr>
-            <a:endParaRPr lang="nl-NL" dirty="0">
+            <a:r>
+              <a:rPr lang="nl-NL" sz="2400" dirty="0" smtClean="0">
+                <a:latin typeface="Times New Roman" panose="02020603050405020304" pitchFamily="18" charset="0"/>
+                <a:cs typeface="Times New Roman" panose="02020603050405020304" pitchFamily="18" charset="0"/>
+              </a:rPr>
+              <a:t>Een </a:t>
+            </a:r>
+            <a:r>
+              <a:rPr lang="nl-NL" sz="2400" dirty="0" smtClean="0">
+                <a:latin typeface="Times New Roman" panose="02020603050405020304" pitchFamily="18" charset="0"/>
+                <a:cs typeface="Times New Roman" panose="02020603050405020304" pitchFamily="18" charset="0"/>
+              </a:rPr>
+              <a:t>sequentie van mutaties dat het genoom van </a:t>
+            </a:r>
+            <a:r>
+              <a:rPr lang="nl-NL" sz="2400" i="1" dirty="0" smtClean="0">
+                <a:latin typeface="Times New Roman" panose="02020603050405020304" pitchFamily="18" charset="0"/>
+                <a:cs typeface="Times New Roman" panose="02020603050405020304" pitchFamily="18" charset="0"/>
+              </a:rPr>
+              <a:t>D. </a:t>
+            </a:r>
+            <a:r>
+              <a:rPr lang="nl-NL" sz="2400" i="1" dirty="0" err="1" smtClean="0">
+                <a:latin typeface="Times New Roman" panose="02020603050405020304" pitchFamily="18" charset="0"/>
+                <a:cs typeface="Times New Roman" panose="02020603050405020304" pitchFamily="18" charset="0"/>
+              </a:rPr>
+              <a:t>melanogaster</a:t>
+            </a:r>
+            <a:r>
+              <a:rPr lang="nl-NL" sz="2400" i="1" dirty="0" smtClean="0">
+                <a:latin typeface="Times New Roman" panose="02020603050405020304" pitchFamily="18" charset="0"/>
+                <a:cs typeface="Times New Roman" panose="02020603050405020304" pitchFamily="18" charset="0"/>
+              </a:rPr>
+              <a:t> </a:t>
+            </a:r>
+            <a:r>
+              <a:rPr lang="nl-NL" sz="2400" dirty="0" smtClean="0">
+                <a:latin typeface="Times New Roman" panose="02020603050405020304" pitchFamily="18" charset="0"/>
+                <a:cs typeface="Times New Roman" panose="02020603050405020304" pitchFamily="18" charset="0"/>
+              </a:rPr>
+              <a:t>in </a:t>
+            </a:r>
+            <a:r>
+              <a:rPr lang="nl-NL" sz="2400" i="1" dirty="0" smtClean="0">
+                <a:latin typeface="Times New Roman" panose="02020603050405020304" pitchFamily="18" charset="0"/>
+                <a:cs typeface="Times New Roman" panose="02020603050405020304" pitchFamily="18" charset="0"/>
+              </a:rPr>
+              <a:t>D. </a:t>
+            </a:r>
+            <a:r>
+              <a:rPr lang="nl-NL" sz="2400" i="1" dirty="0" err="1" smtClean="0">
+                <a:latin typeface="Times New Roman" panose="02020603050405020304" pitchFamily="18" charset="0"/>
+                <a:cs typeface="Times New Roman" panose="02020603050405020304" pitchFamily="18" charset="0"/>
+              </a:rPr>
+              <a:t>miranda</a:t>
+            </a:r>
+            <a:r>
+              <a:rPr lang="nl-NL" sz="2400" i="1" dirty="0" smtClean="0">
+                <a:latin typeface="Times New Roman" panose="02020603050405020304" pitchFamily="18" charset="0"/>
+                <a:cs typeface="Times New Roman" panose="02020603050405020304" pitchFamily="18" charset="0"/>
+              </a:rPr>
+              <a:t> </a:t>
+            </a:r>
+            <a:r>
+              <a:rPr lang="nl-NL" sz="2400" dirty="0" smtClean="0">
+                <a:latin typeface="Times New Roman" panose="02020603050405020304" pitchFamily="18" charset="0"/>
+                <a:cs typeface="Times New Roman" panose="02020603050405020304" pitchFamily="18" charset="0"/>
+              </a:rPr>
+              <a:t>kan laten </a:t>
+            </a:r>
+            <a:r>
+              <a:rPr lang="nl-NL" sz="2400" dirty="0" smtClean="0">
+                <a:latin typeface="Times New Roman" panose="02020603050405020304" pitchFamily="18" charset="0"/>
+                <a:cs typeface="Times New Roman" panose="02020603050405020304" pitchFamily="18" charset="0"/>
+              </a:rPr>
+              <a:t>veranderen</a:t>
+            </a:r>
+          </a:p>
+          <a:p>
+            <a:pPr marL="0" indent="0">
+              <a:buNone/>
+            </a:pPr>
+            <a:endParaRPr lang="nl-NL" sz="2400" dirty="0" smtClean="0">
               <a:latin typeface="Times New Roman" panose="02020603050405020304" pitchFamily="18" charset="0"/>
               <a:cs typeface="Times New Roman" panose="02020603050405020304" pitchFamily="18" charset="0"/>
             </a:endParaRPr>
           </a:p>
-        </p:txBody>
-      </p:sp>
+          <a:p>
+            <a:pPr marL="0" indent="0">
+              <a:buNone/>
+            </a:pPr>
+            <a:r>
+              <a:rPr lang="nl-NL" sz="2400" dirty="0">
+                <a:latin typeface="Times New Roman" panose="02020603050405020304" pitchFamily="18" charset="0"/>
+                <a:cs typeface="Times New Roman" panose="02020603050405020304" pitchFamily="18" charset="0"/>
+              </a:rPr>
+              <a:t>	</a:t>
+            </a:r>
+            <a:r>
+              <a:rPr lang="nl-NL" sz="2400" dirty="0" smtClean="0">
+                <a:latin typeface="Times New Roman" panose="02020603050405020304" pitchFamily="18" charset="0"/>
+                <a:cs typeface="Times New Roman" panose="02020603050405020304" pitchFamily="18" charset="0"/>
+              </a:rPr>
+              <a:t>- Zo min mogelijk mutaties</a:t>
+            </a:r>
+          </a:p>
+          <a:p>
+            <a:pPr marL="0" indent="0">
+              <a:buNone/>
+            </a:pPr>
+            <a:r>
+              <a:rPr lang="nl-NL" sz="2400" dirty="0">
+                <a:latin typeface="Times New Roman" panose="02020603050405020304" pitchFamily="18" charset="0"/>
+                <a:cs typeface="Times New Roman" panose="02020603050405020304" pitchFamily="18" charset="0"/>
+              </a:rPr>
+              <a:t>	</a:t>
+            </a:r>
+            <a:r>
+              <a:rPr lang="nl-NL" sz="2400" dirty="0" smtClean="0">
+                <a:latin typeface="Times New Roman" panose="02020603050405020304" pitchFamily="18" charset="0"/>
+                <a:cs typeface="Times New Roman" panose="02020603050405020304" pitchFamily="18" charset="0"/>
+              </a:rPr>
+              <a:t>- Zo een laag mogelijke mutatiescore </a:t>
+            </a:r>
+            <a:endParaRPr lang="nl-NL" sz="2400" dirty="0" smtClean="0">
+              <a:latin typeface="Times New Roman" panose="02020603050405020304" pitchFamily="18" charset="0"/>
+              <a:cs typeface="Times New Roman" panose="02020603050405020304" pitchFamily="18" charset="0"/>
+            </a:endParaRPr>
+          </a:p>
+        </p:txBody>
+      </p:sp>
+      <p:pic>
+        <p:nvPicPr>
+          <p:cNvPr id="1026" name="Picture 2" descr="File:Fruitvliegen2.jpg"/>
+          <p:cNvPicPr>
+            <a:picLocks noChangeAspect="1" noChangeArrowheads="1"/>
+          </p:cNvPicPr>
+          <p:nvPr/>
+        </p:nvPicPr>
+        <p:blipFill>
+          <a:blip r:embed="rId2">
+            <a:extLst>
+              <a:ext uri="{28A0092B-C50C-407E-A947-70E740481C1C}">
+                <a14:useLocalDpi xmlns:a14="http://schemas.microsoft.com/office/drawing/2010/main" val="0"/>
+              </a:ext>
+            </a:extLst>
+          </a:blip>
+          <a:srcRect/>
+          <a:stretch>
+            <a:fillRect/>
+          </a:stretch>
+        </p:blipFill>
+        <p:spPr bwMode="auto">
+          <a:xfrm>
+            <a:off x="7422778" y="1214012"/>
+            <a:ext cx="4303058" cy="4962951"/>
+          </a:xfrm>
+          <a:prstGeom prst="rect">
+            <a:avLst/>
+          </a:prstGeom>
+          <a:noFill/>
+          <a:extLst>
+            <a:ext uri="{909E8E84-426E-40DD-AFC4-6F175D3DCCD1}">
+              <a14:hiddenFill xmlns:a14="http://schemas.microsoft.com/office/drawing/2010/main">
+                <a:solidFill>
+                  <a:srgbClr val="FFFFFF"/>
+                </a:solidFill>
+              </a14:hiddenFill>
+            </a:ext>
+          </a:extLst>
+        </p:spPr>
+      </p:pic>
     </p:spTree>
     <p:extLst>
       <p:ext uri="{BB962C8B-B14F-4D97-AF65-F5344CB8AC3E}">
@@ -4097,315 +4651,6 @@
 </file>
 
 <file path=ppt/slides/slide5.xml><?xml version="1.0" encoding="utf-8"?>
-<p:sld xmlns:a="http://schemas.openxmlformats.org/drawingml/2006/main" xmlns:r="http://schemas.openxmlformats.org/officeDocument/2006/relationships" xmlns:p="http://schemas.openxmlformats.org/presentationml/2006/main">
-  <p:cSld>
-    <p:spTree>
-      <p:nvGrpSpPr>
-        <p:cNvPr id="1" name=""/>
-        <p:cNvGrpSpPr/>
-        <p:nvPr/>
-      </p:nvGrpSpPr>
-      <p:grpSpPr>
-        <a:xfrm>
-          <a:off x="0" y="0"/>
-          <a:ext cx="0" cy="0"/>
-          <a:chOff x="0" y="0"/>
-          <a:chExt cx="0" cy="0"/>
-        </a:xfrm>
-      </p:grpSpPr>
-      <p:sp>
-        <p:nvSpPr>
-          <p:cNvPr id="2" name="Titel 1"/>
-          <p:cNvSpPr>
-            <a:spLocks noGrp="1"/>
-          </p:cNvSpPr>
-          <p:nvPr>
-            <p:ph type="title"/>
-          </p:nvPr>
-        </p:nvSpPr>
-        <p:spPr>
-          <a:xfrm>
-            <a:off x="7620000" y="341418"/>
-            <a:ext cx="4203032" cy="1134998"/>
-          </a:xfrm>
-        </p:spPr>
-        <p:txBody>
-          <a:bodyPr/>
-          <a:lstStyle/>
-          <a:p>
-            <a:pPr algn="r"/>
-            <a:r>
-              <a:rPr lang="nl-NL" dirty="0" smtClean="0">
-                <a:latin typeface="Times New Roman" panose="02020603050405020304" pitchFamily="18" charset="0"/>
-                <a:cs typeface="Times New Roman" panose="02020603050405020304" pitchFamily="18" charset="0"/>
-              </a:rPr>
-              <a:t>Toestandsruimte</a:t>
-            </a:r>
-            <a:endParaRPr lang="nl-NL" dirty="0">
-              <a:latin typeface="Times New Roman" panose="02020603050405020304" pitchFamily="18" charset="0"/>
-              <a:cs typeface="Times New Roman" panose="02020603050405020304" pitchFamily="18" charset="0"/>
-            </a:endParaRPr>
-          </a:p>
-        </p:txBody>
-      </p:sp>
-      <mc:AlternateContent xmlns:mc="http://schemas.openxmlformats.org/markup-compatibility/2006" xmlns:a14="http://schemas.microsoft.com/office/drawing/2010/main">
-        <mc:Choice Requires="a14">
-          <p:sp>
-            <p:nvSpPr>
-              <p:cNvPr id="3" name="Tijdelijke aanduiding voor inhoud 2"/>
-              <p:cNvSpPr>
-                <a:spLocks noGrp="1"/>
-              </p:cNvSpPr>
-              <p:nvPr>
-                <p:ph idx="1"/>
-              </p:nvPr>
-            </p:nvSpPr>
-            <p:spPr>
-              <a:xfrm>
-                <a:off x="20053" y="2573004"/>
-                <a:ext cx="12171947" cy="1256724"/>
-              </a:xfrm>
-            </p:spPr>
-            <p:txBody>
-              <a:bodyPr>
-                <a:normAutofit/>
-              </a:bodyPr>
-              <a:lstStyle/>
-              <a:p>
-                <a:pPr marL="0" indent="0" algn="ctr">
-                  <a:buNone/>
-                </a:pPr>
-                <a:r>
-                  <a:rPr lang="en-GB" sz="4300" dirty="0">
-                    <a:latin typeface="Times New Roman" panose="02020603050405020304" pitchFamily="18" charset="0"/>
-                    <a:cs typeface="Times New Roman" panose="02020603050405020304" pitchFamily="18" charset="0"/>
-                  </a:rPr>
-                  <a:t>25! = 15511210043330985984000000 = 1.551 * </a:t>
-                </a:r>
-                <a14:m>
-                  <m:oMath xmlns:m="http://schemas.openxmlformats.org/officeDocument/2006/math">
-                    <m:sSup>
-                      <m:sSupPr>
-                        <m:ctrlPr>
-                          <a:rPr lang="nl-NL" sz="4300" i="1">
-                            <a:latin typeface="Cambria Math" panose="02040503050406030204" pitchFamily="18" charset="0"/>
-                          </a:rPr>
-                        </m:ctrlPr>
-                      </m:sSupPr>
-                      <m:e>
-                        <m:r>
-                          <a:rPr lang="en-GB" sz="4300" i="1">
-                            <a:latin typeface="Cambria Math" panose="02040503050406030204" pitchFamily="18" charset="0"/>
-                          </a:rPr>
-                          <m:t>10</m:t>
-                        </m:r>
-                      </m:e>
-                      <m:sup>
-                        <m:r>
-                          <a:rPr lang="en-GB" sz="4300" i="1">
-                            <a:latin typeface="Cambria Math" panose="02040503050406030204" pitchFamily="18" charset="0"/>
-                          </a:rPr>
-                          <m:t>25</m:t>
-                        </m:r>
-                      </m:sup>
-                    </m:sSup>
-                  </m:oMath>
-                </a14:m>
-                <a:r>
-                  <a:rPr lang="en-GB" sz="4000" dirty="0">
-                    <a:latin typeface="Times New Roman" panose="02020603050405020304" pitchFamily="18" charset="0"/>
-                    <a:cs typeface="Times New Roman" panose="02020603050405020304" pitchFamily="18" charset="0"/>
-                  </a:rPr>
-                  <a:t> </a:t>
-                </a:r>
-                <a:endParaRPr lang="en-GB" dirty="0">
-                  <a:latin typeface="Times New Roman" panose="02020603050405020304" pitchFamily="18" charset="0"/>
-                  <a:cs typeface="Times New Roman" panose="02020603050405020304" pitchFamily="18" charset="0"/>
-                </a:endParaRPr>
-              </a:p>
-              <a:p>
-                <a:pPr marL="0" indent="0" algn="ctr">
-                  <a:buNone/>
-                </a:pPr>
-                <a:r>
-                  <a:rPr lang="en-GB" dirty="0">
-                    <a:latin typeface="Times New Roman" panose="02020603050405020304" pitchFamily="18" charset="0"/>
-                    <a:cs typeface="Times New Roman" panose="02020603050405020304" pitchFamily="18" charset="0"/>
-                  </a:rPr>
-                  <a:t>of 15 </a:t>
-                </a:r>
-                <a:r>
-                  <a:rPr lang="en-GB" dirty="0" err="1">
-                    <a:latin typeface="Times New Roman" panose="02020603050405020304" pitchFamily="18" charset="0"/>
-                    <a:cs typeface="Times New Roman" panose="02020603050405020304" pitchFamily="18" charset="0"/>
-                  </a:rPr>
-                  <a:t>quadriljoen</a:t>
-                </a:r>
-                <a:r>
-                  <a:rPr lang="en-GB" dirty="0">
-                    <a:latin typeface="Times New Roman" panose="02020603050405020304" pitchFamily="18" charset="0"/>
-                    <a:cs typeface="Times New Roman" panose="02020603050405020304" pitchFamily="18" charset="0"/>
-                  </a:rPr>
-                  <a:t> </a:t>
-                </a:r>
-                <a:r>
-                  <a:rPr lang="en-GB" dirty="0" err="1">
-                    <a:latin typeface="Times New Roman" panose="02020603050405020304" pitchFamily="18" charset="0"/>
-                    <a:cs typeface="Times New Roman" panose="02020603050405020304" pitchFamily="18" charset="0"/>
-                  </a:rPr>
-                  <a:t>mogelijke</a:t>
-                </a:r>
-                <a:r>
-                  <a:rPr lang="en-GB" dirty="0">
-                    <a:latin typeface="Times New Roman" panose="02020603050405020304" pitchFamily="18" charset="0"/>
-                    <a:cs typeface="Times New Roman" panose="02020603050405020304" pitchFamily="18" charset="0"/>
-                  </a:rPr>
-                  <a:t> </a:t>
-                </a:r>
-                <a:r>
-                  <a:rPr lang="en-GB" dirty="0" err="1">
-                    <a:latin typeface="Times New Roman" panose="02020603050405020304" pitchFamily="18" charset="0"/>
-                    <a:cs typeface="Times New Roman" panose="02020603050405020304" pitchFamily="18" charset="0"/>
-                  </a:rPr>
-                  <a:t>manieren</a:t>
-                </a:r>
-                <a:r>
-                  <a:rPr lang="en-GB" dirty="0">
-                    <a:latin typeface="Times New Roman" panose="02020603050405020304" pitchFamily="18" charset="0"/>
-                    <a:cs typeface="Times New Roman" panose="02020603050405020304" pitchFamily="18" charset="0"/>
-                  </a:rPr>
-                  <a:t> om het </a:t>
-                </a:r>
-                <a:r>
-                  <a:rPr lang="en-GB" dirty="0" err="1">
-                    <a:latin typeface="Times New Roman" panose="02020603050405020304" pitchFamily="18" charset="0"/>
-                    <a:cs typeface="Times New Roman" panose="02020603050405020304" pitchFamily="18" charset="0"/>
-                  </a:rPr>
-                  <a:t>genoom</a:t>
-                </a:r>
-                <a:r>
-                  <a:rPr lang="en-GB" dirty="0">
-                    <a:latin typeface="Times New Roman" panose="02020603050405020304" pitchFamily="18" charset="0"/>
-                    <a:cs typeface="Times New Roman" panose="02020603050405020304" pitchFamily="18" charset="0"/>
-                  </a:rPr>
-                  <a:t> van </a:t>
-                </a:r>
-                <a:r>
-                  <a:rPr lang="en-GB" i="1" dirty="0">
-                    <a:latin typeface="Times New Roman" panose="02020603050405020304" pitchFamily="18" charset="0"/>
-                    <a:cs typeface="Times New Roman" panose="02020603050405020304" pitchFamily="18" charset="0"/>
-                  </a:rPr>
-                  <a:t>Drosophila </a:t>
-                </a:r>
-                <a:r>
-                  <a:rPr lang="en-GB" dirty="0" err="1">
-                    <a:latin typeface="Times New Roman" panose="02020603050405020304" pitchFamily="18" charset="0"/>
-                    <a:cs typeface="Times New Roman" panose="02020603050405020304" pitchFamily="18" charset="0"/>
-                  </a:rPr>
-                  <a:t>te</a:t>
-                </a:r>
-                <a:r>
-                  <a:rPr lang="en-GB" dirty="0">
-                    <a:latin typeface="Times New Roman" panose="02020603050405020304" pitchFamily="18" charset="0"/>
-                    <a:cs typeface="Times New Roman" panose="02020603050405020304" pitchFamily="18" charset="0"/>
-                  </a:rPr>
-                  <a:t> </a:t>
-                </a:r>
-                <a:r>
-                  <a:rPr lang="en-GB" dirty="0" err="1">
-                    <a:latin typeface="Times New Roman" panose="02020603050405020304" pitchFamily="18" charset="0"/>
-                    <a:cs typeface="Times New Roman" panose="02020603050405020304" pitchFamily="18" charset="0"/>
-                  </a:rPr>
-                  <a:t>ordenen</a:t>
-                </a:r>
-                <a:r>
-                  <a:rPr lang="en-GB" i="1" dirty="0">
-                    <a:latin typeface="Times New Roman" panose="02020603050405020304" pitchFamily="18" charset="0"/>
-                    <a:cs typeface="Times New Roman" panose="02020603050405020304" pitchFamily="18" charset="0"/>
-                  </a:rPr>
-                  <a:t>.</a:t>
-                </a:r>
-                <a:endParaRPr lang="nl-NL" dirty="0">
-                  <a:latin typeface="Times New Roman" panose="02020603050405020304" pitchFamily="18" charset="0"/>
-                  <a:cs typeface="Times New Roman" panose="02020603050405020304" pitchFamily="18" charset="0"/>
-                </a:endParaRPr>
-              </a:p>
-              <a:p>
-                <a:pPr algn="ctr"/>
-                <a:endParaRPr lang="nl-NL" dirty="0">
-                  <a:latin typeface="Times New Roman" panose="02020603050405020304" pitchFamily="18" charset="0"/>
-                  <a:cs typeface="Times New Roman" panose="02020603050405020304" pitchFamily="18" charset="0"/>
-                </a:endParaRPr>
-              </a:p>
-              <a:p>
-                <a:pPr algn="ctr"/>
-                <a:endParaRPr lang="nl-NL" dirty="0">
-                  <a:latin typeface="Times New Roman" panose="02020603050405020304" pitchFamily="18" charset="0"/>
-                  <a:cs typeface="Times New Roman" panose="02020603050405020304" pitchFamily="18" charset="0"/>
-                </a:endParaRPr>
-              </a:p>
-            </p:txBody>
-          </p:sp>
-        </mc:Choice>
-        <mc:Fallback xmlns="">
-          <p:sp>
-            <p:nvSpPr>
-              <p:cNvPr id="3" name="Tijdelijke aanduiding voor inhoud 2"/>
-              <p:cNvSpPr>
-                <a:spLocks noGrp="1" noRot="1" noChangeAspect="1" noMove="1" noResize="1" noEditPoints="1" noAdjustHandles="1" noChangeArrowheads="1" noChangeShapeType="1" noTextEdit="1"/>
-              </p:cNvSpPr>
-              <p:nvPr>
-                <p:ph idx="1"/>
-              </p:nvPr>
-            </p:nvSpPr>
-            <p:spPr>
-              <a:xfrm>
-                <a:off x="20053" y="2573004"/>
-                <a:ext cx="12171947" cy="1256724"/>
-              </a:xfrm>
-              <a:blipFill rotWithShape="0">
-                <a:blip r:embed="rId2"/>
-                <a:stretch>
-                  <a:fillRect l="-1302" t="-14563" b="-9223"/>
-                </a:stretch>
-              </a:blipFill>
-            </p:spPr>
-            <p:txBody>
-              <a:bodyPr/>
-              <a:lstStyle/>
-              <a:p>
-                <a:r>
-                  <a:rPr lang="en-GB">
-                    <a:noFill/>
-                  </a:rPr>
-                  <a:t> </a:t>
-                </a:r>
-              </a:p>
-            </p:txBody>
-          </p:sp>
-        </mc:Fallback>
-      </mc:AlternateContent>
-    </p:spTree>
-    <p:extLst>
-      <p:ext uri="{BB962C8B-B14F-4D97-AF65-F5344CB8AC3E}">
-        <p14:creationId xmlns:p14="http://schemas.microsoft.com/office/powerpoint/2010/main" val="2775099878"/>
-      </p:ext>
-    </p:extLst>
-  </p:cSld>
-  <p:clrMapOvr>
-    <a:masterClrMapping/>
-  </p:clrMapOvr>
-  <p:timing>
-    <p:tnLst>
-      <p:par>
-        <p:cTn id="1" dur="indefinite" restart="never" nodeType="tmRoot"/>
-      </p:par>
-    </p:tnLst>
-  </p:timing>
-</p:sld>
-</file>
-
-<file path=ppt/slides/slide6.xml><?xml version="1.0" encoding="utf-8"?>
 <p:sld xmlns:a="http://schemas.openxmlformats.org/drawingml/2006/main" xmlns:r="http://schemas.openxmlformats.org/officeDocument/2006/relationships" xmlns:p="http://schemas.openxmlformats.org/presentationml/2006/main">
   <p:cSld>
     <p:spTree>
@@ -4557,12 +4802,14 @@
         </p:nvSpPr>
         <p:spPr>
           <a:xfrm>
-            <a:off x="7620000" y="341418"/>
-            <a:ext cx="4203032" cy="1134998"/>
-          </a:xfrm>
-        </p:spPr>
-        <p:txBody>
-          <a:bodyPr/>
+            <a:off x="7061688" y="-234540"/>
+            <a:ext cx="5180185" cy="1134998"/>
+          </a:xfrm>
+        </p:spPr>
+        <p:txBody>
+          <a:bodyPr>
+            <a:normAutofit fontScale="90000"/>
+          </a:bodyPr>
           <a:lstStyle/>
           <a:p>
             <a:pPr algn="r"/>
@@ -4571,7 +4818,7 @@
                 <a:latin typeface="Times New Roman" panose="02020603050405020304" pitchFamily="18" charset="0"/>
                 <a:cs typeface="Times New Roman" panose="02020603050405020304" pitchFamily="18" charset="0"/>
               </a:rPr>
-              <a:t>Toestandsruimte</a:t>
+              <a:t>TOESTANDSRUIMTE</a:t>
             </a:r>
             <a:endParaRPr lang="nl-NL" dirty="0">
               <a:latin typeface="Times New Roman" panose="02020603050405020304" pitchFamily="18" charset="0"/>
@@ -5247,6 +5494,856 @@
 </p:sld>
 </file>
 
+<file path=ppt/slides/slide6.xml><?xml version="1.0" encoding="utf-8"?>
+<p:sld xmlns:a="http://schemas.openxmlformats.org/drawingml/2006/main" xmlns:r="http://schemas.openxmlformats.org/officeDocument/2006/relationships" xmlns:p="http://schemas.openxmlformats.org/presentationml/2006/main">
+  <p:cSld>
+    <p:spTree>
+      <p:nvGrpSpPr>
+        <p:cNvPr id="1" name=""/>
+        <p:cNvGrpSpPr/>
+        <p:nvPr/>
+      </p:nvGrpSpPr>
+      <p:grpSpPr>
+        <a:xfrm>
+          <a:off x="0" y="0"/>
+          <a:ext cx="0" cy="0"/>
+          <a:chOff x="0" y="0"/>
+          <a:chExt cx="0" cy="0"/>
+        </a:xfrm>
+      </p:grpSpPr>
+      <p:pic>
+        <p:nvPicPr>
+          <p:cNvPr id="4100" name="Picture 4" descr="Afbeeldingsresultaat voor drosophila"/>
+          <p:cNvPicPr>
+            <a:picLocks noChangeAspect="1" noChangeArrowheads="1"/>
+          </p:cNvPicPr>
+          <p:nvPr/>
+        </p:nvPicPr>
+        <p:blipFill>
+          <a:blip r:embed="rId2">
+            <a:extLst>
+              <a:ext uri="{28A0092B-C50C-407E-A947-70E740481C1C}">
+                <a14:useLocalDpi xmlns:a14="http://schemas.microsoft.com/office/drawing/2010/main" val="0"/>
+              </a:ext>
+            </a:extLst>
+          </a:blip>
+          <a:srcRect/>
+          <a:stretch>
+            <a:fillRect/>
+          </a:stretch>
+        </p:blipFill>
+        <p:spPr bwMode="auto">
+          <a:xfrm>
+            <a:off x="385948" y="4659083"/>
+            <a:ext cx="3187618" cy="2198917"/>
+          </a:xfrm>
+          <a:prstGeom prst="rect">
+            <a:avLst/>
+          </a:prstGeom>
+          <a:noFill/>
+          <a:extLst>
+            <a:ext uri="{909E8E84-426E-40DD-AFC4-6F175D3DCCD1}">
+              <a14:hiddenFill xmlns:a14="http://schemas.microsoft.com/office/drawing/2010/main">
+                <a:solidFill>
+                  <a:srgbClr val="FFFFFF"/>
+                </a:solidFill>
+              </a14:hiddenFill>
+            </a:ext>
+          </a:extLst>
+        </p:spPr>
+      </p:pic>
+      <p:pic>
+        <p:nvPicPr>
+          <p:cNvPr id="6" name="Picture 4" descr="Afbeeldingsresultaat voor drosophila"/>
+          <p:cNvPicPr>
+            <a:picLocks noChangeAspect="1" noChangeArrowheads="1"/>
+          </p:cNvPicPr>
+          <p:nvPr/>
+        </p:nvPicPr>
+        <p:blipFill>
+          <a:blip r:embed="rId2" cstate="print">
+            <a:extLst>
+              <a:ext uri="{28A0092B-C50C-407E-A947-70E740481C1C}">
+                <a14:useLocalDpi xmlns:a14="http://schemas.microsoft.com/office/drawing/2010/main" val="0"/>
+              </a:ext>
+            </a:extLst>
+          </a:blip>
+          <a:srcRect/>
+          <a:stretch>
+            <a:fillRect/>
+          </a:stretch>
+        </p:blipFill>
+        <p:spPr bwMode="auto">
+          <a:xfrm rot="6760218">
+            <a:off x="9530362" y="3261033"/>
+            <a:ext cx="2068269" cy="1426756"/>
+          </a:xfrm>
+          <a:prstGeom prst="rect">
+            <a:avLst/>
+          </a:prstGeom>
+          <a:noFill/>
+          <a:extLst>
+            <a:ext uri="{909E8E84-426E-40DD-AFC4-6F175D3DCCD1}">
+              <a14:hiddenFill xmlns:a14="http://schemas.microsoft.com/office/drawing/2010/main">
+                <a:solidFill>
+                  <a:srgbClr val="FFFFFF"/>
+                </a:solidFill>
+              </a14:hiddenFill>
+            </a:ext>
+          </a:extLst>
+        </p:spPr>
+      </p:pic>
+      <p:pic>
+        <p:nvPicPr>
+          <p:cNvPr id="10" name="Picture 4" descr="Afbeeldingsresultaat voor drosophila"/>
+          <p:cNvPicPr>
+            <a:picLocks noChangeAspect="1" noChangeArrowheads="1"/>
+          </p:cNvPicPr>
+          <p:nvPr/>
+        </p:nvPicPr>
+        <p:blipFill>
+          <a:blip r:embed="rId2">
+            <a:extLst>
+              <a:ext uri="{28A0092B-C50C-407E-A947-70E740481C1C}">
+                <a14:useLocalDpi xmlns:a14="http://schemas.microsoft.com/office/drawing/2010/main" val="0"/>
+              </a:ext>
+            </a:extLst>
+          </a:blip>
+          <a:srcRect/>
+          <a:stretch>
+            <a:fillRect/>
+          </a:stretch>
+        </p:blipFill>
+        <p:spPr bwMode="auto">
+          <a:xfrm rot="18772836">
+            <a:off x="4565484" y="180137"/>
+            <a:ext cx="3758248" cy="2592555"/>
+          </a:xfrm>
+          <a:prstGeom prst="rect">
+            <a:avLst/>
+          </a:prstGeom>
+          <a:noFill/>
+          <a:extLst>
+            <a:ext uri="{909E8E84-426E-40DD-AFC4-6F175D3DCCD1}">
+              <a14:hiddenFill xmlns:a14="http://schemas.microsoft.com/office/drawing/2010/main">
+                <a:solidFill>
+                  <a:srgbClr val="FFFFFF"/>
+                </a:solidFill>
+              </a14:hiddenFill>
+            </a:ext>
+          </a:extLst>
+        </p:spPr>
+      </p:pic>
+      <p:sp>
+        <p:nvSpPr>
+          <p:cNvPr id="2" name="Titel 1"/>
+          <p:cNvSpPr>
+            <a:spLocks noGrp="1"/>
+          </p:cNvSpPr>
+          <p:nvPr>
+            <p:ph type="title"/>
+          </p:nvPr>
+        </p:nvSpPr>
+        <p:spPr>
+          <a:xfrm>
+            <a:off x="7097307" y="-258939"/>
+            <a:ext cx="5199529" cy="1134998"/>
+          </a:xfrm>
+        </p:spPr>
+        <p:txBody>
+          <a:bodyPr>
+            <a:normAutofit fontScale="90000"/>
+          </a:bodyPr>
+          <a:lstStyle/>
+          <a:p>
+            <a:pPr algn="r"/>
+            <a:r>
+              <a:rPr lang="nl-NL" dirty="0" smtClean="0">
+                <a:latin typeface="Times New Roman" panose="02020603050405020304" pitchFamily="18" charset="0"/>
+                <a:cs typeface="Times New Roman" panose="02020603050405020304" pitchFamily="18" charset="0"/>
+              </a:rPr>
+              <a:t>TOESTANDSRUIMTE </a:t>
+            </a:r>
+            <a:endParaRPr lang="nl-NL" dirty="0">
+              <a:latin typeface="Times New Roman" panose="02020603050405020304" pitchFamily="18" charset="0"/>
+              <a:cs typeface="Times New Roman" panose="02020603050405020304" pitchFamily="18" charset="0"/>
+            </a:endParaRPr>
+          </a:p>
+        </p:txBody>
+      </p:sp>
+      <p:sp>
+        <p:nvSpPr>
+          <p:cNvPr id="3" name="Tijdelijke aanduiding voor inhoud 2"/>
+          <p:cNvSpPr>
+            <a:spLocks noGrp="1"/>
+          </p:cNvSpPr>
+          <p:nvPr>
+            <p:ph idx="1"/>
+          </p:nvPr>
+        </p:nvSpPr>
+        <p:spPr>
+          <a:xfrm>
+            <a:off x="20053" y="2573004"/>
+            <a:ext cx="12171947" cy="1256724"/>
+          </a:xfrm>
+        </p:spPr>
+        <p:txBody>
+          <a:bodyPr>
+            <a:normAutofit/>
+          </a:bodyPr>
+          <a:lstStyle/>
+          <a:p>
+            <a:pPr marL="0" lvl="0" indent="0" algn="ctr">
+              <a:buNone/>
+            </a:pPr>
+            <a:r>
+              <a:rPr lang="en-GB" sz="4300" dirty="0">
+                <a:solidFill>
+                  <a:prstClr val="black"/>
+                </a:solidFill>
+                <a:latin typeface="Times New Roman" panose="02020603050405020304" pitchFamily="18" charset="0"/>
+                <a:cs typeface="Times New Roman" panose="02020603050405020304" pitchFamily="18" charset="0"/>
+              </a:rPr>
+              <a:t>24+23+22+21… + 3 + 2 + 1 = 300</a:t>
+            </a:r>
+            <a:br>
+              <a:rPr lang="en-GB" sz="4300" dirty="0">
+                <a:solidFill>
+                  <a:prstClr val="black"/>
+                </a:solidFill>
+                <a:latin typeface="Times New Roman" panose="02020603050405020304" pitchFamily="18" charset="0"/>
+                <a:cs typeface="Times New Roman" panose="02020603050405020304" pitchFamily="18" charset="0"/>
+              </a:rPr>
+            </a:br>
+            <a:r>
+              <a:rPr lang="en-GB" dirty="0">
+                <a:solidFill>
+                  <a:prstClr val="black"/>
+                </a:solidFill>
+                <a:latin typeface="Times New Roman" panose="02020603050405020304" pitchFamily="18" charset="0"/>
+                <a:cs typeface="Times New Roman" panose="02020603050405020304" pitchFamily="18" charset="0"/>
+              </a:rPr>
+              <a:t>300 </a:t>
+            </a:r>
+            <a:r>
+              <a:rPr lang="en-GB" dirty="0" err="1">
+                <a:solidFill>
+                  <a:prstClr val="black"/>
+                </a:solidFill>
+                <a:latin typeface="Times New Roman" panose="02020603050405020304" pitchFamily="18" charset="0"/>
+                <a:cs typeface="Times New Roman" panose="02020603050405020304" pitchFamily="18" charset="0"/>
+              </a:rPr>
+              <a:t>verschillende</a:t>
+            </a:r>
+            <a:r>
+              <a:rPr lang="en-GB" dirty="0">
+                <a:solidFill>
+                  <a:prstClr val="black"/>
+                </a:solidFill>
+                <a:latin typeface="Times New Roman" panose="02020603050405020304" pitchFamily="18" charset="0"/>
+                <a:cs typeface="Times New Roman" panose="02020603050405020304" pitchFamily="18" charset="0"/>
+              </a:rPr>
+              <a:t> </a:t>
+            </a:r>
+            <a:r>
+              <a:rPr lang="en-GB" dirty="0" err="1">
+                <a:solidFill>
+                  <a:prstClr val="black"/>
+                </a:solidFill>
+                <a:latin typeface="Times New Roman" panose="02020603050405020304" pitchFamily="18" charset="0"/>
+                <a:cs typeface="Times New Roman" panose="02020603050405020304" pitchFamily="18" charset="0"/>
+              </a:rPr>
+              <a:t>manieren</a:t>
+            </a:r>
+            <a:r>
+              <a:rPr lang="en-GB" dirty="0">
+                <a:solidFill>
+                  <a:prstClr val="black"/>
+                </a:solidFill>
+                <a:latin typeface="Times New Roman" panose="02020603050405020304" pitchFamily="18" charset="0"/>
+                <a:cs typeface="Times New Roman" panose="02020603050405020304" pitchFamily="18" charset="0"/>
+              </a:rPr>
+              <a:t> om het </a:t>
+            </a:r>
+            <a:r>
+              <a:rPr lang="en-GB" dirty="0" err="1">
+                <a:solidFill>
+                  <a:prstClr val="black"/>
+                </a:solidFill>
+                <a:latin typeface="Times New Roman" panose="02020603050405020304" pitchFamily="18" charset="0"/>
+                <a:cs typeface="Times New Roman" panose="02020603050405020304" pitchFamily="18" charset="0"/>
+              </a:rPr>
+              <a:t>genoom</a:t>
+            </a:r>
+            <a:r>
+              <a:rPr lang="en-GB" dirty="0">
+                <a:solidFill>
+                  <a:prstClr val="black"/>
+                </a:solidFill>
+                <a:latin typeface="Times New Roman" panose="02020603050405020304" pitchFamily="18" charset="0"/>
+                <a:cs typeface="Times New Roman" panose="02020603050405020304" pitchFamily="18" charset="0"/>
+              </a:rPr>
+              <a:t> </a:t>
+            </a:r>
+            <a:r>
+              <a:rPr lang="en-GB" dirty="0" err="1">
+                <a:solidFill>
+                  <a:prstClr val="black"/>
+                </a:solidFill>
+                <a:latin typeface="Times New Roman" panose="02020603050405020304" pitchFamily="18" charset="0"/>
+                <a:cs typeface="Times New Roman" panose="02020603050405020304" pitchFamily="18" charset="0"/>
+              </a:rPr>
+              <a:t>te</a:t>
+            </a:r>
+            <a:r>
+              <a:rPr lang="en-GB" dirty="0">
+                <a:solidFill>
+                  <a:prstClr val="black"/>
+                </a:solidFill>
+                <a:latin typeface="Times New Roman" panose="02020603050405020304" pitchFamily="18" charset="0"/>
+                <a:cs typeface="Times New Roman" panose="02020603050405020304" pitchFamily="18" charset="0"/>
+              </a:rPr>
+              <a:t> </a:t>
+            </a:r>
+            <a:r>
+              <a:rPr lang="en-GB" dirty="0" err="1">
+                <a:solidFill>
+                  <a:prstClr val="black"/>
+                </a:solidFill>
+                <a:latin typeface="Times New Roman" panose="02020603050405020304" pitchFamily="18" charset="0"/>
+                <a:cs typeface="Times New Roman" panose="02020603050405020304" pitchFamily="18" charset="0"/>
+              </a:rPr>
+              <a:t>muteren</a:t>
+            </a:r>
+            <a:endParaRPr lang="nl-NL" dirty="0">
+              <a:solidFill>
+                <a:prstClr val="black"/>
+              </a:solidFill>
+              <a:latin typeface="Times New Roman" panose="02020603050405020304" pitchFamily="18" charset="0"/>
+              <a:cs typeface="Times New Roman" panose="02020603050405020304" pitchFamily="18" charset="0"/>
+            </a:endParaRPr>
+          </a:p>
+          <a:p>
+            <a:pPr algn="ctr"/>
+            <a:endParaRPr lang="nl-NL" dirty="0">
+              <a:latin typeface="Times New Roman" panose="02020603050405020304" pitchFamily="18" charset="0"/>
+              <a:cs typeface="Times New Roman" panose="02020603050405020304" pitchFamily="18" charset="0"/>
+            </a:endParaRPr>
+          </a:p>
+        </p:txBody>
+      </p:sp>
+      <p:pic>
+        <p:nvPicPr>
+          <p:cNvPr id="9" name="Picture 4" descr="Afbeeldingsresultaat voor drosophila"/>
+          <p:cNvPicPr>
+            <a:picLocks noChangeAspect="1" noChangeArrowheads="1"/>
+          </p:cNvPicPr>
+          <p:nvPr/>
+        </p:nvPicPr>
+        <p:blipFill>
+          <a:blip r:embed="rId2" cstate="print">
+            <a:extLst>
+              <a:ext uri="{28A0092B-C50C-407E-A947-70E740481C1C}">
+                <a14:useLocalDpi xmlns:a14="http://schemas.microsoft.com/office/drawing/2010/main" val="0"/>
+              </a:ext>
+            </a:extLst>
+          </a:blip>
+          <a:srcRect/>
+          <a:stretch>
+            <a:fillRect/>
+          </a:stretch>
+        </p:blipFill>
+        <p:spPr bwMode="auto">
+          <a:xfrm>
+            <a:off x="9876657" y="5139567"/>
+            <a:ext cx="2069706" cy="1427747"/>
+          </a:xfrm>
+          <a:prstGeom prst="rect">
+            <a:avLst/>
+          </a:prstGeom>
+          <a:noFill/>
+          <a:extLst>
+            <a:ext uri="{909E8E84-426E-40DD-AFC4-6F175D3DCCD1}">
+              <a14:hiddenFill xmlns:a14="http://schemas.microsoft.com/office/drawing/2010/main">
+                <a:solidFill>
+                  <a:srgbClr val="FFFFFF"/>
+                </a:solidFill>
+              </a14:hiddenFill>
+            </a:ext>
+          </a:extLst>
+        </p:spPr>
+      </p:pic>
+      <p:pic>
+        <p:nvPicPr>
+          <p:cNvPr id="7" name="Picture 4" descr="Afbeeldingsresultaat voor drosophila"/>
+          <p:cNvPicPr>
+            <a:picLocks noChangeAspect="1" noChangeArrowheads="1"/>
+          </p:cNvPicPr>
+          <p:nvPr/>
+        </p:nvPicPr>
+        <p:blipFill>
+          <a:blip r:embed="rId3" cstate="print">
+            <a:extLst>
+              <a:ext uri="{28A0092B-C50C-407E-A947-70E740481C1C}">
+                <a14:useLocalDpi xmlns:a14="http://schemas.microsoft.com/office/drawing/2010/main" val="0"/>
+              </a:ext>
+            </a:extLst>
+          </a:blip>
+          <a:srcRect/>
+          <a:stretch>
+            <a:fillRect/>
+          </a:stretch>
+        </p:blipFill>
+        <p:spPr bwMode="auto">
+          <a:xfrm>
+            <a:off x="4864217" y="3937438"/>
+            <a:ext cx="1989616" cy="1372498"/>
+          </a:xfrm>
+          <a:prstGeom prst="rect">
+            <a:avLst/>
+          </a:prstGeom>
+          <a:noFill/>
+          <a:extLst>
+            <a:ext uri="{909E8E84-426E-40DD-AFC4-6F175D3DCCD1}">
+              <a14:hiddenFill xmlns:a14="http://schemas.microsoft.com/office/drawing/2010/main">
+                <a:solidFill>
+                  <a:srgbClr val="FFFFFF"/>
+                </a:solidFill>
+              </a14:hiddenFill>
+            </a:ext>
+          </a:extLst>
+        </p:spPr>
+      </p:pic>
+      <p:pic>
+        <p:nvPicPr>
+          <p:cNvPr id="8" name="Picture 4" descr="Afbeeldingsresultaat voor drosophila"/>
+          <p:cNvPicPr>
+            <a:picLocks noChangeAspect="1" noChangeArrowheads="1"/>
+          </p:cNvPicPr>
+          <p:nvPr/>
+        </p:nvPicPr>
+        <p:blipFill>
+          <a:blip r:embed="rId2">
+            <a:extLst>
+              <a:ext uri="{28A0092B-C50C-407E-A947-70E740481C1C}">
+                <a14:useLocalDpi xmlns:a14="http://schemas.microsoft.com/office/drawing/2010/main" val="0"/>
+              </a:ext>
+            </a:extLst>
+          </a:blip>
+          <a:srcRect/>
+          <a:stretch>
+            <a:fillRect/>
+          </a:stretch>
+        </p:blipFill>
+        <p:spPr bwMode="auto">
+          <a:xfrm rot="1864081">
+            <a:off x="6000371" y="4849503"/>
+            <a:ext cx="3758248" cy="2592555"/>
+          </a:xfrm>
+          <a:prstGeom prst="rect">
+            <a:avLst/>
+          </a:prstGeom>
+          <a:noFill/>
+          <a:extLst>
+            <a:ext uri="{909E8E84-426E-40DD-AFC4-6F175D3DCCD1}">
+              <a14:hiddenFill xmlns:a14="http://schemas.microsoft.com/office/drawing/2010/main">
+                <a:solidFill>
+                  <a:srgbClr val="FFFFFF"/>
+                </a:solidFill>
+              </a14:hiddenFill>
+            </a:ext>
+          </a:extLst>
+        </p:spPr>
+      </p:pic>
+      <p:pic>
+        <p:nvPicPr>
+          <p:cNvPr id="11" name="Picture 4" descr="Afbeeldingsresultaat voor drosophila"/>
+          <p:cNvPicPr>
+            <a:picLocks noChangeAspect="1" noChangeArrowheads="1"/>
+          </p:cNvPicPr>
+          <p:nvPr/>
+        </p:nvPicPr>
+        <p:blipFill>
+          <a:blip r:embed="rId4" cstate="print">
+            <a:extLst>
+              <a:ext uri="{28A0092B-C50C-407E-A947-70E740481C1C}">
+                <a14:useLocalDpi xmlns:a14="http://schemas.microsoft.com/office/drawing/2010/main" val="0"/>
+              </a:ext>
+            </a:extLst>
+          </a:blip>
+          <a:srcRect/>
+          <a:stretch>
+            <a:fillRect/>
+          </a:stretch>
+        </p:blipFill>
+        <p:spPr bwMode="auto">
+          <a:xfrm rot="7573866">
+            <a:off x="3084970" y="776408"/>
+            <a:ext cx="1479245" cy="1020429"/>
+          </a:xfrm>
+          <a:prstGeom prst="rect">
+            <a:avLst/>
+          </a:prstGeom>
+          <a:noFill/>
+          <a:extLst>
+            <a:ext uri="{909E8E84-426E-40DD-AFC4-6F175D3DCCD1}">
+              <a14:hiddenFill xmlns:a14="http://schemas.microsoft.com/office/drawing/2010/main">
+                <a:solidFill>
+                  <a:srgbClr val="FFFFFF"/>
+                </a:solidFill>
+              </a14:hiddenFill>
+            </a:ext>
+          </a:extLst>
+        </p:spPr>
+      </p:pic>
+      <p:pic>
+        <p:nvPicPr>
+          <p:cNvPr id="12" name="Picture 4" descr="Afbeeldingsresultaat voor drosophila"/>
+          <p:cNvPicPr>
+            <a:picLocks noChangeAspect="1" noChangeArrowheads="1"/>
+          </p:cNvPicPr>
+          <p:nvPr/>
+        </p:nvPicPr>
+        <p:blipFill>
+          <a:blip r:embed="rId5" cstate="print">
+            <a:extLst>
+              <a:ext uri="{28A0092B-C50C-407E-A947-70E740481C1C}">
+                <a14:useLocalDpi xmlns:a14="http://schemas.microsoft.com/office/drawing/2010/main" val="0"/>
+              </a:ext>
+            </a:extLst>
+          </a:blip>
+          <a:srcRect/>
+          <a:stretch>
+            <a:fillRect/>
+          </a:stretch>
+        </p:blipFill>
+        <p:spPr bwMode="auto">
+          <a:xfrm rot="1187116">
+            <a:off x="10182317" y="2028619"/>
+            <a:ext cx="1233604" cy="850978"/>
+          </a:xfrm>
+          <a:prstGeom prst="rect">
+            <a:avLst/>
+          </a:prstGeom>
+          <a:noFill/>
+          <a:extLst>
+            <a:ext uri="{909E8E84-426E-40DD-AFC4-6F175D3DCCD1}">
+              <a14:hiddenFill xmlns:a14="http://schemas.microsoft.com/office/drawing/2010/main">
+                <a:solidFill>
+                  <a:srgbClr val="FFFFFF"/>
+                </a:solidFill>
+              </a14:hiddenFill>
+            </a:ext>
+          </a:extLst>
+        </p:spPr>
+      </p:pic>
+      <p:pic>
+        <p:nvPicPr>
+          <p:cNvPr id="13" name="Picture 4" descr="Afbeeldingsresultaat voor drosophila"/>
+          <p:cNvPicPr>
+            <a:picLocks noChangeAspect="1" noChangeArrowheads="1"/>
+          </p:cNvPicPr>
+          <p:nvPr/>
+        </p:nvPicPr>
+        <p:blipFill>
+          <a:blip r:embed="rId6" cstate="print">
+            <a:extLst>
+              <a:ext uri="{28A0092B-C50C-407E-A947-70E740481C1C}">
+                <a14:useLocalDpi xmlns:a14="http://schemas.microsoft.com/office/drawing/2010/main" val="0"/>
+              </a:ext>
+            </a:extLst>
+          </a:blip>
+          <a:srcRect/>
+          <a:stretch>
+            <a:fillRect/>
+          </a:stretch>
+        </p:blipFill>
+        <p:spPr bwMode="auto">
+          <a:xfrm rot="10587801">
+            <a:off x="8277799" y="1241225"/>
+            <a:ext cx="1467581" cy="1012382"/>
+          </a:xfrm>
+          <a:prstGeom prst="rect">
+            <a:avLst/>
+          </a:prstGeom>
+          <a:noFill/>
+          <a:extLst>
+            <a:ext uri="{909E8E84-426E-40DD-AFC4-6F175D3DCCD1}">
+              <a14:hiddenFill xmlns:a14="http://schemas.microsoft.com/office/drawing/2010/main">
+                <a:solidFill>
+                  <a:srgbClr val="FFFFFF"/>
+                </a:solidFill>
+              </a14:hiddenFill>
+            </a:ext>
+          </a:extLst>
+        </p:spPr>
+      </p:pic>
+      <p:pic>
+        <p:nvPicPr>
+          <p:cNvPr id="17" name="Picture 4" descr="Afbeeldingsresultaat voor drosophila"/>
+          <p:cNvPicPr>
+            <a:picLocks noChangeAspect="1" noChangeArrowheads="1"/>
+          </p:cNvPicPr>
+          <p:nvPr/>
+        </p:nvPicPr>
+        <p:blipFill>
+          <a:blip r:embed="rId7" cstate="print">
+            <a:extLst>
+              <a:ext uri="{28A0092B-C50C-407E-A947-70E740481C1C}">
+                <a14:useLocalDpi xmlns:a14="http://schemas.microsoft.com/office/drawing/2010/main" val="0"/>
+              </a:ext>
+            </a:extLst>
+          </a:blip>
+          <a:srcRect/>
+          <a:stretch>
+            <a:fillRect/>
+          </a:stretch>
+        </p:blipFill>
+        <p:spPr bwMode="auto">
+          <a:xfrm rot="9310560">
+            <a:off x="333401" y="3913906"/>
+            <a:ext cx="1088585" cy="750940"/>
+          </a:xfrm>
+          <a:prstGeom prst="rect">
+            <a:avLst/>
+          </a:prstGeom>
+          <a:noFill/>
+          <a:extLst>
+            <a:ext uri="{909E8E84-426E-40DD-AFC4-6F175D3DCCD1}">
+              <a14:hiddenFill xmlns:a14="http://schemas.microsoft.com/office/drawing/2010/main">
+                <a:solidFill>
+                  <a:srgbClr val="FFFFFF"/>
+                </a:solidFill>
+              </a14:hiddenFill>
+            </a:ext>
+          </a:extLst>
+        </p:spPr>
+      </p:pic>
+      <p:pic>
+        <p:nvPicPr>
+          <p:cNvPr id="15" name="Picture 4" descr="Afbeeldingsresultaat voor drosophila"/>
+          <p:cNvPicPr>
+            <a:picLocks noChangeAspect="1" noChangeArrowheads="1"/>
+          </p:cNvPicPr>
+          <p:nvPr/>
+        </p:nvPicPr>
+        <p:blipFill>
+          <a:blip r:embed="rId3" cstate="print">
+            <a:extLst>
+              <a:ext uri="{28A0092B-C50C-407E-A947-70E740481C1C}">
+                <a14:useLocalDpi xmlns:a14="http://schemas.microsoft.com/office/drawing/2010/main" val="0"/>
+              </a:ext>
+            </a:extLst>
+          </a:blip>
+          <a:srcRect/>
+          <a:stretch>
+            <a:fillRect/>
+          </a:stretch>
+        </p:blipFill>
+        <p:spPr bwMode="auto">
+          <a:xfrm rot="14079203">
+            <a:off x="3777632" y="5055795"/>
+            <a:ext cx="1989616" cy="1372498"/>
+          </a:xfrm>
+          <a:prstGeom prst="rect">
+            <a:avLst/>
+          </a:prstGeom>
+          <a:noFill/>
+          <a:extLst>
+            <a:ext uri="{909E8E84-426E-40DD-AFC4-6F175D3DCCD1}">
+              <a14:hiddenFill xmlns:a14="http://schemas.microsoft.com/office/drawing/2010/main">
+                <a:solidFill>
+                  <a:srgbClr val="FFFFFF"/>
+                </a:solidFill>
+              </a14:hiddenFill>
+            </a:ext>
+          </a:extLst>
+        </p:spPr>
+      </p:pic>
+      <p:pic>
+        <p:nvPicPr>
+          <p:cNvPr id="16" name="Picture 4" descr="Afbeeldingsresultaat voor drosophila"/>
+          <p:cNvPicPr>
+            <a:picLocks noChangeAspect="1" noChangeArrowheads="1"/>
+          </p:cNvPicPr>
+          <p:nvPr/>
+        </p:nvPicPr>
+        <p:blipFill>
+          <a:blip r:embed="rId8" cstate="print">
+            <a:extLst>
+              <a:ext uri="{28A0092B-C50C-407E-A947-70E740481C1C}">
+                <a14:useLocalDpi xmlns:a14="http://schemas.microsoft.com/office/drawing/2010/main" val="0"/>
+              </a:ext>
+            </a:extLst>
+          </a:blip>
+          <a:srcRect/>
+          <a:stretch>
+            <a:fillRect/>
+          </a:stretch>
+        </p:blipFill>
+        <p:spPr bwMode="auto">
+          <a:xfrm rot="17369234">
+            <a:off x="3446891" y="3859867"/>
+            <a:ext cx="833877" cy="575234"/>
+          </a:xfrm>
+          <a:prstGeom prst="rect">
+            <a:avLst/>
+          </a:prstGeom>
+          <a:noFill/>
+          <a:extLst>
+            <a:ext uri="{909E8E84-426E-40DD-AFC4-6F175D3DCCD1}">
+              <a14:hiddenFill xmlns:a14="http://schemas.microsoft.com/office/drawing/2010/main">
+                <a:solidFill>
+                  <a:srgbClr val="FFFFFF"/>
+                </a:solidFill>
+              </a14:hiddenFill>
+            </a:ext>
+          </a:extLst>
+        </p:spPr>
+      </p:pic>
+      <p:pic>
+        <p:nvPicPr>
+          <p:cNvPr id="18" name="Picture 4" descr="Afbeeldingsresultaat voor drosophila"/>
+          <p:cNvPicPr>
+            <a:picLocks noChangeAspect="1" noChangeArrowheads="1"/>
+          </p:cNvPicPr>
+          <p:nvPr/>
+        </p:nvPicPr>
+        <p:blipFill>
+          <a:blip r:embed="rId5" cstate="print">
+            <a:extLst>
+              <a:ext uri="{28A0092B-C50C-407E-A947-70E740481C1C}">
+                <a14:useLocalDpi xmlns:a14="http://schemas.microsoft.com/office/drawing/2010/main" val="0"/>
+              </a:ext>
+            </a:extLst>
+          </a:blip>
+          <a:srcRect/>
+          <a:stretch>
+            <a:fillRect/>
+          </a:stretch>
+        </p:blipFill>
+        <p:spPr bwMode="auto">
+          <a:xfrm rot="1284435">
+            <a:off x="7974135" y="3798541"/>
+            <a:ext cx="1578652" cy="1089003"/>
+          </a:xfrm>
+          <a:prstGeom prst="rect">
+            <a:avLst/>
+          </a:prstGeom>
+          <a:noFill/>
+          <a:extLst>
+            <a:ext uri="{909E8E84-426E-40DD-AFC4-6F175D3DCCD1}">
+              <a14:hiddenFill xmlns:a14="http://schemas.microsoft.com/office/drawing/2010/main">
+                <a:solidFill>
+                  <a:srgbClr val="FFFFFF"/>
+                </a:solidFill>
+              </a14:hiddenFill>
+            </a:ext>
+          </a:extLst>
+        </p:spPr>
+      </p:pic>
+      <p:pic>
+        <p:nvPicPr>
+          <p:cNvPr id="19" name="Picture 4" descr="Afbeeldingsresultaat voor drosophila"/>
+          <p:cNvPicPr>
+            <a:picLocks noChangeAspect="1" noChangeArrowheads="1"/>
+          </p:cNvPicPr>
+          <p:nvPr/>
+        </p:nvPicPr>
+        <p:blipFill>
+          <a:blip r:embed="rId9" cstate="print">
+            <a:extLst>
+              <a:ext uri="{28A0092B-C50C-407E-A947-70E740481C1C}">
+                <a14:useLocalDpi xmlns:a14="http://schemas.microsoft.com/office/drawing/2010/main" val="0"/>
+              </a:ext>
+            </a:extLst>
+          </a:blip>
+          <a:srcRect/>
+          <a:stretch>
+            <a:fillRect/>
+          </a:stretch>
+        </p:blipFill>
+        <p:spPr bwMode="auto">
+          <a:xfrm rot="14079203">
+            <a:off x="629156" y="2458554"/>
+            <a:ext cx="1552977" cy="1071291"/>
+          </a:xfrm>
+          <a:prstGeom prst="rect">
+            <a:avLst/>
+          </a:prstGeom>
+          <a:noFill/>
+          <a:extLst>
+            <a:ext uri="{909E8E84-426E-40DD-AFC4-6F175D3DCCD1}">
+              <a14:hiddenFill xmlns:a14="http://schemas.microsoft.com/office/drawing/2010/main">
+                <a:solidFill>
+                  <a:srgbClr val="FFFFFF"/>
+                </a:solidFill>
+              </a14:hiddenFill>
+            </a:ext>
+          </a:extLst>
+        </p:spPr>
+      </p:pic>
+      <p:pic>
+        <p:nvPicPr>
+          <p:cNvPr id="14" name="Picture 4" descr="Afbeeldingsresultaat voor drosophila"/>
+          <p:cNvPicPr>
+            <a:picLocks noChangeAspect="1" noChangeArrowheads="1"/>
+          </p:cNvPicPr>
+          <p:nvPr/>
+        </p:nvPicPr>
+        <p:blipFill>
+          <a:blip r:embed="rId2">
+            <a:extLst>
+              <a:ext uri="{28A0092B-C50C-407E-A947-70E740481C1C}">
+                <a14:useLocalDpi xmlns:a14="http://schemas.microsoft.com/office/drawing/2010/main" val="0"/>
+              </a:ext>
+            </a:extLst>
+          </a:blip>
+          <a:srcRect/>
+          <a:stretch>
+            <a:fillRect/>
+          </a:stretch>
+        </p:blipFill>
+        <p:spPr bwMode="auto">
+          <a:xfrm>
+            <a:off x="433210" y="544416"/>
+            <a:ext cx="2493213" cy="1719895"/>
+          </a:xfrm>
+          <a:prstGeom prst="rect">
+            <a:avLst/>
+          </a:prstGeom>
+          <a:noFill/>
+          <a:extLst>
+            <a:ext uri="{909E8E84-426E-40DD-AFC4-6F175D3DCCD1}">
+              <a14:hiddenFill xmlns:a14="http://schemas.microsoft.com/office/drawing/2010/main">
+                <a:solidFill>
+                  <a:srgbClr val="FFFFFF"/>
+                </a:solidFill>
+              </a14:hiddenFill>
+            </a:ext>
+          </a:extLst>
+        </p:spPr>
+      </p:pic>
+    </p:spTree>
+    <p:extLst>
+      <p:ext uri="{BB962C8B-B14F-4D97-AF65-F5344CB8AC3E}">
+        <p14:creationId xmlns:p14="http://schemas.microsoft.com/office/powerpoint/2010/main" val="1336991098"/>
+      </p:ext>
+    </p:extLst>
+  </p:cSld>
+  <p:clrMapOvr>
+    <a:masterClrMapping/>
+  </p:clrMapOvr>
+  <p:timing>
+    <p:tnLst>
+      <p:par>
+        <p:cTn id="1" dur="indefinite" restart="never" nodeType="tmRoot"/>
+      </p:par>
+    </p:tnLst>
+  </p:timing>
+</p:sld>
+</file>
+
 <file path=ppt/slides/slide7.xml><?xml version="1.0" encoding="utf-8"?>
 <p:sld xmlns:a="http://schemas.openxmlformats.org/drawingml/2006/main" xmlns:r="http://schemas.openxmlformats.org/officeDocument/2006/relationships" xmlns:p="http://schemas.openxmlformats.org/presentationml/2006/main">
   <p:cSld>
@@ -5266,32 +6363,198 @@
       </p:grpSpPr>
       <p:sp>
         <p:nvSpPr>
-          <p:cNvPr id="2" name="Titel 1"/>
+          <p:cNvPr id="5" name="Tijdelijke aanduiding voor inhoud 4"/>
           <p:cNvSpPr>
             <a:spLocks noGrp="1"/>
           </p:cNvSpPr>
           <p:nvPr>
-            <p:ph type="title"/>
+            <p:ph idx="1"/>
           </p:nvPr>
         </p:nvSpPr>
         <p:spPr>
           <a:xfrm>
-            <a:off x="7620000" y="341418"/>
-            <a:ext cx="4203032" cy="1134998"/>
-          </a:xfrm>
-        </p:spPr>
-        <p:txBody>
-          <a:bodyPr/>
+            <a:off x="838200" y="1825624"/>
+            <a:ext cx="5498432" cy="4857563"/>
+          </a:xfrm>
+        </p:spPr>
+        <p:txBody>
+          <a:bodyPr>
+            <a:normAutofit/>
+          </a:bodyPr>
           <a:lstStyle/>
           <a:p>
-            <a:pPr algn="r"/>
-            <a:r>
-              <a:rPr lang="nl-NL" dirty="0" smtClean="0">
-                <a:latin typeface="Times New Roman" panose="02020603050405020304" pitchFamily="18" charset="0"/>
-                <a:cs typeface="Times New Roman" panose="02020603050405020304" pitchFamily="18" charset="0"/>
-              </a:rPr>
-              <a:t>Toestandsruimte</a:t>
-            </a:r>
+            <a:pPr marL="0" indent="0">
+              <a:buNone/>
+            </a:pPr>
+            <a:r>
+              <a:rPr lang="nl-NL" sz="2400" dirty="0" err="1" smtClean="0">
+                <a:latin typeface="Times New Roman" panose="02020603050405020304" pitchFamily="18" charset="0"/>
+                <a:cs typeface="Times New Roman" panose="02020603050405020304" pitchFamily="18" charset="0"/>
+              </a:rPr>
+              <a:t>Prunen</a:t>
+            </a:r>
+            <a:r>
+              <a:rPr lang="nl-NL" sz="2400" dirty="0" smtClean="0">
+                <a:latin typeface="Times New Roman" panose="02020603050405020304" pitchFamily="18" charset="0"/>
+                <a:cs typeface="Times New Roman" panose="02020603050405020304" pitchFamily="18" charset="0"/>
+              </a:rPr>
+              <a:t> </a:t>
+            </a:r>
+            <a:r>
+              <a:rPr lang="nl-NL" sz="2400" dirty="0">
+                <a:latin typeface="Times New Roman" panose="02020603050405020304" pitchFamily="18" charset="0"/>
+                <a:cs typeface="Times New Roman" panose="02020603050405020304" pitchFamily="18" charset="0"/>
+              </a:rPr>
+              <a:t>op de bovengrens =</a:t>
+            </a:r>
+          </a:p>
+          <a:p>
+            <a:pPr marL="0" indent="0">
+              <a:buNone/>
+            </a:pPr>
+            <a:r>
+              <a:rPr lang="nl-NL" sz="2400" dirty="0">
+                <a:latin typeface="Times New Roman" panose="02020603050405020304" pitchFamily="18" charset="0"/>
+                <a:cs typeface="Times New Roman" panose="02020603050405020304" pitchFamily="18" charset="0"/>
+              </a:rPr>
+              <a:t>	</a:t>
+            </a:r>
+            <a:r>
+              <a:rPr lang="nl-NL" sz="2400" b="1" dirty="0">
+                <a:latin typeface="Times New Roman" panose="02020603050405020304" pitchFamily="18" charset="0"/>
+                <a:cs typeface="Times New Roman" panose="02020603050405020304" pitchFamily="18" charset="0"/>
+              </a:rPr>
+              <a:t>oplossingen tot en met lengte 11</a:t>
+            </a:r>
+          </a:p>
+          <a:p>
+            <a:pPr marL="0" indent="0">
+              <a:buNone/>
+            </a:pPr>
+            <a:endParaRPr lang="nl-NL" sz="2400" dirty="0" smtClean="0">
+              <a:latin typeface="Times New Roman" panose="02020603050405020304" pitchFamily="18" charset="0"/>
+              <a:cs typeface="Times New Roman" panose="02020603050405020304" pitchFamily="18" charset="0"/>
+            </a:endParaRPr>
+          </a:p>
+          <a:p>
+            <a:pPr marL="0" indent="0">
+              <a:buNone/>
+            </a:pPr>
+            <a:r>
+              <a:rPr lang="nl-NL" sz="2400" dirty="0" smtClean="0">
+                <a:latin typeface="Times New Roman" panose="02020603050405020304" pitchFamily="18" charset="0"/>
+                <a:cs typeface="Times New Roman" panose="02020603050405020304" pitchFamily="18" charset="0"/>
+              </a:rPr>
+              <a:t>Archief en </a:t>
+            </a:r>
+            <a:r>
+              <a:rPr lang="nl-NL" sz="2400" dirty="0" err="1" smtClean="0">
+                <a:latin typeface="Times New Roman" panose="02020603050405020304" pitchFamily="18" charset="0"/>
+                <a:cs typeface="Times New Roman" panose="02020603050405020304" pitchFamily="18" charset="0"/>
+              </a:rPr>
+              <a:t>prunen</a:t>
+            </a:r>
+            <a:r>
+              <a:rPr lang="nl-NL" sz="2400" dirty="0" smtClean="0">
+                <a:latin typeface="Times New Roman" panose="02020603050405020304" pitchFamily="18" charset="0"/>
+                <a:cs typeface="Times New Roman" panose="02020603050405020304" pitchFamily="18" charset="0"/>
+              </a:rPr>
+              <a:t> op de bovengrens =</a:t>
+            </a:r>
+          </a:p>
+          <a:p>
+            <a:pPr marL="0" indent="0">
+              <a:buNone/>
+            </a:pPr>
+            <a:r>
+              <a:rPr lang="nl-NL" sz="2400" dirty="0">
+                <a:latin typeface="Times New Roman" panose="02020603050405020304" pitchFamily="18" charset="0"/>
+                <a:cs typeface="Times New Roman" panose="02020603050405020304" pitchFamily="18" charset="0"/>
+              </a:rPr>
+              <a:t>	</a:t>
+            </a:r>
+            <a:r>
+              <a:rPr lang="nl-NL" sz="2400" b="1" dirty="0" smtClean="0">
+                <a:latin typeface="Times New Roman" panose="02020603050405020304" pitchFamily="18" charset="0"/>
+                <a:cs typeface="Times New Roman" panose="02020603050405020304" pitchFamily="18" charset="0"/>
+              </a:rPr>
+              <a:t>oplossingen tot en met lengte 11</a:t>
+            </a:r>
+          </a:p>
+          <a:p>
+            <a:pPr marL="0" indent="0">
+              <a:buNone/>
+            </a:pPr>
+            <a:endParaRPr lang="nl-NL" sz="2400" b="1" dirty="0" smtClean="0">
+              <a:latin typeface="Times New Roman" panose="02020603050405020304" pitchFamily="18" charset="0"/>
+              <a:cs typeface="Times New Roman" panose="02020603050405020304" pitchFamily="18" charset="0"/>
+            </a:endParaRPr>
+          </a:p>
+          <a:p>
+            <a:pPr marL="0" indent="0">
+              <a:buNone/>
+            </a:pPr>
+            <a:endParaRPr lang="nl-NL" sz="2400" b="1" dirty="0">
+              <a:latin typeface="Times New Roman" panose="02020603050405020304" pitchFamily="18" charset="0"/>
+              <a:cs typeface="Times New Roman" panose="02020603050405020304" pitchFamily="18" charset="0"/>
+            </a:endParaRPr>
+          </a:p>
+          <a:p>
+            <a:pPr marL="0" indent="0">
+              <a:buNone/>
+            </a:pPr>
+            <a:r>
+              <a:rPr lang="nl-NL" sz="2000" b="1" dirty="0" smtClean="0">
+                <a:latin typeface="Times New Roman" panose="02020603050405020304" pitchFamily="18" charset="0"/>
+                <a:cs typeface="Times New Roman" panose="02020603050405020304" pitchFamily="18" charset="0"/>
+              </a:rPr>
+              <a:t>GEHEUGEN CAPACITEIT ONVOLDOENDE</a:t>
+            </a:r>
+          </a:p>
+          <a:p>
+            <a:pPr marL="0" indent="0">
+              <a:buNone/>
+            </a:pPr>
+            <a:r>
+              <a:rPr lang="nl-NL" sz="2400" b="1" dirty="0" smtClean="0">
+                <a:solidFill>
+                  <a:srgbClr val="FFC000"/>
+                </a:solidFill>
+                <a:latin typeface="Times New Roman" panose="02020603050405020304" pitchFamily="18" charset="0"/>
+                <a:cs typeface="Times New Roman" panose="02020603050405020304" pitchFamily="18" charset="0"/>
+              </a:rPr>
+              <a:t>Leander time plaatje toevoegen </a:t>
+            </a:r>
+          </a:p>
+          <a:p>
+            <a:pPr marL="0" indent="0">
+              <a:buNone/>
+            </a:pPr>
+            <a:endParaRPr lang="nl-NL" sz="2400" dirty="0" smtClean="0">
+              <a:latin typeface="Times New Roman" panose="02020603050405020304" pitchFamily="18" charset="0"/>
+              <a:cs typeface="Times New Roman" panose="02020603050405020304" pitchFamily="18" charset="0"/>
+            </a:endParaRPr>
+          </a:p>
+          <a:p>
+            <a:pPr marL="457200" lvl="1" indent="0">
+              <a:buNone/>
+            </a:pPr>
+            <a:endParaRPr lang="nl-NL" dirty="0" smtClean="0">
+              <a:latin typeface="Times New Roman" panose="02020603050405020304" pitchFamily="18" charset="0"/>
+              <a:cs typeface="Times New Roman" panose="02020603050405020304" pitchFamily="18" charset="0"/>
+            </a:endParaRPr>
+          </a:p>
+          <a:p>
+            <a:pPr marL="457200" lvl="1" indent="0">
+              <a:buNone/>
+            </a:pPr>
+            <a:endParaRPr lang="nl-NL" dirty="0" smtClean="0">
+              <a:latin typeface="Times New Roman" panose="02020603050405020304" pitchFamily="18" charset="0"/>
+              <a:cs typeface="Times New Roman" panose="02020603050405020304" pitchFamily="18" charset="0"/>
+            </a:endParaRPr>
+          </a:p>
+          <a:p>
+            <a:pPr lvl="1"/>
             <a:endParaRPr lang="nl-NL" dirty="0">
               <a:latin typeface="Times New Roman" panose="02020603050405020304" pitchFamily="18" charset="0"/>
               <a:cs typeface="Times New Roman" panose="02020603050405020304" pitchFamily="18" charset="0"/>
@@ -5301,130 +6564,169 @@
       </p:sp>
       <p:sp>
         <p:nvSpPr>
-          <p:cNvPr id="3" name="Tijdelijke aanduiding voor inhoud 2"/>
-          <p:cNvSpPr>
-            <a:spLocks noGrp="1"/>
-          </p:cNvSpPr>
-          <p:nvPr>
-            <p:ph idx="1"/>
-          </p:nvPr>
+          <p:cNvPr id="7" name="Titel 1"/>
+          <p:cNvSpPr txBox="1">
+            <a:spLocks/>
+          </p:cNvSpPr>
+          <p:nvPr/>
         </p:nvSpPr>
         <p:spPr>
           <a:xfrm>
-            <a:off x="20053" y="2573004"/>
-            <a:ext cx="12171947" cy="1256724"/>
-          </a:xfrm>
-        </p:spPr>
-        <p:txBody>
-          <a:bodyPr>
-            <a:normAutofit/>
+            <a:off x="838200" y="365125"/>
+            <a:ext cx="5737412" cy="1325563"/>
+          </a:xfrm>
+          <a:prstGeom prst="rect">
+            <a:avLst/>
+          </a:prstGeom>
+        </p:spPr>
+        <p:txBody>
+          <a:bodyPr vert="horz" lIns="91440" tIns="45720" rIns="91440" bIns="45720" rtlCol="0" anchor="ctr">
+            <a:noAutofit/>
           </a:bodyPr>
-          <a:lstStyle/>
-          <a:p>
-            <a:pPr marL="0" indent="0" algn="ctr">
-              <a:buNone/>
-            </a:pPr>
-            <a:r>
-              <a:rPr lang="en-GB" sz="4300" dirty="0" smtClean="0">
-                <a:latin typeface="Times New Roman" panose="02020603050405020304" pitchFamily="18" charset="0"/>
-                <a:cs typeface="Times New Roman" panose="02020603050405020304" pitchFamily="18" charset="0"/>
-              </a:rPr>
-              <a:t>24+23+22+21… + 3 + 2 + 1 = 300</a:t>
-            </a:r>
-            <a:br>
-              <a:rPr lang="en-GB" sz="4300" dirty="0" smtClean="0">
-                <a:latin typeface="Times New Roman" panose="02020603050405020304" pitchFamily="18" charset="0"/>
-                <a:cs typeface="Times New Roman" panose="02020603050405020304" pitchFamily="18" charset="0"/>
-              </a:rPr>
-            </a:br>
-            <a:r>
-              <a:rPr lang="en-GB" dirty="0" smtClean="0">
-                <a:latin typeface="Times New Roman" panose="02020603050405020304" pitchFamily="18" charset="0"/>
-                <a:cs typeface="Times New Roman" panose="02020603050405020304" pitchFamily="18" charset="0"/>
-              </a:rPr>
-              <a:t>300 </a:t>
-            </a:r>
-            <a:r>
-              <a:rPr lang="en-GB" dirty="0" err="1" smtClean="0">
-                <a:latin typeface="Times New Roman" panose="02020603050405020304" pitchFamily="18" charset="0"/>
-                <a:cs typeface="Times New Roman" panose="02020603050405020304" pitchFamily="18" charset="0"/>
-              </a:rPr>
-              <a:t>verschillende</a:t>
-            </a:r>
-            <a:r>
-              <a:rPr lang="en-GB" dirty="0" smtClean="0">
+          <a:lstStyle>
+            <a:lvl1pPr algn="l" defTabSz="914400" rtl="0" eaLnBrk="1" latinLnBrk="0" hangingPunct="1">
+              <a:lnSpc>
+                <a:spcPct val="90000"/>
+              </a:lnSpc>
+              <a:spcBef>
+                <a:spcPct val="0"/>
+              </a:spcBef>
+              <a:buNone/>
+              <a:defRPr sz="4400" kern="1200">
+                <a:solidFill>
+                  <a:schemeClr val="tx1"/>
+                </a:solidFill>
+                <a:latin typeface="+mj-lt"/>
+                <a:ea typeface="+mj-ea"/>
+                <a:cs typeface="+mj-cs"/>
+              </a:defRPr>
+            </a:lvl1pPr>
+          </a:lstStyle>
+          <a:p>
+            <a:r>
+              <a:rPr lang="nl-NL" sz="2400" dirty="0" smtClean="0">
+                <a:solidFill>
+                  <a:schemeClr val="bg1">
+                    <a:lumMod val="65000"/>
+                  </a:schemeClr>
+                </a:solidFill>
+                <a:latin typeface="Times New Roman" panose="02020603050405020304" pitchFamily="18" charset="0"/>
+                <a:cs typeface="Times New Roman" panose="02020603050405020304" pitchFamily="18" charset="0"/>
+              </a:rPr>
+              <a:t>van </a:t>
+            </a:r>
+            <a:r>
+              <a:rPr lang="nl-NL" sz="2400" i="1" dirty="0" smtClean="0">
+                <a:solidFill>
+                  <a:schemeClr val="bg1">
+                    <a:lumMod val="65000"/>
+                  </a:schemeClr>
+                </a:solidFill>
+                <a:latin typeface="Times New Roman" panose="02020603050405020304" pitchFamily="18" charset="0"/>
+                <a:cs typeface="Times New Roman" panose="02020603050405020304" pitchFamily="18" charset="0"/>
+              </a:rPr>
+              <a:t>D. </a:t>
+            </a:r>
+            <a:r>
+              <a:rPr lang="nl-NL" sz="2400" i="1" dirty="0" err="1" smtClean="0">
+                <a:solidFill>
+                  <a:schemeClr val="bg1">
+                    <a:lumMod val="65000"/>
+                  </a:schemeClr>
+                </a:solidFill>
+                <a:latin typeface="Times New Roman" panose="02020603050405020304" pitchFamily="18" charset="0"/>
+                <a:cs typeface="Times New Roman" panose="02020603050405020304" pitchFamily="18" charset="0"/>
+              </a:rPr>
+              <a:t>melanogaster</a:t>
+            </a:r>
+            <a:r>
+              <a:rPr lang="nl-NL" sz="2400" i="1" dirty="0" smtClean="0">
+                <a:solidFill>
+                  <a:schemeClr val="bg1">
+                    <a:lumMod val="65000"/>
+                  </a:schemeClr>
+                </a:solidFill>
                 <a:latin typeface="Times New Roman" panose="02020603050405020304" pitchFamily="18" charset="0"/>
                 <a:cs typeface="Times New Roman" panose="02020603050405020304" pitchFamily="18" charset="0"/>
               </a:rPr>
               <a:t> </a:t>
             </a:r>
             <a:r>
-              <a:rPr lang="en-GB" dirty="0" err="1" smtClean="0">
-                <a:latin typeface="Times New Roman" panose="02020603050405020304" pitchFamily="18" charset="0"/>
-                <a:cs typeface="Times New Roman" panose="02020603050405020304" pitchFamily="18" charset="0"/>
-              </a:rPr>
-              <a:t>manieren</a:t>
-            </a:r>
-            <a:r>
-              <a:rPr lang="en-GB" dirty="0" smtClean="0">
-                <a:latin typeface="Times New Roman" panose="02020603050405020304" pitchFamily="18" charset="0"/>
-                <a:cs typeface="Times New Roman" panose="02020603050405020304" pitchFamily="18" charset="0"/>
-              </a:rPr>
-              <a:t> om het </a:t>
-            </a:r>
-            <a:r>
-              <a:rPr lang="en-GB" dirty="0" err="1" smtClean="0">
-                <a:latin typeface="Times New Roman" panose="02020603050405020304" pitchFamily="18" charset="0"/>
-                <a:cs typeface="Times New Roman" panose="02020603050405020304" pitchFamily="18" charset="0"/>
-              </a:rPr>
-              <a:t>genoom</a:t>
-            </a:r>
-            <a:r>
-              <a:rPr lang="en-GB" dirty="0" smtClean="0">
-                <a:latin typeface="Times New Roman" panose="02020603050405020304" pitchFamily="18" charset="0"/>
-                <a:cs typeface="Times New Roman" panose="02020603050405020304" pitchFamily="18" charset="0"/>
-              </a:rPr>
-              <a:t> </a:t>
-            </a:r>
-            <a:r>
-              <a:rPr lang="en-GB" dirty="0" err="1" smtClean="0">
-                <a:latin typeface="Times New Roman" panose="02020603050405020304" pitchFamily="18" charset="0"/>
-                <a:cs typeface="Times New Roman" panose="02020603050405020304" pitchFamily="18" charset="0"/>
-              </a:rPr>
-              <a:t>te</a:t>
-            </a:r>
-            <a:r>
-              <a:rPr lang="en-GB" dirty="0" smtClean="0">
-                <a:latin typeface="Times New Roman" panose="02020603050405020304" pitchFamily="18" charset="0"/>
-                <a:cs typeface="Times New Roman" panose="02020603050405020304" pitchFamily="18" charset="0"/>
-              </a:rPr>
-              <a:t> </a:t>
-            </a:r>
-            <a:r>
-              <a:rPr lang="en-GB" dirty="0" err="1" smtClean="0">
-                <a:latin typeface="Times New Roman" panose="02020603050405020304" pitchFamily="18" charset="0"/>
-                <a:cs typeface="Times New Roman" panose="02020603050405020304" pitchFamily="18" charset="0"/>
-              </a:rPr>
-              <a:t>muteren</a:t>
-            </a:r>
-            <a:endParaRPr lang="nl-NL" dirty="0">
+              <a:rPr lang="nl-NL" sz="2400" dirty="0" smtClean="0">
+                <a:solidFill>
+                  <a:schemeClr val="bg1">
+                    <a:lumMod val="65000"/>
+                  </a:schemeClr>
+                </a:solidFill>
+                <a:latin typeface="Times New Roman" panose="02020603050405020304" pitchFamily="18" charset="0"/>
+                <a:cs typeface="Times New Roman" panose="02020603050405020304" pitchFamily="18" charset="0"/>
+              </a:rPr>
+              <a:t>naar </a:t>
+            </a:r>
+            <a:r>
+              <a:rPr lang="nl-NL" sz="2400" i="1" dirty="0" smtClean="0">
+                <a:solidFill>
+                  <a:schemeClr val="bg1">
+                    <a:lumMod val="65000"/>
+                  </a:schemeClr>
+                </a:solidFill>
+                <a:latin typeface="Times New Roman" panose="02020603050405020304" pitchFamily="18" charset="0"/>
+                <a:cs typeface="Times New Roman" panose="02020603050405020304" pitchFamily="18" charset="0"/>
+              </a:rPr>
+              <a:t>D. </a:t>
+            </a:r>
+            <a:r>
+              <a:rPr lang="nl-NL" sz="2400" i="1" dirty="0" err="1" smtClean="0">
+                <a:solidFill>
+                  <a:schemeClr val="bg1">
+                    <a:lumMod val="65000"/>
+                  </a:schemeClr>
+                </a:solidFill>
+                <a:latin typeface="Times New Roman" panose="02020603050405020304" pitchFamily="18" charset="0"/>
+                <a:cs typeface="Times New Roman" panose="02020603050405020304" pitchFamily="18" charset="0"/>
+              </a:rPr>
+              <a:t>miranda</a:t>
+            </a:r>
+            <a:endParaRPr lang="nl-NL" sz="2400" i="1" dirty="0" smtClean="0">
+              <a:solidFill>
+                <a:schemeClr val="bg1">
+                  <a:lumMod val="65000"/>
+                </a:schemeClr>
+              </a:solidFill>
               <a:latin typeface="Times New Roman" panose="02020603050405020304" pitchFamily="18" charset="0"/>
               <a:cs typeface="Times New Roman" panose="02020603050405020304" pitchFamily="18" charset="0"/>
             </a:endParaRPr>
           </a:p>
           <a:p>
-            <a:pPr algn="ctr"/>
-            <a:endParaRPr lang="nl-NL" dirty="0">
+            <a:endParaRPr lang="nl-NL" sz="700" i="1" dirty="0" smtClean="0">
+              <a:solidFill>
+                <a:schemeClr val="bg1">
+                  <a:lumMod val="65000"/>
+                </a:schemeClr>
+              </a:solidFill>
               <a:latin typeface="Times New Roman" panose="02020603050405020304" pitchFamily="18" charset="0"/>
               <a:cs typeface="Times New Roman" panose="02020603050405020304" pitchFamily="18" charset="0"/>
             </a:endParaRPr>
           </a:p>
+          <a:p>
+            <a:r>
+              <a:rPr lang="nl-NL" sz="3600" dirty="0" smtClean="0">
+                <a:latin typeface="Times New Roman" panose="02020603050405020304" pitchFamily="18" charset="0"/>
+                <a:cs typeface="Times New Roman" panose="02020603050405020304" pitchFamily="18" charset="0"/>
+              </a:rPr>
+              <a:t>DEPTH FIRST</a:t>
+            </a:r>
+            <a:endParaRPr lang="nl-NL" sz="3600" dirty="0">
+              <a:latin typeface="Times New Roman" panose="02020603050405020304" pitchFamily="18" charset="0"/>
+              <a:cs typeface="Times New Roman" panose="02020603050405020304" pitchFamily="18" charset="0"/>
+            </a:endParaRPr>
+          </a:p>
         </p:txBody>
       </p:sp>
     </p:spTree>
     <p:extLst>
       <p:ext uri="{BB962C8B-B14F-4D97-AF65-F5344CB8AC3E}">
-        <p14:creationId xmlns:p14="http://schemas.microsoft.com/office/powerpoint/2010/main" val="2437181789"/>
+        <p14:creationId xmlns:p14="http://schemas.microsoft.com/office/powerpoint/2010/main" val="3491204467"/>
       </p:ext>
     </p:extLst>
   </p:cSld>
@@ -5460,91 +6762,6 @@
       </p:grpSpPr>
       <p:sp>
         <p:nvSpPr>
-          <p:cNvPr id="2" name="Titel 1"/>
-          <p:cNvSpPr>
-            <a:spLocks noGrp="1"/>
-          </p:cNvSpPr>
-          <p:nvPr>
-            <p:ph type="title"/>
-          </p:nvPr>
-        </p:nvSpPr>
-        <p:spPr>
-          <a:xfrm>
-            <a:off x="838200" y="365125"/>
-            <a:ext cx="5915525" cy="1325563"/>
-          </a:xfrm>
-        </p:spPr>
-        <p:txBody>
-          <a:bodyPr>
-            <a:noAutofit/>
-          </a:bodyPr>
-          <a:lstStyle/>
-          <a:p>
-            <a:r>
-              <a:rPr lang="nl-NL" dirty="0">
-                <a:latin typeface="Times New Roman" panose="02020603050405020304" pitchFamily="18" charset="0"/>
-                <a:cs typeface="Times New Roman" panose="02020603050405020304" pitchFamily="18" charset="0"/>
-              </a:rPr>
-              <a:t>v</a:t>
-            </a:r>
-            <a:r>
-              <a:rPr lang="nl-NL" dirty="0" smtClean="0">
-                <a:latin typeface="Times New Roman" panose="02020603050405020304" pitchFamily="18" charset="0"/>
-                <a:cs typeface="Times New Roman" panose="02020603050405020304" pitchFamily="18" charset="0"/>
-              </a:rPr>
-              <a:t>an </a:t>
-            </a:r>
-            <a:r>
-              <a:rPr lang="nl-NL" i="1" dirty="0" smtClean="0">
-                <a:latin typeface="Times New Roman" panose="02020603050405020304" pitchFamily="18" charset="0"/>
-                <a:cs typeface="Times New Roman" panose="02020603050405020304" pitchFamily="18" charset="0"/>
-              </a:rPr>
-              <a:t>D. </a:t>
-            </a:r>
-            <a:r>
-              <a:rPr lang="nl-NL" i="1" dirty="0" err="1" smtClean="0">
-                <a:latin typeface="Times New Roman" panose="02020603050405020304" pitchFamily="18" charset="0"/>
-                <a:cs typeface="Times New Roman" panose="02020603050405020304" pitchFamily="18" charset="0"/>
-              </a:rPr>
-              <a:t>melanogaster</a:t>
-            </a:r>
-            <a:r>
-              <a:rPr lang="nl-NL" i="1" dirty="0" smtClean="0">
-                <a:latin typeface="Times New Roman" panose="02020603050405020304" pitchFamily="18" charset="0"/>
-                <a:cs typeface="Times New Roman" panose="02020603050405020304" pitchFamily="18" charset="0"/>
-              </a:rPr>
-              <a:t> </a:t>
-            </a:r>
-            <a:r>
-              <a:rPr lang="nl-NL" dirty="0" smtClean="0">
-                <a:latin typeface="Times New Roman" panose="02020603050405020304" pitchFamily="18" charset="0"/>
-                <a:cs typeface="Times New Roman" panose="02020603050405020304" pitchFamily="18" charset="0"/>
-              </a:rPr>
-              <a:t>naar </a:t>
-            </a:r>
-            <a:r>
-              <a:rPr lang="nl-NL" i="1" dirty="0" smtClean="0">
-                <a:latin typeface="Times New Roman" panose="02020603050405020304" pitchFamily="18" charset="0"/>
-                <a:cs typeface="Times New Roman" panose="02020603050405020304" pitchFamily="18" charset="0"/>
-              </a:rPr>
-              <a:t>D. </a:t>
-            </a:r>
-            <a:r>
-              <a:rPr lang="nl-NL" i="1" dirty="0" err="1" smtClean="0">
-                <a:latin typeface="Times New Roman" panose="02020603050405020304" pitchFamily="18" charset="0"/>
-                <a:cs typeface="Times New Roman" panose="02020603050405020304" pitchFamily="18" charset="0"/>
-              </a:rPr>
-              <a:t>miranda</a:t>
-            </a:r>
-            <a:endParaRPr lang="nl-NL" dirty="0">
-              <a:latin typeface="Times New Roman" panose="02020603050405020304" pitchFamily="18" charset="0"/>
-              <a:cs typeface="Times New Roman" panose="02020603050405020304" pitchFamily="18" charset="0"/>
-            </a:endParaRPr>
-          </a:p>
-        </p:txBody>
-      </p:sp>
-      <p:sp>
-        <p:nvSpPr>
           <p:cNvPr id="5" name="Tijdelijke aanduiding voor inhoud 4"/>
           <p:cNvSpPr>
             <a:spLocks noGrp="1"/>
@@ -5555,8 +6772,8 @@
         </p:nvSpPr>
         <p:spPr>
           <a:xfrm>
-            <a:off x="838200" y="1825625"/>
-            <a:ext cx="5498432" cy="4351338"/>
+            <a:off x="838200" y="1825624"/>
+            <a:ext cx="5498432" cy="4857563"/>
           </a:xfrm>
         </p:spPr>
         <p:txBody>
@@ -5564,81 +6781,6 @@
             <a:normAutofit/>
           </a:bodyPr>
           <a:lstStyle/>
-          <a:p>
-            <a:r>
-              <a:rPr lang="nl-NL" dirty="0" smtClean="0">
-                <a:latin typeface="Times New Roman" panose="02020603050405020304" pitchFamily="18" charset="0"/>
-                <a:cs typeface="Times New Roman" panose="02020603050405020304" pitchFamily="18" charset="0"/>
-              </a:rPr>
-              <a:t>Algoritme loopt door de sequentie en flipt als het nodig is een deel van het genoom zodat het nummer op de gewenste plaats komt</a:t>
-            </a:r>
-          </a:p>
-          <a:p>
-            <a:endParaRPr lang="nl-NL" dirty="0" smtClean="0">
-              <a:latin typeface="Times New Roman" panose="02020603050405020304" pitchFamily="18" charset="0"/>
-              <a:cs typeface="Times New Roman" panose="02020603050405020304" pitchFamily="18" charset="0"/>
-            </a:endParaRPr>
-          </a:p>
-          <a:p>
-            <a:r>
-              <a:rPr lang="nl-NL" dirty="0" smtClean="0">
-                <a:latin typeface="Times New Roman" panose="02020603050405020304" pitchFamily="18" charset="0"/>
-                <a:cs typeface="Times New Roman" panose="02020603050405020304" pitchFamily="18" charset="0"/>
-              </a:rPr>
-              <a:t>Resultaat:</a:t>
-            </a:r>
-          </a:p>
-          <a:p>
-            <a:pPr marL="0" indent="0">
-              <a:buNone/>
-            </a:pPr>
-            <a:r>
-              <a:rPr lang="nl-NL" sz="2400" dirty="0" smtClean="0">
-                <a:latin typeface="Times New Roman" panose="02020603050405020304" pitchFamily="18" charset="0"/>
-                <a:cs typeface="Times New Roman" panose="02020603050405020304" pitchFamily="18" charset="0"/>
-              </a:rPr>
-              <a:t>Zonder heuristieken </a:t>
-            </a:r>
-            <a:r>
-              <a:rPr lang="nl-NL" sz="2400" b="1" dirty="0" smtClean="0">
-                <a:latin typeface="Times New Roman" panose="02020603050405020304" pitchFamily="18" charset="0"/>
-                <a:cs typeface="Times New Roman" panose="02020603050405020304" pitchFamily="18" charset="0"/>
-              </a:rPr>
-              <a:t>18 </a:t>
-            </a:r>
-            <a:r>
-              <a:rPr lang="nl-NL" sz="2400" b="1" dirty="0" err="1" smtClean="0">
-                <a:latin typeface="Times New Roman" panose="02020603050405020304" pitchFamily="18" charset="0"/>
-                <a:cs typeface="Times New Roman" panose="02020603050405020304" pitchFamily="18" charset="0"/>
-              </a:rPr>
-              <a:t>flips</a:t>
-            </a:r>
-            <a:r>
-              <a:rPr lang="nl-NL" sz="2400" b="1" dirty="0" smtClean="0">
-                <a:latin typeface="Times New Roman" panose="02020603050405020304" pitchFamily="18" charset="0"/>
-                <a:cs typeface="Times New Roman" panose="02020603050405020304" pitchFamily="18" charset="0"/>
-              </a:rPr>
-              <a:t> </a:t>
-            </a:r>
-            <a:r>
-              <a:rPr lang="nl-NL" sz="2400" dirty="0" smtClean="0">
-                <a:latin typeface="Times New Roman" panose="02020603050405020304" pitchFamily="18" charset="0"/>
-                <a:cs typeface="Times New Roman" panose="02020603050405020304" pitchFamily="18" charset="0"/>
-              </a:rPr>
-              <a:t>om van het ene genoom naar het andere genoom te komen. = </a:t>
-            </a:r>
-            <a:r>
-              <a:rPr lang="nl-NL" sz="2400" u="sng" dirty="0" smtClean="0">
-                <a:latin typeface="Times New Roman" panose="02020603050405020304" pitchFamily="18" charset="0"/>
-                <a:cs typeface="Times New Roman" panose="02020603050405020304" pitchFamily="18" charset="0"/>
-              </a:rPr>
-              <a:t>bovengrens! </a:t>
-            </a:r>
-            <a:endParaRPr lang="nl-NL" sz="2400" dirty="0" smtClean="0">
-              <a:latin typeface="Times New Roman" panose="02020603050405020304" pitchFamily="18" charset="0"/>
-              <a:cs typeface="Times New Roman" panose="02020603050405020304" pitchFamily="18" charset="0"/>
-            </a:endParaRPr>
-          </a:p>
           <a:p>
             <a:pPr marL="457200" lvl="1" indent="0">
               <a:buNone/>
@@ -5649,6 +6791,24 @@
             </a:endParaRPr>
           </a:p>
           <a:p>
+            <a:pPr marL="0" indent="0">
+              <a:buNone/>
+            </a:pPr>
+            <a:endParaRPr lang="nl-NL" sz="2400" b="1" dirty="0" smtClean="0">
+              <a:latin typeface="Times New Roman" panose="02020603050405020304" pitchFamily="18" charset="0"/>
+              <a:cs typeface="Times New Roman" panose="02020603050405020304" pitchFamily="18" charset="0"/>
+            </a:endParaRPr>
+          </a:p>
+          <a:p>
+            <a:pPr marL="0" indent="0">
+              <a:buNone/>
+            </a:pPr>
+            <a:endParaRPr lang="nl-NL" sz="2400" dirty="0" smtClean="0">
+              <a:latin typeface="Times New Roman" panose="02020603050405020304" pitchFamily="18" charset="0"/>
+              <a:cs typeface="Times New Roman" panose="02020603050405020304" pitchFamily="18" charset="0"/>
+            </a:endParaRPr>
+          </a:p>
+          <a:p>
             <a:pPr marL="457200" lvl="1" indent="0">
               <a:buNone/>
             </a:pPr>
@@ -5658,6 +6818,15 @@
             </a:endParaRPr>
           </a:p>
           <a:p>
+            <a:pPr marL="457200" lvl="1" indent="0">
+              <a:buNone/>
+            </a:pPr>
+            <a:endParaRPr lang="nl-NL" dirty="0" smtClean="0">
+              <a:latin typeface="Times New Roman" panose="02020603050405020304" pitchFamily="18" charset="0"/>
+              <a:cs typeface="Times New Roman" panose="02020603050405020304" pitchFamily="18" charset="0"/>
+            </a:endParaRPr>
+          </a:p>
+          <a:p>
             <a:pPr lvl="1"/>
             <a:endParaRPr lang="nl-NL" dirty="0">
               <a:latin typeface="Times New Roman" panose="02020603050405020304" pitchFamily="18" charset="0"/>
@@ -5666,63 +6835,518 @@
           </a:p>
         </p:txBody>
       </p:sp>
-      <p:pic>
-        <p:nvPicPr>
-          <p:cNvPr id="3" name="Afbeelding 2"/>
-          <p:cNvPicPr>
-            <a:picLocks noChangeAspect="1"/>
-          </p:cNvPicPr>
+      <p:sp>
+        <p:nvSpPr>
+          <p:cNvPr id="7" name="Titel 1"/>
+          <p:cNvSpPr txBox="1">
+            <a:spLocks/>
+          </p:cNvSpPr>
           <p:nvPr/>
-        </p:nvPicPr>
-        <p:blipFill rotWithShape="1">
-          <a:blip r:embed="rId2"/>
-          <a:srcRect l="54655" t="30245" r="25958" b="27577"/>
-          <a:stretch/>
-        </p:blipFill>
+        </p:nvSpPr>
         <p:spPr>
           <a:xfrm>
-            <a:off x="6753725" y="128336"/>
-            <a:ext cx="5502115" cy="6729663"/>
+            <a:off x="838200" y="365125"/>
+            <a:ext cx="5737412" cy="1325563"/>
           </a:xfrm>
           <a:prstGeom prst="rect">
             <a:avLst/>
           </a:prstGeom>
         </p:spPr>
-      </p:pic>
+        <p:txBody>
+          <a:bodyPr vert="horz" lIns="91440" tIns="45720" rIns="91440" bIns="45720" rtlCol="0" anchor="ctr">
+            <a:noAutofit/>
+          </a:bodyPr>
+          <a:lstStyle>
+            <a:lvl1pPr algn="l" defTabSz="914400" rtl="0" eaLnBrk="1" latinLnBrk="0" hangingPunct="1">
+              <a:lnSpc>
+                <a:spcPct val="90000"/>
+              </a:lnSpc>
+              <a:spcBef>
+                <a:spcPct val="0"/>
+              </a:spcBef>
+              <a:buNone/>
+              <a:defRPr sz="4400" kern="1200">
+                <a:solidFill>
+                  <a:schemeClr val="tx1"/>
+                </a:solidFill>
+                <a:latin typeface="+mj-lt"/>
+                <a:ea typeface="+mj-ea"/>
+                <a:cs typeface="+mj-cs"/>
+              </a:defRPr>
+            </a:lvl1pPr>
+          </a:lstStyle>
+          <a:p>
+            <a:r>
+              <a:rPr lang="nl-NL" sz="2400" dirty="0" smtClean="0">
+                <a:solidFill>
+                  <a:schemeClr val="bg1">
+                    <a:lumMod val="65000"/>
+                  </a:schemeClr>
+                </a:solidFill>
+                <a:latin typeface="Times New Roman" panose="02020603050405020304" pitchFamily="18" charset="0"/>
+                <a:cs typeface="Times New Roman" panose="02020603050405020304" pitchFamily="18" charset="0"/>
+              </a:rPr>
+              <a:t>van </a:t>
+            </a:r>
+            <a:r>
+              <a:rPr lang="nl-NL" sz="2400" i="1" dirty="0" smtClean="0">
+                <a:solidFill>
+                  <a:schemeClr val="bg1">
+                    <a:lumMod val="65000"/>
+                  </a:schemeClr>
+                </a:solidFill>
+                <a:latin typeface="Times New Roman" panose="02020603050405020304" pitchFamily="18" charset="0"/>
+                <a:cs typeface="Times New Roman" panose="02020603050405020304" pitchFamily="18" charset="0"/>
+              </a:rPr>
+              <a:t>D. </a:t>
+            </a:r>
+            <a:r>
+              <a:rPr lang="nl-NL" sz="2400" i="1" dirty="0" err="1" smtClean="0">
+                <a:solidFill>
+                  <a:schemeClr val="bg1">
+                    <a:lumMod val="65000"/>
+                  </a:schemeClr>
+                </a:solidFill>
+                <a:latin typeface="Times New Roman" panose="02020603050405020304" pitchFamily="18" charset="0"/>
+                <a:cs typeface="Times New Roman" panose="02020603050405020304" pitchFamily="18" charset="0"/>
+              </a:rPr>
+              <a:t>melanogaster</a:t>
+            </a:r>
+            <a:r>
+              <a:rPr lang="nl-NL" sz="2400" i="1" dirty="0" smtClean="0">
+                <a:solidFill>
+                  <a:schemeClr val="bg1">
+                    <a:lumMod val="65000"/>
+                  </a:schemeClr>
+                </a:solidFill>
+                <a:latin typeface="Times New Roman" panose="02020603050405020304" pitchFamily="18" charset="0"/>
+                <a:cs typeface="Times New Roman" panose="02020603050405020304" pitchFamily="18" charset="0"/>
+              </a:rPr>
+              <a:t> </a:t>
+            </a:r>
+            <a:r>
+              <a:rPr lang="nl-NL" sz="2400" dirty="0" smtClean="0">
+                <a:solidFill>
+                  <a:schemeClr val="bg1">
+                    <a:lumMod val="65000"/>
+                  </a:schemeClr>
+                </a:solidFill>
+                <a:latin typeface="Times New Roman" panose="02020603050405020304" pitchFamily="18" charset="0"/>
+                <a:cs typeface="Times New Roman" panose="02020603050405020304" pitchFamily="18" charset="0"/>
+              </a:rPr>
+              <a:t>naar </a:t>
+            </a:r>
+            <a:r>
+              <a:rPr lang="nl-NL" sz="2400" i="1" dirty="0" smtClean="0">
+                <a:solidFill>
+                  <a:schemeClr val="bg1">
+                    <a:lumMod val="65000"/>
+                  </a:schemeClr>
+                </a:solidFill>
+                <a:latin typeface="Times New Roman" panose="02020603050405020304" pitchFamily="18" charset="0"/>
+                <a:cs typeface="Times New Roman" panose="02020603050405020304" pitchFamily="18" charset="0"/>
+              </a:rPr>
+              <a:t>D. </a:t>
+            </a:r>
+            <a:r>
+              <a:rPr lang="nl-NL" sz="2400" i="1" dirty="0" err="1" smtClean="0">
+                <a:solidFill>
+                  <a:schemeClr val="bg1">
+                    <a:lumMod val="65000"/>
+                  </a:schemeClr>
+                </a:solidFill>
+                <a:latin typeface="Times New Roman" panose="02020603050405020304" pitchFamily="18" charset="0"/>
+                <a:cs typeface="Times New Roman" panose="02020603050405020304" pitchFamily="18" charset="0"/>
+              </a:rPr>
+              <a:t>miranda</a:t>
+            </a:r>
+            <a:endParaRPr lang="nl-NL" sz="2400" i="1" dirty="0" smtClean="0">
+              <a:solidFill>
+                <a:schemeClr val="bg1">
+                  <a:lumMod val="65000"/>
+                </a:schemeClr>
+              </a:solidFill>
+              <a:latin typeface="Times New Roman" panose="02020603050405020304" pitchFamily="18" charset="0"/>
+              <a:cs typeface="Times New Roman" panose="02020603050405020304" pitchFamily="18" charset="0"/>
+            </a:endParaRPr>
+          </a:p>
+          <a:p>
+            <a:endParaRPr lang="nl-NL" sz="700" i="1" dirty="0" smtClean="0">
+              <a:solidFill>
+                <a:schemeClr val="bg1">
+                  <a:lumMod val="65000"/>
+                </a:schemeClr>
+              </a:solidFill>
+              <a:latin typeface="Times New Roman" panose="02020603050405020304" pitchFamily="18" charset="0"/>
+              <a:cs typeface="Times New Roman" panose="02020603050405020304" pitchFamily="18" charset="0"/>
+            </a:endParaRPr>
+          </a:p>
+          <a:p>
+            <a:r>
+              <a:rPr lang="nl-NL" sz="3600" dirty="0" smtClean="0">
+                <a:latin typeface="Times New Roman" panose="02020603050405020304" pitchFamily="18" charset="0"/>
+                <a:cs typeface="Times New Roman" panose="02020603050405020304" pitchFamily="18" charset="0"/>
+              </a:rPr>
+              <a:t>BREADTH FIRST</a:t>
+            </a:r>
+            <a:endParaRPr lang="nl-NL" sz="3600" dirty="0">
+              <a:latin typeface="Times New Roman" panose="02020603050405020304" pitchFamily="18" charset="0"/>
+              <a:cs typeface="Times New Roman" panose="02020603050405020304" pitchFamily="18" charset="0"/>
+            </a:endParaRPr>
+          </a:p>
+        </p:txBody>
+      </p:sp>
       <p:pic>
         <p:nvPicPr>
-          <p:cNvPr id="6" name="Picture 5"/>
+          <p:cNvPr id="9" name="Picture 4" descr="Afbeeldingsresultaat voor drosophila"/>
           <p:cNvPicPr>
-            <a:picLocks noChangeAspect="1"/>
+            <a:picLocks noChangeAspect="1" noChangeArrowheads="1"/>
           </p:cNvPicPr>
           <p:nvPr/>
         </p:nvPicPr>
         <p:blipFill>
-          <a:blip r:embed="rId3">
+          <a:blip r:embed="rId2" cstate="print">
             <a:extLst>
               <a:ext uri="{28A0092B-C50C-407E-A947-70E740481C1C}">
                 <a14:useLocalDpi xmlns:a14="http://schemas.microsoft.com/office/drawing/2010/main" val="0"/>
               </a:ext>
             </a:extLst>
           </a:blip>
+          <a:srcRect/>
           <a:stretch>
             <a:fillRect/>
           </a:stretch>
         </p:blipFill>
-        <p:spPr>
-          <a:xfrm>
-            <a:off x="6711782" y="64167"/>
-            <a:ext cx="5544058" cy="6858000"/>
+        <p:spPr bwMode="auto">
+          <a:xfrm rot="10587801">
+            <a:off x="1381897" y="75651"/>
+            <a:ext cx="570291" cy="393404"/>
           </a:xfrm>
           <a:prstGeom prst="rect">
             <a:avLst/>
           </a:prstGeom>
+          <a:noFill/>
+          <a:extLst>
+            <a:ext uri="{909E8E84-426E-40DD-AFC4-6F175D3DCCD1}">
+              <a14:hiddenFill xmlns:a14="http://schemas.microsoft.com/office/drawing/2010/main">
+                <a:solidFill>
+                  <a:srgbClr val="FFFFFF"/>
+                </a:solidFill>
+              </a14:hiddenFill>
+            </a:ext>
+          </a:extLst>
         </p:spPr>
       </p:pic>
+      <p:pic>
+        <p:nvPicPr>
+          <p:cNvPr id="10" name="Picture 4" descr="Afbeeldingsresultaat voor drosophila"/>
+          <p:cNvPicPr>
+            <a:picLocks noChangeAspect="1" noChangeArrowheads="1"/>
+          </p:cNvPicPr>
+          <p:nvPr/>
+        </p:nvPicPr>
+        <p:blipFill>
+          <a:blip r:embed="rId3" cstate="print">
+            <a:extLst>
+              <a:ext uri="{28A0092B-C50C-407E-A947-70E740481C1C}">
+                <a14:useLocalDpi xmlns:a14="http://schemas.microsoft.com/office/drawing/2010/main" val="0"/>
+              </a:ext>
+            </a:extLst>
+          </a:blip>
+          <a:srcRect/>
+          <a:stretch>
+            <a:fillRect/>
+          </a:stretch>
+        </p:blipFill>
+        <p:spPr bwMode="auto">
+          <a:xfrm rot="17994461">
+            <a:off x="4610584" y="1121479"/>
+            <a:ext cx="669972" cy="462167"/>
+          </a:xfrm>
+          <a:prstGeom prst="rect">
+            <a:avLst/>
+          </a:prstGeom>
+          <a:noFill/>
+          <a:extLst>
+            <a:ext uri="{909E8E84-426E-40DD-AFC4-6F175D3DCCD1}">
+              <a14:hiddenFill xmlns:a14="http://schemas.microsoft.com/office/drawing/2010/main">
+                <a:solidFill>
+                  <a:srgbClr val="FFFFFF"/>
+                </a:solidFill>
+              </a14:hiddenFill>
+            </a:ext>
+          </a:extLst>
+        </p:spPr>
+      </p:pic>
+      <p:sp>
+        <p:nvSpPr>
+          <p:cNvPr id="12" name="Tijdelijke aanduiding voor inhoud 4"/>
+          <p:cNvSpPr txBox="1">
+            <a:spLocks/>
+          </p:cNvSpPr>
+          <p:nvPr/>
+        </p:nvSpPr>
+        <p:spPr>
+          <a:xfrm>
+            <a:off x="990600" y="1978024"/>
+            <a:ext cx="5498432" cy="4857563"/>
+          </a:xfrm>
+          <a:prstGeom prst="rect">
+            <a:avLst/>
+          </a:prstGeom>
+        </p:spPr>
+        <p:txBody>
+          <a:bodyPr vert="horz" lIns="91440" tIns="45720" rIns="91440" bIns="45720" rtlCol="0">
+            <a:normAutofit/>
+          </a:bodyPr>
+          <a:lstStyle>
+            <a:lvl1pPr marL="228600" indent="-228600" algn="l" defTabSz="914400" rtl="0" eaLnBrk="1" latinLnBrk="0" hangingPunct="1">
+              <a:lnSpc>
+                <a:spcPct val="90000"/>
+              </a:lnSpc>
+              <a:spcBef>
+                <a:spcPts val="1000"/>
+              </a:spcBef>
+              <a:buFont typeface="Arial" panose="020B0604020202020204" pitchFamily="34" charset="0"/>
+              <a:buChar char="•"/>
+              <a:defRPr sz="2800" kern="1200">
+                <a:solidFill>
+                  <a:schemeClr val="tx1"/>
+                </a:solidFill>
+                <a:latin typeface="+mn-lt"/>
+                <a:ea typeface="+mn-ea"/>
+                <a:cs typeface="+mn-cs"/>
+              </a:defRPr>
+            </a:lvl1pPr>
+            <a:lvl2pPr marL="685800" indent="-228600" algn="l" defTabSz="914400" rtl="0" eaLnBrk="1" latinLnBrk="0" hangingPunct="1">
+              <a:lnSpc>
+                <a:spcPct val="90000"/>
+              </a:lnSpc>
+              <a:spcBef>
+                <a:spcPts val="500"/>
+              </a:spcBef>
+              <a:buFont typeface="Arial" panose="020B0604020202020204" pitchFamily="34" charset="0"/>
+              <a:buChar char="•"/>
+              <a:defRPr sz="2400" kern="1200">
+                <a:solidFill>
+                  <a:schemeClr val="tx1"/>
+                </a:solidFill>
+                <a:latin typeface="+mn-lt"/>
+                <a:ea typeface="+mn-ea"/>
+                <a:cs typeface="+mn-cs"/>
+              </a:defRPr>
+            </a:lvl2pPr>
+            <a:lvl3pPr marL="1143000" indent="-228600" algn="l" defTabSz="914400" rtl="0" eaLnBrk="1" latinLnBrk="0" hangingPunct="1">
+              <a:lnSpc>
+                <a:spcPct val="90000"/>
+              </a:lnSpc>
+              <a:spcBef>
+                <a:spcPts val="500"/>
+              </a:spcBef>
+              <a:buFont typeface="Arial" panose="020B0604020202020204" pitchFamily="34" charset="0"/>
+              <a:buChar char="•"/>
+              <a:defRPr sz="2000" kern="1200">
+                <a:solidFill>
+                  <a:schemeClr val="tx1"/>
+                </a:solidFill>
+                <a:latin typeface="+mn-lt"/>
+                <a:ea typeface="+mn-ea"/>
+                <a:cs typeface="+mn-cs"/>
+              </a:defRPr>
+            </a:lvl3pPr>
+            <a:lvl4pPr marL="1600200" indent="-228600" algn="l" defTabSz="914400" rtl="0" eaLnBrk="1" latinLnBrk="0" hangingPunct="1">
+              <a:lnSpc>
+                <a:spcPct val="90000"/>
+              </a:lnSpc>
+              <a:spcBef>
+                <a:spcPts val="500"/>
+              </a:spcBef>
+              <a:buFont typeface="Arial" panose="020B0604020202020204" pitchFamily="34" charset="0"/>
+              <a:buChar char="•"/>
+              <a:defRPr sz="1800" kern="1200">
+                <a:solidFill>
+                  <a:schemeClr val="tx1"/>
+                </a:solidFill>
+                <a:latin typeface="+mn-lt"/>
+                <a:ea typeface="+mn-ea"/>
+                <a:cs typeface="+mn-cs"/>
+              </a:defRPr>
+            </a:lvl4pPr>
+            <a:lvl5pPr marL="2057400" indent="-228600" algn="l" defTabSz="914400" rtl="0" eaLnBrk="1" latinLnBrk="0" hangingPunct="1">
+              <a:lnSpc>
+                <a:spcPct val="90000"/>
+              </a:lnSpc>
+              <a:spcBef>
+                <a:spcPts val="500"/>
+              </a:spcBef>
+              <a:buFont typeface="Arial" panose="020B0604020202020204" pitchFamily="34" charset="0"/>
+              <a:buChar char="•"/>
+              <a:defRPr sz="1800" kern="1200">
+                <a:solidFill>
+                  <a:schemeClr val="tx1"/>
+                </a:solidFill>
+                <a:latin typeface="+mn-lt"/>
+                <a:ea typeface="+mn-ea"/>
+                <a:cs typeface="+mn-cs"/>
+              </a:defRPr>
+            </a:lvl5pPr>
+            <a:lvl6pPr marL="2514600" indent="-228600" algn="l" defTabSz="914400" rtl="0" eaLnBrk="1" latinLnBrk="0" hangingPunct="1">
+              <a:lnSpc>
+                <a:spcPct val="90000"/>
+              </a:lnSpc>
+              <a:spcBef>
+                <a:spcPts val="500"/>
+              </a:spcBef>
+              <a:buFont typeface="Arial" panose="020B0604020202020204" pitchFamily="34" charset="0"/>
+              <a:buChar char="•"/>
+              <a:defRPr sz="1800" kern="1200">
+                <a:solidFill>
+                  <a:schemeClr val="tx1"/>
+                </a:solidFill>
+                <a:latin typeface="+mn-lt"/>
+                <a:ea typeface="+mn-ea"/>
+                <a:cs typeface="+mn-cs"/>
+              </a:defRPr>
+            </a:lvl6pPr>
+            <a:lvl7pPr marL="2971800" indent="-228600" algn="l" defTabSz="914400" rtl="0" eaLnBrk="1" latinLnBrk="0" hangingPunct="1">
+              <a:lnSpc>
+                <a:spcPct val="90000"/>
+              </a:lnSpc>
+              <a:spcBef>
+                <a:spcPts val="500"/>
+              </a:spcBef>
+              <a:buFont typeface="Arial" panose="020B0604020202020204" pitchFamily="34" charset="0"/>
+              <a:buChar char="•"/>
+              <a:defRPr sz="1800" kern="1200">
+                <a:solidFill>
+                  <a:schemeClr val="tx1"/>
+                </a:solidFill>
+                <a:latin typeface="+mn-lt"/>
+                <a:ea typeface="+mn-ea"/>
+                <a:cs typeface="+mn-cs"/>
+              </a:defRPr>
+            </a:lvl7pPr>
+            <a:lvl8pPr marL="3429000" indent="-228600" algn="l" defTabSz="914400" rtl="0" eaLnBrk="1" latinLnBrk="0" hangingPunct="1">
+              <a:lnSpc>
+                <a:spcPct val="90000"/>
+              </a:lnSpc>
+              <a:spcBef>
+                <a:spcPts val="500"/>
+              </a:spcBef>
+              <a:buFont typeface="Arial" panose="020B0604020202020204" pitchFamily="34" charset="0"/>
+              <a:buChar char="•"/>
+              <a:defRPr sz="1800" kern="1200">
+                <a:solidFill>
+                  <a:schemeClr val="tx1"/>
+                </a:solidFill>
+                <a:latin typeface="+mn-lt"/>
+                <a:ea typeface="+mn-ea"/>
+                <a:cs typeface="+mn-cs"/>
+              </a:defRPr>
+            </a:lvl8pPr>
+            <a:lvl9pPr marL="3886200" indent="-228600" algn="l" defTabSz="914400" rtl="0" eaLnBrk="1" latinLnBrk="0" hangingPunct="1">
+              <a:lnSpc>
+                <a:spcPct val="90000"/>
+              </a:lnSpc>
+              <a:spcBef>
+                <a:spcPts val="500"/>
+              </a:spcBef>
+              <a:buFont typeface="Arial" panose="020B0604020202020204" pitchFamily="34" charset="0"/>
+              <a:buChar char="•"/>
+              <a:defRPr sz="1800" kern="1200">
+                <a:solidFill>
+                  <a:schemeClr val="tx1"/>
+                </a:solidFill>
+                <a:latin typeface="+mn-lt"/>
+                <a:ea typeface="+mn-ea"/>
+                <a:cs typeface="+mn-cs"/>
+              </a:defRPr>
+            </a:lvl9pPr>
+          </a:lstStyle>
+          <a:p>
+            <a:pPr marL="0" indent="0">
+              <a:buFont typeface="Arial" panose="020B0604020202020204" pitchFamily="34" charset="0"/>
+              <a:buNone/>
+            </a:pPr>
+            <a:r>
+              <a:rPr lang="nl-NL" sz="2400" dirty="0" smtClean="0">
+                <a:latin typeface="Times New Roman" panose="02020603050405020304" pitchFamily="18" charset="0"/>
+                <a:cs typeface="Times New Roman" panose="02020603050405020304" pitchFamily="18" charset="0"/>
+              </a:rPr>
+              <a:t>Hallo </a:t>
+            </a:r>
+            <a:r>
+              <a:rPr lang="nl-NL" sz="2400" dirty="0" err="1" smtClean="0">
+                <a:latin typeface="Times New Roman" panose="02020603050405020304" pitchFamily="18" charset="0"/>
+                <a:cs typeface="Times New Roman" panose="02020603050405020304" pitchFamily="18" charset="0"/>
+              </a:rPr>
+              <a:t>lhalahdalhdah</a:t>
+            </a:r>
+            <a:r>
+              <a:rPr lang="nl-NL" sz="2400" dirty="0" smtClean="0">
+                <a:latin typeface="Times New Roman" panose="02020603050405020304" pitchFamily="18" charset="0"/>
+                <a:cs typeface="Times New Roman" panose="02020603050405020304" pitchFamily="18" charset="0"/>
+              </a:rPr>
+              <a:t> </a:t>
+            </a:r>
+            <a:r>
+              <a:rPr lang="nl-NL" sz="2400" dirty="0" err="1" smtClean="0">
+                <a:latin typeface="Times New Roman" panose="02020603050405020304" pitchFamily="18" charset="0"/>
+                <a:cs typeface="Times New Roman" panose="02020603050405020304" pitchFamily="18" charset="0"/>
+              </a:rPr>
+              <a:t>lhadsalhd</a:t>
+            </a:r>
+            <a:endParaRPr lang="nl-NL" sz="2400" b="1" dirty="0" smtClean="0">
+              <a:solidFill>
+                <a:srgbClr val="FFC000"/>
+              </a:solidFill>
+              <a:latin typeface="Times New Roman" panose="02020603050405020304" pitchFamily="18" charset="0"/>
+              <a:cs typeface="Times New Roman" panose="02020603050405020304" pitchFamily="18" charset="0"/>
+            </a:endParaRPr>
+          </a:p>
+          <a:p>
+            <a:pPr marL="0" indent="0">
+              <a:buFont typeface="Arial" panose="020B0604020202020204" pitchFamily="34" charset="0"/>
+              <a:buNone/>
+            </a:pPr>
+            <a:endParaRPr lang="nl-NL" sz="2400" dirty="0" smtClean="0">
+              <a:latin typeface="Times New Roman" panose="02020603050405020304" pitchFamily="18" charset="0"/>
+              <a:cs typeface="Times New Roman" panose="02020603050405020304" pitchFamily="18" charset="0"/>
+            </a:endParaRPr>
+          </a:p>
+          <a:p>
+            <a:pPr marL="457200" lvl="1" indent="0">
+              <a:buFont typeface="Arial" panose="020B0604020202020204" pitchFamily="34" charset="0"/>
+              <a:buNone/>
+            </a:pPr>
+            <a:endParaRPr lang="nl-NL" dirty="0" smtClean="0">
+              <a:latin typeface="Times New Roman" panose="02020603050405020304" pitchFamily="18" charset="0"/>
+              <a:cs typeface="Times New Roman" panose="02020603050405020304" pitchFamily="18" charset="0"/>
+            </a:endParaRPr>
+          </a:p>
+          <a:p>
+            <a:pPr marL="457200" lvl="1" indent="0">
+              <a:buFont typeface="Arial" panose="020B0604020202020204" pitchFamily="34" charset="0"/>
+              <a:buNone/>
+            </a:pPr>
+            <a:endParaRPr lang="nl-NL" dirty="0" smtClean="0">
+              <a:latin typeface="Times New Roman" panose="02020603050405020304" pitchFamily="18" charset="0"/>
+              <a:cs typeface="Times New Roman" panose="02020603050405020304" pitchFamily="18" charset="0"/>
+            </a:endParaRPr>
+          </a:p>
+          <a:p>
+            <a:pPr lvl="1"/>
+            <a:endParaRPr lang="nl-NL" dirty="0">
+              <a:latin typeface="Times New Roman" panose="02020603050405020304" pitchFamily="18" charset="0"/>
+              <a:cs typeface="Times New Roman" panose="02020603050405020304" pitchFamily="18" charset="0"/>
+            </a:endParaRPr>
+          </a:p>
+        </p:txBody>
+      </p:sp>
     </p:spTree>
     <p:extLst>
       <p:ext uri="{BB962C8B-B14F-4D97-AF65-F5344CB8AC3E}">
-        <p14:creationId xmlns:p14="http://schemas.microsoft.com/office/powerpoint/2010/main" val="523632840"/>
+        <p14:creationId xmlns:p14="http://schemas.microsoft.com/office/powerpoint/2010/main" val="1067727123"/>
       </p:ext>
     </p:extLst>
   </p:cSld>
@@ -5758,470 +7382,27 @@
       </p:grpSpPr>
       <p:sp>
         <p:nvSpPr>
-          <p:cNvPr id="2" name="Titel 1"/>
+          <p:cNvPr id="5" name="Tijdelijke aanduiding voor inhoud 4"/>
           <p:cNvSpPr>
             <a:spLocks noGrp="1"/>
           </p:cNvSpPr>
           <p:nvPr>
-            <p:ph type="title"/>
+            <p:ph idx="1"/>
           </p:nvPr>
         </p:nvSpPr>
         <p:spPr>
           <a:xfrm>
-            <a:off x="838200" y="365125"/>
-            <a:ext cx="5915525" cy="1325563"/>
+            <a:off x="838200" y="1825624"/>
+            <a:ext cx="5498432" cy="4857563"/>
           </a:xfrm>
         </p:spPr>
         <p:txBody>
           <a:bodyPr>
-            <a:noAutofit/>
+            <a:normAutofit/>
           </a:bodyPr>
           <a:lstStyle/>
           <a:p>
-            <a:r>
-              <a:rPr lang="nl-NL" dirty="0" smtClean="0">
-                <a:latin typeface="Times New Roman" panose="02020603050405020304" pitchFamily="18" charset="0"/>
-                <a:cs typeface="Times New Roman" panose="02020603050405020304" pitchFamily="18" charset="0"/>
-              </a:rPr>
-              <a:t>Grote mutaties zijn onwaarschijnlijk </a:t>
-            </a:r>
-            <a:endParaRPr lang="nl-NL" dirty="0">
-              <a:latin typeface="Times New Roman" panose="02020603050405020304" pitchFamily="18" charset="0"/>
-              <a:cs typeface="Times New Roman" panose="02020603050405020304" pitchFamily="18" charset="0"/>
-            </a:endParaRPr>
-          </a:p>
-        </p:txBody>
-      </p:sp>
-      <p:pic>
-        <p:nvPicPr>
-          <p:cNvPr id="3" name="Afbeelding 2"/>
-          <p:cNvPicPr>
-            <a:picLocks noChangeAspect="1"/>
-          </p:cNvPicPr>
-          <p:nvPr/>
-        </p:nvPicPr>
-        <p:blipFill rotWithShape="1">
-          <a:blip r:embed="rId2"/>
-          <a:srcRect l="54655" t="30245" r="25958" b="27577"/>
-          <a:stretch/>
-        </p:blipFill>
-        <p:spPr>
-          <a:xfrm>
-            <a:off x="6753725" y="128336"/>
-            <a:ext cx="5502115" cy="6729663"/>
-          </a:xfrm>
-          <a:prstGeom prst="rect">
-            <a:avLst/>
-          </a:prstGeom>
-        </p:spPr>
-      </p:pic>
-      <p:cxnSp>
-        <p:nvCxnSpPr>
-          <p:cNvPr id="6" name="Rechte verbindingslijn 5"/>
-          <p:cNvCxnSpPr/>
-          <p:nvPr/>
-        </p:nvCxnSpPr>
-        <p:spPr>
-          <a:xfrm flipH="1">
-            <a:off x="9208168" y="1825625"/>
-            <a:ext cx="401053" cy="0"/>
-          </a:xfrm>
-          <a:prstGeom prst="line">
-            <a:avLst/>
-          </a:prstGeom>
-          <a:ln w="38100">
-            <a:solidFill>
-              <a:srgbClr val="FF0000"/>
-            </a:solidFill>
-          </a:ln>
-        </p:spPr>
-        <p:style>
-          <a:lnRef idx="1">
-            <a:schemeClr val="accent1"/>
-          </a:lnRef>
-          <a:fillRef idx="0">
-            <a:schemeClr val="accent1"/>
-          </a:fillRef>
-          <a:effectRef idx="0">
-            <a:schemeClr val="accent1"/>
-          </a:effectRef>
-          <a:fontRef idx="minor">
-            <a:schemeClr val="tx1"/>
-          </a:fontRef>
-        </p:style>
-      </p:cxnSp>
-      <p:cxnSp>
-        <p:nvCxnSpPr>
-          <p:cNvPr id="7" name="Rechte verbindingslijn 6"/>
-          <p:cNvCxnSpPr/>
-          <p:nvPr/>
-        </p:nvCxnSpPr>
-        <p:spPr>
-          <a:xfrm flipH="1">
-            <a:off x="9208168" y="2122404"/>
-            <a:ext cx="401053" cy="0"/>
-          </a:xfrm>
-          <a:prstGeom prst="line">
-            <a:avLst/>
-          </a:prstGeom>
-          <a:ln w="38100">
-            <a:solidFill>
-              <a:srgbClr val="FF0000"/>
-            </a:solidFill>
-          </a:ln>
-        </p:spPr>
-        <p:style>
-          <a:lnRef idx="1">
-            <a:schemeClr val="accent1"/>
-          </a:lnRef>
-          <a:fillRef idx="0">
-            <a:schemeClr val="accent1"/>
-          </a:fillRef>
-          <a:effectRef idx="0">
-            <a:schemeClr val="accent1"/>
-          </a:effectRef>
-          <a:fontRef idx="minor">
-            <a:schemeClr val="tx1"/>
-          </a:fontRef>
-        </p:style>
-      </p:cxnSp>
-      <p:cxnSp>
-        <p:nvCxnSpPr>
-          <p:cNvPr id="8" name="Rechte verbindingslijn 7"/>
-          <p:cNvCxnSpPr/>
-          <p:nvPr/>
-        </p:nvCxnSpPr>
-        <p:spPr>
-          <a:xfrm flipH="1">
-            <a:off x="9208168" y="3710572"/>
-            <a:ext cx="401053" cy="0"/>
-          </a:xfrm>
-          <a:prstGeom prst="line">
-            <a:avLst/>
-          </a:prstGeom>
-          <a:ln w="38100">
-            <a:solidFill>
-              <a:srgbClr val="FF0000"/>
-            </a:solidFill>
-          </a:ln>
-        </p:spPr>
-        <p:style>
-          <a:lnRef idx="1">
-            <a:schemeClr val="accent1"/>
-          </a:lnRef>
-          <a:fillRef idx="0">
-            <a:schemeClr val="accent1"/>
-          </a:fillRef>
-          <a:effectRef idx="0">
-            <a:schemeClr val="accent1"/>
-          </a:effectRef>
-          <a:fontRef idx="minor">
-            <a:schemeClr val="tx1"/>
-          </a:fontRef>
-        </p:style>
-      </p:cxnSp>
-      <p:sp>
-        <p:nvSpPr>
-          <p:cNvPr id="9" name="Tijdelijke aanduiding voor inhoud 4"/>
-          <p:cNvSpPr txBox="1">
-            <a:spLocks/>
-          </p:cNvSpPr>
-          <p:nvPr/>
-        </p:nvSpPr>
-        <p:spPr>
-          <a:xfrm>
-            <a:off x="990600" y="1978025"/>
-            <a:ext cx="5498432" cy="4351338"/>
-          </a:xfrm>
-          <a:prstGeom prst="rect">
-            <a:avLst/>
-          </a:prstGeom>
-        </p:spPr>
-        <p:txBody>
-          <a:bodyPr vert="horz" lIns="91440" tIns="45720" rIns="91440" bIns="45720" rtlCol="0">
-            <a:normAutofit/>
-          </a:bodyPr>
-          <a:lstStyle>
-            <a:lvl1pPr marL="228600" indent="-228600" algn="l" defTabSz="914400" rtl="0" eaLnBrk="1" latinLnBrk="0" hangingPunct="1">
-              <a:lnSpc>
-                <a:spcPct val="90000"/>
-              </a:lnSpc>
-              <a:spcBef>
-                <a:spcPts val="1000"/>
-              </a:spcBef>
-              <a:buFont typeface="Arial" panose="020B0604020202020204" pitchFamily="34" charset="0"/>
-              <a:buChar char="•"/>
-              <a:defRPr sz="2800" kern="1200">
-                <a:solidFill>
-                  <a:schemeClr val="tx1"/>
-                </a:solidFill>
-                <a:latin typeface="+mn-lt"/>
-                <a:ea typeface="+mn-ea"/>
-                <a:cs typeface="+mn-cs"/>
-              </a:defRPr>
-            </a:lvl1pPr>
-            <a:lvl2pPr marL="685800" indent="-228600" algn="l" defTabSz="914400" rtl="0" eaLnBrk="1" latinLnBrk="0" hangingPunct="1">
-              <a:lnSpc>
-                <a:spcPct val="90000"/>
-              </a:lnSpc>
-              <a:spcBef>
-                <a:spcPts val="500"/>
-              </a:spcBef>
-              <a:buFont typeface="Arial" panose="020B0604020202020204" pitchFamily="34" charset="0"/>
-              <a:buChar char="•"/>
-              <a:defRPr sz="2400" kern="1200">
-                <a:solidFill>
-                  <a:schemeClr val="tx1"/>
-                </a:solidFill>
-                <a:latin typeface="+mn-lt"/>
-                <a:ea typeface="+mn-ea"/>
-                <a:cs typeface="+mn-cs"/>
-              </a:defRPr>
-            </a:lvl2pPr>
-            <a:lvl3pPr marL="1143000" indent="-228600" algn="l" defTabSz="914400" rtl="0" eaLnBrk="1" latinLnBrk="0" hangingPunct="1">
-              <a:lnSpc>
-                <a:spcPct val="90000"/>
-              </a:lnSpc>
-              <a:spcBef>
-                <a:spcPts val="500"/>
-              </a:spcBef>
-              <a:buFont typeface="Arial" panose="020B0604020202020204" pitchFamily="34" charset="0"/>
-              <a:buChar char="•"/>
-              <a:defRPr sz="2000" kern="1200">
-                <a:solidFill>
-                  <a:schemeClr val="tx1"/>
-                </a:solidFill>
-                <a:latin typeface="+mn-lt"/>
-                <a:ea typeface="+mn-ea"/>
-                <a:cs typeface="+mn-cs"/>
-              </a:defRPr>
-            </a:lvl3pPr>
-            <a:lvl4pPr marL="1600200" indent="-228600" algn="l" defTabSz="914400" rtl="0" eaLnBrk="1" latinLnBrk="0" hangingPunct="1">
-              <a:lnSpc>
-                <a:spcPct val="90000"/>
-              </a:lnSpc>
-              <a:spcBef>
-                <a:spcPts val="500"/>
-              </a:spcBef>
-              <a:buFont typeface="Arial" panose="020B0604020202020204" pitchFamily="34" charset="0"/>
-              <a:buChar char="•"/>
-              <a:defRPr sz="1800" kern="1200">
-                <a:solidFill>
-                  <a:schemeClr val="tx1"/>
-                </a:solidFill>
-                <a:latin typeface="+mn-lt"/>
-                <a:ea typeface="+mn-ea"/>
-                <a:cs typeface="+mn-cs"/>
-              </a:defRPr>
-            </a:lvl4pPr>
-            <a:lvl5pPr marL="2057400" indent="-228600" algn="l" defTabSz="914400" rtl="0" eaLnBrk="1" latinLnBrk="0" hangingPunct="1">
-              <a:lnSpc>
-                <a:spcPct val="90000"/>
-              </a:lnSpc>
-              <a:spcBef>
-                <a:spcPts val="500"/>
-              </a:spcBef>
-              <a:buFont typeface="Arial" panose="020B0604020202020204" pitchFamily="34" charset="0"/>
-              <a:buChar char="•"/>
-              <a:defRPr sz="1800" kern="1200">
-                <a:solidFill>
-                  <a:schemeClr val="tx1"/>
-                </a:solidFill>
-                <a:latin typeface="+mn-lt"/>
-                <a:ea typeface="+mn-ea"/>
-                <a:cs typeface="+mn-cs"/>
-              </a:defRPr>
-            </a:lvl5pPr>
-            <a:lvl6pPr marL="2514600" indent="-228600" algn="l" defTabSz="914400" rtl="0" eaLnBrk="1" latinLnBrk="0" hangingPunct="1">
-              <a:lnSpc>
-                <a:spcPct val="90000"/>
-              </a:lnSpc>
-              <a:spcBef>
-                <a:spcPts val="500"/>
-              </a:spcBef>
-              <a:buFont typeface="Arial" panose="020B0604020202020204" pitchFamily="34" charset="0"/>
-              <a:buChar char="•"/>
-              <a:defRPr sz="1800" kern="1200">
-                <a:solidFill>
-                  <a:schemeClr val="tx1"/>
-                </a:solidFill>
-                <a:latin typeface="+mn-lt"/>
-                <a:ea typeface="+mn-ea"/>
-                <a:cs typeface="+mn-cs"/>
-              </a:defRPr>
-            </a:lvl6pPr>
-            <a:lvl7pPr marL="2971800" indent="-228600" algn="l" defTabSz="914400" rtl="0" eaLnBrk="1" latinLnBrk="0" hangingPunct="1">
-              <a:lnSpc>
-                <a:spcPct val="90000"/>
-              </a:lnSpc>
-              <a:spcBef>
-                <a:spcPts val="500"/>
-              </a:spcBef>
-              <a:buFont typeface="Arial" panose="020B0604020202020204" pitchFamily="34" charset="0"/>
-              <a:buChar char="•"/>
-              <a:defRPr sz="1800" kern="1200">
-                <a:solidFill>
-                  <a:schemeClr val="tx1"/>
-                </a:solidFill>
-                <a:latin typeface="+mn-lt"/>
-                <a:ea typeface="+mn-ea"/>
-                <a:cs typeface="+mn-cs"/>
-              </a:defRPr>
-            </a:lvl7pPr>
-            <a:lvl8pPr marL="3429000" indent="-228600" algn="l" defTabSz="914400" rtl="0" eaLnBrk="1" latinLnBrk="0" hangingPunct="1">
-              <a:lnSpc>
-                <a:spcPct val="90000"/>
-              </a:lnSpc>
-              <a:spcBef>
-                <a:spcPts val="500"/>
-              </a:spcBef>
-              <a:buFont typeface="Arial" panose="020B0604020202020204" pitchFamily="34" charset="0"/>
-              <a:buChar char="•"/>
-              <a:defRPr sz="1800" kern="1200">
-                <a:solidFill>
-                  <a:schemeClr val="tx1"/>
-                </a:solidFill>
-                <a:latin typeface="+mn-lt"/>
-                <a:ea typeface="+mn-ea"/>
-                <a:cs typeface="+mn-cs"/>
-              </a:defRPr>
-            </a:lvl8pPr>
-            <a:lvl9pPr marL="3886200" indent="-228600" algn="l" defTabSz="914400" rtl="0" eaLnBrk="1" latinLnBrk="0" hangingPunct="1">
-              <a:lnSpc>
-                <a:spcPct val="90000"/>
-              </a:lnSpc>
-              <a:spcBef>
-                <a:spcPts val="500"/>
-              </a:spcBef>
-              <a:buFont typeface="Arial" panose="020B0604020202020204" pitchFamily="34" charset="0"/>
-              <a:buChar char="•"/>
-              <a:defRPr sz="1800" kern="1200">
-                <a:solidFill>
-                  <a:schemeClr val="tx1"/>
-                </a:solidFill>
-                <a:latin typeface="+mn-lt"/>
-                <a:ea typeface="+mn-ea"/>
-                <a:cs typeface="+mn-cs"/>
-              </a:defRPr>
-            </a:lvl9pPr>
-          </a:lstStyle>
-          <a:p>
-            <a:r>
-              <a:rPr lang="nl-NL" dirty="0" smtClean="0">
-                <a:latin typeface="Times New Roman" panose="02020603050405020304" pitchFamily="18" charset="0"/>
-                <a:cs typeface="Times New Roman" panose="02020603050405020304" pitchFamily="18" charset="0"/>
-              </a:rPr>
-              <a:t>Mutatiepunten = lengte van flip. </a:t>
-            </a:r>
-          </a:p>
-          <a:p>
-            <a:pPr marL="0" indent="0">
-              <a:buNone/>
-            </a:pPr>
-            <a:r>
-              <a:rPr lang="nl-NL" dirty="0">
-                <a:latin typeface="Times New Roman" panose="02020603050405020304" pitchFamily="18" charset="0"/>
-                <a:cs typeface="Times New Roman" panose="02020603050405020304" pitchFamily="18" charset="0"/>
-              </a:rPr>
-              <a:t>	</a:t>
-            </a:r>
-            <a:r>
-              <a:rPr lang="nl-NL" dirty="0" smtClean="0">
-                <a:latin typeface="Times New Roman" panose="02020603050405020304" pitchFamily="18" charset="0"/>
-                <a:cs typeface="Times New Roman" panose="02020603050405020304" pitchFamily="18" charset="0"/>
-              </a:rPr>
-              <a:t>totaal = </a:t>
-            </a:r>
-            <a:r>
-              <a:rPr lang="nl-NL" b="1" dirty="0" smtClean="0">
-                <a:latin typeface="Times New Roman" panose="02020603050405020304" pitchFamily="18" charset="0"/>
-                <a:cs typeface="Times New Roman" panose="02020603050405020304" pitchFamily="18" charset="0"/>
-              </a:rPr>
-              <a:t>147</a:t>
-            </a:r>
-          </a:p>
-          <a:p>
-            <a:pPr marL="0" indent="0">
-              <a:buNone/>
-            </a:pPr>
-            <a:endParaRPr lang="nl-NL" b="1" dirty="0" smtClean="0">
-              <a:latin typeface="Times New Roman" panose="02020603050405020304" pitchFamily="18" charset="0"/>
-              <a:cs typeface="Times New Roman" panose="02020603050405020304" pitchFamily="18" charset="0"/>
-            </a:endParaRPr>
-          </a:p>
-          <a:p>
-            <a:r>
-              <a:rPr lang="nl-NL" dirty="0" smtClean="0">
-                <a:latin typeface="Times New Roman" panose="02020603050405020304" pitchFamily="18" charset="0"/>
-                <a:cs typeface="Times New Roman" panose="02020603050405020304" pitchFamily="18" charset="0"/>
-              </a:rPr>
-              <a:t>Hoe groter hoe onwaarschijnlijker = </a:t>
-            </a:r>
-            <a:r>
-              <a:rPr lang="nl-NL" b="0" i="0" dirty="0" smtClean="0">
-                <a:solidFill>
-                  <a:srgbClr val="000000"/>
-                </a:solidFill>
-                <a:effectLst/>
-                <a:latin typeface="Times New Roman" panose="02020603050405020304" pitchFamily="18" charset="0"/>
-                <a:cs typeface="Times New Roman" panose="02020603050405020304" pitchFamily="18" charset="0"/>
-              </a:rPr>
-              <a:t>½n</a:t>
-            </a:r>
-            <a:r>
-              <a:rPr lang="nl-NL" b="0" i="0" baseline="30000" dirty="0" smtClean="0">
-                <a:solidFill>
-                  <a:srgbClr val="000000"/>
-                </a:solidFill>
-                <a:effectLst/>
-                <a:latin typeface="Times New Roman" panose="02020603050405020304" pitchFamily="18" charset="0"/>
-                <a:cs typeface="Times New Roman" panose="02020603050405020304" pitchFamily="18" charset="0"/>
-              </a:rPr>
-              <a:t>2 </a:t>
-            </a:r>
-            <a:r>
-              <a:rPr lang="nl-NL" dirty="0">
-                <a:latin typeface="Times New Roman" panose="02020603050405020304" pitchFamily="18" charset="0"/>
-                <a:cs typeface="Times New Roman" panose="02020603050405020304" pitchFamily="18" charset="0"/>
-              </a:rPr>
-              <a:t> </a:t>
-            </a:r>
-            <a:r>
-              <a:rPr lang="nl-NL" dirty="0" smtClean="0">
-                <a:latin typeface="Times New Roman" panose="02020603050405020304" pitchFamily="18" charset="0"/>
-                <a:cs typeface="Times New Roman" panose="02020603050405020304" pitchFamily="18" charset="0"/>
-              </a:rPr>
-              <a:t>= </a:t>
-            </a:r>
-            <a:r>
-              <a:rPr lang="nl-NL" b="1" dirty="0" smtClean="0">
-                <a:latin typeface="Times New Roman" panose="02020603050405020304" pitchFamily="18" charset="0"/>
-                <a:cs typeface="Times New Roman" panose="02020603050405020304" pitchFamily="18" charset="0"/>
-              </a:rPr>
-              <a:t>963.5</a:t>
-            </a:r>
-          </a:p>
-          <a:p>
-            <a:pPr marL="0" indent="0">
-              <a:buNone/>
-            </a:pPr>
-            <a:endParaRPr lang="nl-NL" b="1" dirty="0" smtClean="0">
-              <a:latin typeface="Times New Roman" panose="02020603050405020304" pitchFamily="18" charset="0"/>
-              <a:cs typeface="Times New Roman" panose="02020603050405020304" pitchFamily="18" charset="0"/>
-            </a:endParaRPr>
-          </a:p>
-          <a:p>
-            <a:r>
-              <a:rPr lang="nl-NL" dirty="0" smtClean="0">
-                <a:latin typeface="Times New Roman" panose="02020603050405020304" pitchFamily="18" charset="0"/>
-                <a:cs typeface="Times New Roman" panose="02020603050405020304" pitchFamily="18" charset="0"/>
-              </a:rPr>
-              <a:t>Opdracht: voor beide situaties in zo min mogelijk mutatiepunten</a:t>
-            </a:r>
-          </a:p>
-          <a:p>
             <a:pPr marL="457200" lvl="1" indent="0">
-              <a:buFont typeface="Arial" panose="020B0604020202020204" pitchFamily="34" charset="0"/>
               <a:buNone/>
             </a:pPr>
             <a:endParaRPr lang="nl-NL" dirty="0" smtClean="0">
@@ -6230,6 +7411,42 @@
             </a:endParaRPr>
           </a:p>
           <a:p>
+            <a:pPr marL="0" indent="0">
+              <a:buNone/>
+            </a:pPr>
+            <a:endParaRPr lang="nl-NL" sz="2400" b="1" dirty="0" smtClean="0">
+              <a:latin typeface="Times New Roman" panose="02020603050405020304" pitchFamily="18" charset="0"/>
+              <a:cs typeface="Times New Roman" panose="02020603050405020304" pitchFamily="18" charset="0"/>
+            </a:endParaRPr>
+          </a:p>
+          <a:p>
+            <a:pPr marL="0" indent="0">
+              <a:buNone/>
+            </a:pPr>
+            <a:endParaRPr lang="nl-NL" sz="2400" dirty="0" smtClean="0">
+              <a:latin typeface="Times New Roman" panose="02020603050405020304" pitchFamily="18" charset="0"/>
+              <a:cs typeface="Times New Roman" panose="02020603050405020304" pitchFamily="18" charset="0"/>
+            </a:endParaRPr>
+          </a:p>
+          <a:p>
+            <a:pPr marL="457200" lvl="1" indent="0">
+              <a:buNone/>
+            </a:pPr>
+            <a:endParaRPr lang="nl-NL" dirty="0" smtClean="0">
+              <a:latin typeface="Times New Roman" panose="02020603050405020304" pitchFamily="18" charset="0"/>
+              <a:cs typeface="Times New Roman" panose="02020603050405020304" pitchFamily="18" charset="0"/>
+            </a:endParaRPr>
+          </a:p>
+          <a:p>
+            <a:pPr marL="457200" lvl="1" indent="0">
+              <a:buNone/>
+            </a:pPr>
+            <a:endParaRPr lang="nl-NL" dirty="0" smtClean="0">
+              <a:latin typeface="Times New Roman" panose="02020603050405020304" pitchFamily="18" charset="0"/>
+              <a:cs typeface="Times New Roman" panose="02020603050405020304" pitchFamily="18" charset="0"/>
+            </a:endParaRPr>
+          </a:p>
+          <a:p>
             <a:pPr lvl="1"/>
             <a:endParaRPr lang="nl-NL" dirty="0">
               <a:latin typeface="Times New Roman" panose="02020603050405020304" pitchFamily="18" charset="0"/>
@@ -6238,10 +7455,212 @@
           </a:p>
         </p:txBody>
       </p:sp>
+      <p:sp>
+        <p:nvSpPr>
+          <p:cNvPr id="7" name="Titel 1"/>
+          <p:cNvSpPr txBox="1">
+            <a:spLocks/>
+          </p:cNvSpPr>
+          <p:nvPr/>
+        </p:nvSpPr>
+        <p:spPr>
+          <a:xfrm>
+            <a:off x="838200" y="365125"/>
+            <a:ext cx="8184776" cy="1325563"/>
+          </a:xfrm>
+          <a:prstGeom prst="rect">
+            <a:avLst/>
+          </a:prstGeom>
+        </p:spPr>
+        <p:txBody>
+          <a:bodyPr vert="horz" lIns="91440" tIns="45720" rIns="91440" bIns="45720" rtlCol="0" anchor="ctr">
+            <a:noAutofit/>
+          </a:bodyPr>
+          <a:lstStyle>
+            <a:lvl1pPr algn="l" defTabSz="914400" rtl="0" eaLnBrk="1" latinLnBrk="0" hangingPunct="1">
+              <a:lnSpc>
+                <a:spcPct val="90000"/>
+              </a:lnSpc>
+              <a:spcBef>
+                <a:spcPct val="0"/>
+              </a:spcBef>
+              <a:buNone/>
+              <a:defRPr sz="4400" kern="1200">
+                <a:solidFill>
+                  <a:schemeClr val="tx1"/>
+                </a:solidFill>
+                <a:latin typeface="+mj-lt"/>
+                <a:ea typeface="+mj-ea"/>
+                <a:cs typeface="+mj-cs"/>
+              </a:defRPr>
+            </a:lvl1pPr>
+          </a:lstStyle>
+          <a:p>
+            <a:r>
+              <a:rPr lang="nl-NL" sz="2400" dirty="0" smtClean="0">
+                <a:solidFill>
+                  <a:schemeClr val="bg1">
+                    <a:lumMod val="65000"/>
+                  </a:schemeClr>
+                </a:solidFill>
+                <a:latin typeface="Times New Roman" panose="02020603050405020304" pitchFamily="18" charset="0"/>
+                <a:cs typeface="Times New Roman" panose="02020603050405020304" pitchFamily="18" charset="0"/>
+              </a:rPr>
+              <a:t>van </a:t>
+            </a:r>
+            <a:r>
+              <a:rPr lang="nl-NL" sz="2400" i="1" dirty="0" smtClean="0">
+                <a:solidFill>
+                  <a:schemeClr val="bg1">
+                    <a:lumMod val="65000"/>
+                  </a:schemeClr>
+                </a:solidFill>
+                <a:latin typeface="Times New Roman" panose="02020603050405020304" pitchFamily="18" charset="0"/>
+                <a:cs typeface="Times New Roman" panose="02020603050405020304" pitchFamily="18" charset="0"/>
+              </a:rPr>
+              <a:t>D. </a:t>
+            </a:r>
+            <a:r>
+              <a:rPr lang="nl-NL" sz="2400" i="1" dirty="0" err="1" smtClean="0">
+                <a:solidFill>
+                  <a:schemeClr val="bg1">
+                    <a:lumMod val="65000"/>
+                  </a:schemeClr>
+                </a:solidFill>
+                <a:latin typeface="Times New Roman" panose="02020603050405020304" pitchFamily="18" charset="0"/>
+                <a:cs typeface="Times New Roman" panose="02020603050405020304" pitchFamily="18" charset="0"/>
+              </a:rPr>
+              <a:t>melanogaster</a:t>
+            </a:r>
+            <a:r>
+              <a:rPr lang="nl-NL" sz="2400" i="1" dirty="0" smtClean="0">
+                <a:solidFill>
+                  <a:schemeClr val="bg1">
+                    <a:lumMod val="65000"/>
+                  </a:schemeClr>
+                </a:solidFill>
+                <a:latin typeface="Times New Roman" panose="02020603050405020304" pitchFamily="18" charset="0"/>
+                <a:cs typeface="Times New Roman" panose="02020603050405020304" pitchFamily="18" charset="0"/>
+              </a:rPr>
+              <a:t> </a:t>
+            </a:r>
+            <a:r>
+              <a:rPr lang="nl-NL" sz="2400" dirty="0" smtClean="0">
+                <a:solidFill>
+                  <a:schemeClr val="bg1">
+                    <a:lumMod val="65000"/>
+                  </a:schemeClr>
+                </a:solidFill>
+                <a:latin typeface="Times New Roman" panose="02020603050405020304" pitchFamily="18" charset="0"/>
+                <a:cs typeface="Times New Roman" panose="02020603050405020304" pitchFamily="18" charset="0"/>
+              </a:rPr>
+              <a:t>naar </a:t>
+            </a:r>
+            <a:r>
+              <a:rPr lang="nl-NL" sz="2400" i="1" dirty="0" smtClean="0">
+                <a:solidFill>
+                  <a:schemeClr val="bg1">
+                    <a:lumMod val="65000"/>
+                  </a:schemeClr>
+                </a:solidFill>
+                <a:latin typeface="Times New Roman" panose="02020603050405020304" pitchFamily="18" charset="0"/>
+                <a:cs typeface="Times New Roman" panose="02020603050405020304" pitchFamily="18" charset="0"/>
+              </a:rPr>
+              <a:t>D. </a:t>
+            </a:r>
+            <a:r>
+              <a:rPr lang="nl-NL" sz="2400" i="1" dirty="0" err="1" smtClean="0">
+                <a:solidFill>
+                  <a:schemeClr val="bg1">
+                    <a:lumMod val="65000"/>
+                  </a:schemeClr>
+                </a:solidFill>
+                <a:latin typeface="Times New Roman" panose="02020603050405020304" pitchFamily="18" charset="0"/>
+                <a:cs typeface="Times New Roman" panose="02020603050405020304" pitchFamily="18" charset="0"/>
+              </a:rPr>
+              <a:t>miranda</a:t>
+            </a:r>
+            <a:endParaRPr lang="nl-NL" sz="2400" i="1" dirty="0" smtClean="0">
+              <a:solidFill>
+                <a:schemeClr val="bg1">
+                  <a:lumMod val="65000"/>
+                </a:schemeClr>
+              </a:solidFill>
+              <a:latin typeface="Times New Roman" panose="02020603050405020304" pitchFamily="18" charset="0"/>
+              <a:cs typeface="Times New Roman" panose="02020603050405020304" pitchFamily="18" charset="0"/>
+            </a:endParaRPr>
+          </a:p>
+          <a:p>
+            <a:endParaRPr lang="nl-NL" sz="700" i="1" dirty="0" smtClean="0">
+              <a:solidFill>
+                <a:schemeClr val="bg1">
+                  <a:lumMod val="65000"/>
+                </a:schemeClr>
+              </a:solidFill>
+              <a:latin typeface="Times New Roman" panose="02020603050405020304" pitchFamily="18" charset="0"/>
+              <a:cs typeface="Times New Roman" panose="02020603050405020304" pitchFamily="18" charset="0"/>
+            </a:endParaRPr>
+          </a:p>
+          <a:p>
+            <a:r>
+              <a:rPr lang="nl-NL" sz="3600" dirty="0" smtClean="0">
+                <a:latin typeface="Times New Roman" panose="02020603050405020304" pitchFamily="18" charset="0"/>
+                <a:cs typeface="Times New Roman" panose="02020603050405020304" pitchFamily="18" charset="0"/>
+              </a:rPr>
+              <a:t>PRIORITY QUEUE + SCOREFUNCTIES</a:t>
+            </a:r>
+            <a:endParaRPr lang="nl-NL" sz="3600" dirty="0">
+              <a:latin typeface="Times New Roman" panose="02020603050405020304" pitchFamily="18" charset="0"/>
+              <a:cs typeface="Times New Roman" panose="02020603050405020304" pitchFamily="18" charset="0"/>
+            </a:endParaRPr>
+          </a:p>
+        </p:txBody>
+      </p:sp>
+      <p:pic>
+        <p:nvPicPr>
+          <p:cNvPr id="8" name="Picture 4" descr="Afbeeldingsresultaat voor drosophila"/>
+          <p:cNvPicPr>
+            <a:picLocks noChangeAspect="1" noChangeArrowheads="1"/>
+          </p:cNvPicPr>
+          <p:nvPr/>
+        </p:nvPicPr>
+        <p:blipFill>
+          <a:blip r:embed="rId2" cstate="print">
+            <a:extLst>
+              <a:ext uri="{28A0092B-C50C-407E-A947-70E740481C1C}">
+                <a14:useLocalDpi xmlns:a14="http://schemas.microsoft.com/office/drawing/2010/main" val="0"/>
+              </a:ext>
+            </a:extLst>
+          </a:blip>
+          <a:srcRect/>
+          <a:stretch>
+            <a:fillRect/>
+          </a:stretch>
+        </p:blipFill>
+        <p:spPr bwMode="auto">
+          <a:xfrm rot="13408894">
+            <a:off x="5748739" y="192266"/>
+            <a:ext cx="816553" cy="563283"/>
+          </a:xfrm>
+          <a:prstGeom prst="rect">
+            <a:avLst/>
+          </a:prstGeom>
+          <a:noFill/>
+          <a:extLst>
+            <a:ext uri="{909E8E84-426E-40DD-AFC4-6F175D3DCCD1}">
+              <a14:hiddenFill xmlns:a14="http://schemas.microsoft.com/office/drawing/2010/main">
+                <a:solidFill>
+                  <a:srgbClr val="FFFFFF"/>
+                </a:solidFill>
+              </a14:hiddenFill>
+            </a:ext>
+          </a:extLst>
+        </p:spPr>
+      </p:pic>
     </p:spTree>
     <p:extLst>
       <p:ext uri="{BB962C8B-B14F-4D97-AF65-F5344CB8AC3E}">
-        <p14:creationId xmlns:p14="http://schemas.microsoft.com/office/powerpoint/2010/main" val="3762115482"/>
+        <p14:creationId xmlns:p14="http://schemas.microsoft.com/office/powerpoint/2010/main" val="62705199"/>
       </p:ext>
     </p:extLst>
   </p:cSld>

</xml_diff>

<commit_message>
discard bf en pres
</commit_message>
<xml_diff>
--- a/verslaglegging en presentaties/Powerpont 1.pptx
+++ b/verslaglegging en presentaties/Powerpont 1.pptx
@@ -14,7 +14,7 @@
     <p:sldId id="272" r:id="rId8"/>
     <p:sldId id="274" r:id="rId9"/>
     <p:sldId id="275" r:id="rId10"/>
-    <p:sldId id="271" r:id="rId11"/>
+    <p:sldId id="277" r:id="rId11"/>
     <p:sldId id="263" r:id="rId12"/>
     <p:sldId id="270" r:id="rId13"/>
     <p:sldId id="264" r:id="rId14"/>
@@ -255,7 +255,7 @@
           <a:p>
             <a:fld id="{F2B6AC3F-E101-4B39-86B2-43B73117F4A4}" type="datetimeFigureOut">
               <a:rPr lang="nl-NL" smtClean="0"/>
-              <a:t>17-5-2017</a:t>
+              <a:t>18-5-2017</a:t>
             </a:fld>
             <a:endParaRPr lang="nl-NL"/>
           </a:p>
@@ -425,7 +425,7 @@
           <a:p>
             <a:fld id="{F2B6AC3F-E101-4B39-86B2-43B73117F4A4}" type="datetimeFigureOut">
               <a:rPr lang="nl-NL" smtClean="0"/>
-              <a:t>17-5-2017</a:t>
+              <a:t>18-5-2017</a:t>
             </a:fld>
             <a:endParaRPr lang="nl-NL"/>
           </a:p>
@@ -605,7 +605,7 @@
           <a:p>
             <a:fld id="{F2B6AC3F-E101-4B39-86B2-43B73117F4A4}" type="datetimeFigureOut">
               <a:rPr lang="nl-NL" smtClean="0"/>
-              <a:t>17-5-2017</a:t>
+              <a:t>18-5-2017</a:t>
             </a:fld>
             <a:endParaRPr lang="nl-NL"/>
           </a:p>
@@ -775,7 +775,7 @@
           <a:p>
             <a:fld id="{F2B6AC3F-E101-4B39-86B2-43B73117F4A4}" type="datetimeFigureOut">
               <a:rPr lang="nl-NL" smtClean="0"/>
-              <a:t>17-5-2017</a:t>
+              <a:t>18-5-2017</a:t>
             </a:fld>
             <a:endParaRPr lang="nl-NL"/>
           </a:p>
@@ -1021,7 +1021,7 @@
           <a:p>
             <a:fld id="{F2B6AC3F-E101-4B39-86B2-43B73117F4A4}" type="datetimeFigureOut">
               <a:rPr lang="nl-NL" smtClean="0"/>
-              <a:t>17-5-2017</a:t>
+              <a:t>18-5-2017</a:t>
             </a:fld>
             <a:endParaRPr lang="nl-NL"/>
           </a:p>
@@ -1253,7 +1253,7 @@
           <a:p>
             <a:fld id="{F2B6AC3F-E101-4B39-86B2-43B73117F4A4}" type="datetimeFigureOut">
               <a:rPr lang="nl-NL" smtClean="0"/>
-              <a:t>17-5-2017</a:t>
+              <a:t>18-5-2017</a:t>
             </a:fld>
             <a:endParaRPr lang="nl-NL"/>
           </a:p>
@@ -1620,7 +1620,7 @@
           <a:p>
             <a:fld id="{F2B6AC3F-E101-4B39-86B2-43B73117F4A4}" type="datetimeFigureOut">
               <a:rPr lang="nl-NL" smtClean="0"/>
-              <a:t>17-5-2017</a:t>
+              <a:t>18-5-2017</a:t>
             </a:fld>
             <a:endParaRPr lang="nl-NL"/>
           </a:p>
@@ -1738,7 +1738,7 @@
           <a:p>
             <a:fld id="{F2B6AC3F-E101-4B39-86B2-43B73117F4A4}" type="datetimeFigureOut">
               <a:rPr lang="nl-NL" smtClean="0"/>
-              <a:t>17-5-2017</a:t>
+              <a:t>18-5-2017</a:t>
             </a:fld>
             <a:endParaRPr lang="nl-NL"/>
           </a:p>
@@ -1833,7 +1833,7 @@
           <a:p>
             <a:fld id="{F2B6AC3F-E101-4B39-86B2-43B73117F4A4}" type="datetimeFigureOut">
               <a:rPr lang="nl-NL" smtClean="0"/>
-              <a:t>17-5-2017</a:t>
+              <a:t>18-5-2017</a:t>
             </a:fld>
             <a:endParaRPr lang="nl-NL"/>
           </a:p>
@@ -2110,7 +2110,7 @@
           <a:p>
             <a:fld id="{F2B6AC3F-E101-4B39-86B2-43B73117F4A4}" type="datetimeFigureOut">
               <a:rPr lang="nl-NL" smtClean="0"/>
-              <a:t>17-5-2017</a:t>
+              <a:t>18-5-2017</a:t>
             </a:fld>
             <a:endParaRPr lang="nl-NL"/>
           </a:p>
@@ -2363,7 +2363,7 @@
           <a:p>
             <a:fld id="{F2B6AC3F-E101-4B39-86B2-43B73117F4A4}" type="datetimeFigureOut">
               <a:rPr lang="nl-NL" smtClean="0"/>
-              <a:t>17-5-2017</a:t>
+              <a:t>18-5-2017</a:t>
             </a:fld>
             <a:endParaRPr lang="nl-NL"/>
           </a:p>
@@ -2576,7 +2576,7 @@
           <a:p>
             <a:fld id="{F2B6AC3F-E101-4B39-86B2-43B73117F4A4}" type="datetimeFigureOut">
               <a:rPr lang="nl-NL" smtClean="0"/>
-              <a:t>17-5-2017</a:t>
+              <a:t>18-5-2017</a:t>
             </a:fld>
             <a:endParaRPr lang="nl-NL"/>
           </a:p>
@@ -3034,7 +3034,7 @@
         </p:nvSpPr>
         <p:spPr>
           <a:xfrm>
-            <a:off x="4026569" y="842833"/>
+            <a:off x="4553408" y="3737351"/>
             <a:ext cx="9144000" cy="1050098"/>
           </a:xfrm>
         </p:spPr>
@@ -3068,7 +3068,7 @@
         </p:nvSpPr>
         <p:spPr>
           <a:xfrm>
-            <a:off x="3989388" y="1885495"/>
+            <a:off x="4092418" y="4663607"/>
             <a:ext cx="9144000" cy="506323"/>
           </a:xfrm>
         </p:spPr>
@@ -3081,7 +3081,14 @@
                 <a:latin typeface="Times New Roman" panose="02020603050405020304" pitchFamily="18" charset="0"/>
                 <a:cs typeface="Times New Roman" panose="02020603050405020304" pitchFamily="18" charset="0"/>
               </a:rPr>
-              <a:t>Leander de Kraker &amp; Nina Cialdella</a:t>
+              <a:t>Leander de Kraker &amp; Nina </a:t>
+            </a:r>
+            <a:r>
+              <a:rPr lang="nl-NL" dirty="0" smtClean="0">
+                <a:latin typeface="Times New Roman" panose="02020603050405020304" pitchFamily="18" charset="0"/>
+                <a:cs typeface="Times New Roman" panose="02020603050405020304" pitchFamily="18" charset="0"/>
+              </a:rPr>
+              <a:t>Cialdella</a:t>
             </a:r>
             <a:endParaRPr lang="nl-NL" dirty="0">
               <a:latin typeface="Times New Roman" panose="02020603050405020304" pitchFamily="18" charset="0"/>
@@ -3090,6 +3097,83 @@
           </a:p>
         </p:txBody>
       </p:sp>
+      <p:sp>
+        <p:nvSpPr>
+          <p:cNvPr id="4" name="Tekstvak 3"/>
+          <p:cNvSpPr txBox="1"/>
+          <p:nvPr/>
+        </p:nvSpPr>
+        <p:spPr>
+          <a:xfrm>
+            <a:off x="6345907" y="3646481"/>
+            <a:ext cx="2150772" cy="369332"/>
+          </a:xfrm>
+          <a:prstGeom prst="rect">
+            <a:avLst/>
+          </a:prstGeom>
+          <a:noFill/>
+        </p:spPr>
+        <p:txBody>
+          <a:bodyPr wrap="square" rtlCol="0">
+            <a:spAutoFit/>
+          </a:bodyPr>
+          <a:lstStyle/>
+          <a:p>
+            <a:r>
+              <a:rPr lang="nl-NL" dirty="0" smtClean="0">
+                <a:latin typeface="Times New Roman" panose="02020603050405020304" pitchFamily="18" charset="0"/>
+                <a:cs typeface="Times New Roman" panose="02020603050405020304" pitchFamily="18" charset="0"/>
+              </a:rPr>
+              <a:t>Heuristieken 2017 </a:t>
+            </a:r>
+            <a:endParaRPr lang="nl-NL" dirty="0">
+              <a:latin typeface="Times New Roman" panose="02020603050405020304" pitchFamily="18" charset="0"/>
+              <a:cs typeface="Times New Roman" panose="02020603050405020304" pitchFamily="18" charset="0"/>
+            </a:endParaRPr>
+          </a:p>
+        </p:txBody>
+      </p:sp>
+      <p:pic>
+        <p:nvPicPr>
+          <p:cNvPr id="6" name="Picture 2" descr="Drosophila eye by mario-metzler"/>
+          <p:cNvPicPr>
+            <a:picLocks noChangeAspect="1" noChangeArrowheads="1"/>
+          </p:cNvPicPr>
+          <p:nvPr/>
+        </p:nvPicPr>
+        <p:blipFill>
+          <a:blip r:embed="rId2">
+            <a:extLst>
+              <a:ext uri="{28A0092B-C50C-407E-A947-70E740481C1C}">
+                <a14:useLocalDpi xmlns:a14="http://schemas.microsoft.com/office/drawing/2010/main" val="0"/>
+              </a:ext>
+            </a:extLst>
+          </a:blip>
+          <a:srcRect/>
+          <a:stretch>
+            <a:fillRect/>
+          </a:stretch>
+        </p:blipFill>
+        <p:spPr bwMode="auto">
+          <a:xfrm rot="10800000" flipV="1">
+            <a:off x="7534140" y="0"/>
+            <a:ext cx="4657859" cy="3591768"/>
+          </a:xfrm>
+          <a:prstGeom prst="rect">
+            <a:avLst/>
+          </a:prstGeom>
+          <a:noFill/>
+          <a:extLst>
+            <a:ext uri="{909E8E84-426E-40DD-AFC4-6F175D3DCCD1}">
+              <a14:hiddenFill xmlns:a14="http://schemas.microsoft.com/office/drawing/2010/main">
+                <a:solidFill>
+                  <a:srgbClr val="FFFFFF"/>
+                </a:solidFill>
+              </a14:hiddenFill>
+            </a:ext>
+          </a:extLst>
+        </p:spPr>
+      </p:pic>
     </p:spTree>
     <p:extLst>
       <p:ext uri="{BB962C8B-B14F-4D97-AF65-F5344CB8AC3E}">
@@ -3199,6 +3283,97 @@
                       </p:childTnLst>
                     </p:cTn>
                   </p:par>
+                  <p:par>
+                    <p:cTn id="9" fill="hold">
+                      <p:stCondLst>
+                        <p:cond delay="indefinite"/>
+                      </p:stCondLst>
+                      <p:childTnLst>
+                        <p:par>
+                          <p:cTn id="10" fill="hold">
+                            <p:stCondLst>
+                              <p:cond delay="0"/>
+                            </p:stCondLst>
+                            <p:childTnLst>
+                              <p:par>
+                                <p:cTn id="11" presetID="2" presetClass="entr" presetSubtype="2" fill="hold" nodeType="clickEffect">
+                                  <p:stCondLst>
+                                    <p:cond delay="0"/>
+                                  </p:stCondLst>
+                                  <p:childTnLst>
+                                    <p:set>
+                                      <p:cBhvr>
+                                        <p:cTn id="12" dur="1" fill="hold">
+                                          <p:stCondLst>
+                                            <p:cond delay="0"/>
+                                          </p:stCondLst>
+                                        </p:cTn>
+                                        <p:tgtEl>
+                                          <p:spTgt spid="6"/>
+                                        </p:tgtEl>
+                                        <p:attrNameLst>
+                                          <p:attrName>style.visibility</p:attrName>
+                                        </p:attrNameLst>
+                                      </p:cBhvr>
+                                      <p:to>
+                                        <p:strVal val="visible"/>
+                                      </p:to>
+                                    </p:set>
+                                    <p:anim calcmode="lin" valueType="num">
+                                      <p:cBhvr additive="base">
+                                        <p:cTn id="13" dur="500" fill="hold"/>
+                                        <p:tgtEl>
+                                          <p:spTgt spid="6"/>
+                                        </p:tgtEl>
+                                        <p:attrNameLst>
+                                          <p:attrName>ppt_x</p:attrName>
+                                        </p:attrNameLst>
+                                      </p:cBhvr>
+                                      <p:tavLst>
+                                        <p:tav tm="0">
+                                          <p:val>
+                                            <p:strVal val="1+#ppt_w/2"/>
+                                          </p:val>
+                                        </p:tav>
+                                        <p:tav tm="100000">
+                                          <p:val>
+                                            <p:strVal val="#ppt_x"/>
+                                          </p:val>
+                                        </p:tav>
+                                      </p:tavLst>
+                                    </p:anim>
+                                    <p:anim calcmode="lin" valueType="num">
+                                      <p:cBhvr additive="base">
+                                        <p:cTn id="14" dur="500" fill="hold"/>
+                                        <p:tgtEl>
+                                          <p:spTgt spid="6"/>
+                                        </p:tgtEl>
+                                        <p:attrNameLst>
+                                          <p:attrName>ppt_y</p:attrName>
+                                        </p:attrNameLst>
+                                      </p:cBhvr>
+                                      <p:tavLst>
+                                        <p:tav tm="0">
+                                          <p:val>
+                                            <p:strVal val="#ppt_y"/>
+                                          </p:val>
+                                        </p:tav>
+                                        <p:tav tm="100000">
+                                          <p:val>
+                                            <p:strVal val="#ppt_y"/>
+                                          </p:val>
+                                        </p:tav>
+                                      </p:tavLst>
+                                    </p:anim>
+                                  </p:childTnLst>
+                                </p:cTn>
+                              </p:par>
+                            </p:childTnLst>
+                          </p:cTn>
+                        </p:par>
+                      </p:childTnLst>
+                    </p:cTn>
+                  </p:par>
                 </p:childTnLst>
               </p:cTn>
               <p:prevCondLst>
@@ -3243,46 +3418,475 @@
       </p:grpSpPr>
       <p:sp>
         <p:nvSpPr>
-          <p:cNvPr id="2" name="Titel 1"/>
-          <p:cNvSpPr>
-            <a:spLocks noGrp="1"/>
+          <p:cNvPr id="7" name="Titel 1"/>
+          <p:cNvSpPr txBox="1">
+            <a:spLocks/>
           </p:cNvSpPr>
-          <p:nvPr>
-            <p:ph type="title"/>
-          </p:nvPr>
-        </p:nvSpPr>
-        <p:spPr/>
-        <p:txBody>
-          <a:bodyPr/>
-          <a:lstStyle/>
-          <a:p>
-            <a:endParaRPr lang="nl-NL"/>
-          </a:p>
-        </p:txBody>
-      </p:sp>
-      <p:sp>
-        <p:nvSpPr>
-          <p:cNvPr id="3" name="Tijdelijke aanduiding voor inhoud 2"/>
-          <p:cNvSpPr>
-            <a:spLocks noGrp="1"/>
+          <p:nvPr/>
+        </p:nvSpPr>
+        <p:spPr>
+          <a:xfrm>
+            <a:off x="838200" y="365125"/>
+            <a:ext cx="8184776" cy="1325563"/>
+          </a:xfrm>
+          <a:prstGeom prst="rect">
+            <a:avLst/>
+          </a:prstGeom>
+        </p:spPr>
+        <p:txBody>
+          <a:bodyPr vert="horz" lIns="91440" tIns="45720" rIns="91440" bIns="45720" rtlCol="0" anchor="ctr">
+            <a:noAutofit/>
+          </a:bodyPr>
+          <a:lstStyle>
+            <a:lvl1pPr algn="l" defTabSz="914400" rtl="0" eaLnBrk="1" latinLnBrk="0" hangingPunct="1">
+              <a:lnSpc>
+                <a:spcPct val="90000"/>
+              </a:lnSpc>
+              <a:spcBef>
+                <a:spcPct val="0"/>
+              </a:spcBef>
+              <a:buNone/>
+              <a:defRPr sz="4400" kern="1200">
+                <a:solidFill>
+                  <a:schemeClr val="tx1"/>
+                </a:solidFill>
+                <a:latin typeface="+mj-lt"/>
+                <a:ea typeface="+mj-ea"/>
+                <a:cs typeface="+mj-cs"/>
+              </a:defRPr>
+            </a:lvl1pPr>
+          </a:lstStyle>
+          <a:p>
+            <a:r>
+              <a:rPr lang="nl-NL" sz="2400" dirty="0" smtClean="0">
+                <a:solidFill>
+                  <a:schemeClr val="bg1">
+                    <a:lumMod val="65000"/>
+                  </a:schemeClr>
+                </a:solidFill>
+                <a:latin typeface="Times New Roman" panose="02020603050405020304" pitchFamily="18" charset="0"/>
+                <a:cs typeface="Times New Roman" panose="02020603050405020304" pitchFamily="18" charset="0"/>
+              </a:rPr>
+              <a:t>van </a:t>
+            </a:r>
+            <a:r>
+              <a:rPr lang="nl-NL" sz="2400" i="1" dirty="0" smtClean="0">
+                <a:solidFill>
+                  <a:schemeClr val="bg1">
+                    <a:lumMod val="65000"/>
+                  </a:schemeClr>
+                </a:solidFill>
+                <a:latin typeface="Times New Roman" panose="02020603050405020304" pitchFamily="18" charset="0"/>
+                <a:cs typeface="Times New Roman" panose="02020603050405020304" pitchFamily="18" charset="0"/>
+              </a:rPr>
+              <a:t>D. </a:t>
+            </a:r>
+            <a:r>
+              <a:rPr lang="nl-NL" sz="2400" i="1" dirty="0" err="1" smtClean="0">
+                <a:solidFill>
+                  <a:schemeClr val="bg1">
+                    <a:lumMod val="65000"/>
+                  </a:schemeClr>
+                </a:solidFill>
+                <a:latin typeface="Times New Roman" panose="02020603050405020304" pitchFamily="18" charset="0"/>
+                <a:cs typeface="Times New Roman" panose="02020603050405020304" pitchFamily="18" charset="0"/>
+              </a:rPr>
+              <a:t>melanogaster</a:t>
+            </a:r>
+            <a:r>
+              <a:rPr lang="nl-NL" sz="2400" i="1" dirty="0" smtClean="0">
+                <a:solidFill>
+                  <a:schemeClr val="bg1">
+                    <a:lumMod val="65000"/>
+                  </a:schemeClr>
+                </a:solidFill>
+                <a:latin typeface="Times New Roman" panose="02020603050405020304" pitchFamily="18" charset="0"/>
+                <a:cs typeface="Times New Roman" panose="02020603050405020304" pitchFamily="18" charset="0"/>
+              </a:rPr>
+              <a:t> </a:t>
+            </a:r>
+            <a:r>
+              <a:rPr lang="nl-NL" sz="2400" dirty="0" smtClean="0">
+                <a:solidFill>
+                  <a:schemeClr val="bg1">
+                    <a:lumMod val="65000"/>
+                  </a:schemeClr>
+                </a:solidFill>
+                <a:latin typeface="Times New Roman" panose="02020603050405020304" pitchFamily="18" charset="0"/>
+                <a:cs typeface="Times New Roman" panose="02020603050405020304" pitchFamily="18" charset="0"/>
+              </a:rPr>
+              <a:t>naar </a:t>
+            </a:r>
+            <a:r>
+              <a:rPr lang="nl-NL" sz="2400" i="1" dirty="0" smtClean="0">
+                <a:solidFill>
+                  <a:schemeClr val="bg1">
+                    <a:lumMod val="65000"/>
+                  </a:schemeClr>
+                </a:solidFill>
+                <a:latin typeface="Times New Roman" panose="02020603050405020304" pitchFamily="18" charset="0"/>
+                <a:cs typeface="Times New Roman" panose="02020603050405020304" pitchFamily="18" charset="0"/>
+              </a:rPr>
+              <a:t>D. </a:t>
+            </a:r>
+            <a:r>
+              <a:rPr lang="nl-NL" sz="2400" i="1" dirty="0" err="1" smtClean="0">
+                <a:solidFill>
+                  <a:schemeClr val="bg1">
+                    <a:lumMod val="65000"/>
+                  </a:schemeClr>
+                </a:solidFill>
+                <a:latin typeface="Times New Roman" panose="02020603050405020304" pitchFamily="18" charset="0"/>
+                <a:cs typeface="Times New Roman" panose="02020603050405020304" pitchFamily="18" charset="0"/>
+              </a:rPr>
+              <a:t>miranda</a:t>
+            </a:r>
+            <a:endParaRPr lang="nl-NL" sz="2400" i="1" dirty="0" smtClean="0">
+              <a:solidFill>
+                <a:schemeClr val="bg1">
+                  <a:lumMod val="65000"/>
+                </a:schemeClr>
+              </a:solidFill>
+              <a:latin typeface="Times New Roman" panose="02020603050405020304" pitchFamily="18" charset="0"/>
+              <a:cs typeface="Times New Roman" panose="02020603050405020304" pitchFamily="18" charset="0"/>
+            </a:endParaRPr>
+          </a:p>
+          <a:p>
+            <a:endParaRPr lang="nl-NL" sz="700" i="1" dirty="0" smtClean="0">
+              <a:solidFill>
+                <a:schemeClr val="bg1">
+                  <a:lumMod val="65000"/>
+                </a:schemeClr>
+              </a:solidFill>
+              <a:latin typeface="Times New Roman" panose="02020603050405020304" pitchFamily="18" charset="0"/>
+              <a:cs typeface="Times New Roman" panose="02020603050405020304" pitchFamily="18" charset="0"/>
+            </a:endParaRPr>
+          </a:p>
+          <a:p>
+            <a:r>
+              <a:rPr lang="nl-NL" sz="3600" dirty="0" smtClean="0">
+                <a:latin typeface="Times New Roman" panose="02020603050405020304" pitchFamily="18" charset="0"/>
+                <a:cs typeface="Times New Roman" panose="02020603050405020304" pitchFamily="18" charset="0"/>
+              </a:rPr>
+              <a:t>DE BESTE OPLOSSING</a:t>
+            </a:r>
+            <a:endParaRPr lang="nl-NL" sz="3600" dirty="0">
+              <a:latin typeface="Times New Roman" panose="02020603050405020304" pitchFamily="18" charset="0"/>
+              <a:cs typeface="Times New Roman" panose="02020603050405020304" pitchFamily="18" charset="0"/>
+            </a:endParaRPr>
+          </a:p>
+        </p:txBody>
+      </p:sp>
+      <p:pic>
+        <p:nvPicPr>
+          <p:cNvPr id="8" name="Picture 4" descr="Afbeeldingsresultaat voor drosophila"/>
+          <p:cNvPicPr>
+            <a:picLocks noChangeAspect="1" noChangeArrowheads="1"/>
+          </p:cNvPicPr>
+          <p:nvPr/>
+        </p:nvPicPr>
+        <p:blipFill>
+          <a:blip r:embed="rId2" cstate="print">
+            <a:extLst>
+              <a:ext uri="{28A0092B-C50C-407E-A947-70E740481C1C}">
+                <a14:useLocalDpi xmlns:a14="http://schemas.microsoft.com/office/drawing/2010/main" val="0"/>
+              </a:ext>
+            </a:extLst>
+          </a:blip>
+          <a:srcRect/>
+          <a:stretch>
+            <a:fillRect/>
+          </a:stretch>
+        </p:blipFill>
+        <p:spPr bwMode="auto">
+          <a:xfrm rot="18777056">
+            <a:off x="11309298" y="6081478"/>
+            <a:ext cx="816553" cy="563283"/>
+          </a:xfrm>
+          <a:prstGeom prst="rect">
+            <a:avLst/>
+          </a:prstGeom>
+          <a:noFill/>
+          <a:extLst>
+            <a:ext uri="{909E8E84-426E-40DD-AFC4-6F175D3DCCD1}">
+              <a14:hiddenFill xmlns:a14="http://schemas.microsoft.com/office/drawing/2010/main">
+                <a:solidFill>
+                  <a:srgbClr val="FFFFFF"/>
+                </a:solidFill>
+              </a14:hiddenFill>
+            </a:ext>
+          </a:extLst>
+        </p:spPr>
+      </p:pic>
+      <p:sp>
+        <p:nvSpPr>
+          <p:cNvPr id="6" name="Tijdelijke aanduiding voor inhoud 4"/>
+          <p:cNvSpPr txBox="1">
+            <a:spLocks/>
           </p:cNvSpPr>
-          <p:nvPr>
-            <p:ph idx="1"/>
-          </p:nvPr>
-        </p:nvSpPr>
-        <p:spPr/>
-        <p:txBody>
-          <a:bodyPr/>
-          <a:lstStyle/>
-          <a:p>
-            <a:endParaRPr lang="nl-NL"/>
+          <p:nvPr/>
+        </p:nvSpPr>
+        <p:spPr>
+          <a:xfrm>
+            <a:off x="990600" y="1978024"/>
+            <a:ext cx="5498432" cy="4857563"/>
+          </a:xfrm>
+          <a:prstGeom prst="rect">
+            <a:avLst/>
+          </a:prstGeom>
+        </p:spPr>
+        <p:txBody>
+          <a:bodyPr vert="horz" lIns="91440" tIns="45720" rIns="91440" bIns="45720" rtlCol="0">
+            <a:normAutofit/>
+          </a:bodyPr>
+          <a:lstStyle>
+            <a:lvl1pPr marL="228600" indent="-228600" algn="l" defTabSz="914400" rtl="0" eaLnBrk="1" latinLnBrk="0" hangingPunct="1">
+              <a:lnSpc>
+                <a:spcPct val="90000"/>
+              </a:lnSpc>
+              <a:spcBef>
+                <a:spcPts val="1000"/>
+              </a:spcBef>
+              <a:buFont typeface="Arial" panose="020B0604020202020204" pitchFamily="34" charset="0"/>
+              <a:buChar char="•"/>
+              <a:defRPr sz="2800" kern="1200">
+                <a:solidFill>
+                  <a:schemeClr val="tx1"/>
+                </a:solidFill>
+                <a:latin typeface="+mn-lt"/>
+                <a:ea typeface="+mn-ea"/>
+                <a:cs typeface="+mn-cs"/>
+              </a:defRPr>
+            </a:lvl1pPr>
+            <a:lvl2pPr marL="685800" indent="-228600" algn="l" defTabSz="914400" rtl="0" eaLnBrk="1" latinLnBrk="0" hangingPunct="1">
+              <a:lnSpc>
+                <a:spcPct val="90000"/>
+              </a:lnSpc>
+              <a:spcBef>
+                <a:spcPts val="500"/>
+              </a:spcBef>
+              <a:buFont typeface="Arial" panose="020B0604020202020204" pitchFamily="34" charset="0"/>
+              <a:buChar char="•"/>
+              <a:defRPr sz="2400" kern="1200">
+                <a:solidFill>
+                  <a:schemeClr val="tx1"/>
+                </a:solidFill>
+                <a:latin typeface="+mn-lt"/>
+                <a:ea typeface="+mn-ea"/>
+                <a:cs typeface="+mn-cs"/>
+              </a:defRPr>
+            </a:lvl2pPr>
+            <a:lvl3pPr marL="1143000" indent="-228600" algn="l" defTabSz="914400" rtl="0" eaLnBrk="1" latinLnBrk="0" hangingPunct="1">
+              <a:lnSpc>
+                <a:spcPct val="90000"/>
+              </a:lnSpc>
+              <a:spcBef>
+                <a:spcPts val="500"/>
+              </a:spcBef>
+              <a:buFont typeface="Arial" panose="020B0604020202020204" pitchFamily="34" charset="0"/>
+              <a:buChar char="•"/>
+              <a:defRPr sz="2000" kern="1200">
+                <a:solidFill>
+                  <a:schemeClr val="tx1"/>
+                </a:solidFill>
+                <a:latin typeface="+mn-lt"/>
+                <a:ea typeface="+mn-ea"/>
+                <a:cs typeface="+mn-cs"/>
+              </a:defRPr>
+            </a:lvl3pPr>
+            <a:lvl4pPr marL="1600200" indent="-228600" algn="l" defTabSz="914400" rtl="0" eaLnBrk="1" latinLnBrk="0" hangingPunct="1">
+              <a:lnSpc>
+                <a:spcPct val="90000"/>
+              </a:lnSpc>
+              <a:spcBef>
+                <a:spcPts val="500"/>
+              </a:spcBef>
+              <a:buFont typeface="Arial" panose="020B0604020202020204" pitchFamily="34" charset="0"/>
+              <a:buChar char="•"/>
+              <a:defRPr sz="1800" kern="1200">
+                <a:solidFill>
+                  <a:schemeClr val="tx1"/>
+                </a:solidFill>
+                <a:latin typeface="+mn-lt"/>
+                <a:ea typeface="+mn-ea"/>
+                <a:cs typeface="+mn-cs"/>
+              </a:defRPr>
+            </a:lvl4pPr>
+            <a:lvl5pPr marL="2057400" indent="-228600" algn="l" defTabSz="914400" rtl="0" eaLnBrk="1" latinLnBrk="0" hangingPunct="1">
+              <a:lnSpc>
+                <a:spcPct val="90000"/>
+              </a:lnSpc>
+              <a:spcBef>
+                <a:spcPts val="500"/>
+              </a:spcBef>
+              <a:buFont typeface="Arial" panose="020B0604020202020204" pitchFamily="34" charset="0"/>
+              <a:buChar char="•"/>
+              <a:defRPr sz="1800" kern="1200">
+                <a:solidFill>
+                  <a:schemeClr val="tx1"/>
+                </a:solidFill>
+                <a:latin typeface="+mn-lt"/>
+                <a:ea typeface="+mn-ea"/>
+                <a:cs typeface="+mn-cs"/>
+              </a:defRPr>
+            </a:lvl5pPr>
+            <a:lvl6pPr marL="2514600" indent="-228600" algn="l" defTabSz="914400" rtl="0" eaLnBrk="1" latinLnBrk="0" hangingPunct="1">
+              <a:lnSpc>
+                <a:spcPct val="90000"/>
+              </a:lnSpc>
+              <a:spcBef>
+                <a:spcPts val="500"/>
+              </a:spcBef>
+              <a:buFont typeface="Arial" panose="020B0604020202020204" pitchFamily="34" charset="0"/>
+              <a:buChar char="•"/>
+              <a:defRPr sz="1800" kern="1200">
+                <a:solidFill>
+                  <a:schemeClr val="tx1"/>
+                </a:solidFill>
+                <a:latin typeface="+mn-lt"/>
+                <a:ea typeface="+mn-ea"/>
+                <a:cs typeface="+mn-cs"/>
+              </a:defRPr>
+            </a:lvl6pPr>
+            <a:lvl7pPr marL="2971800" indent="-228600" algn="l" defTabSz="914400" rtl="0" eaLnBrk="1" latinLnBrk="0" hangingPunct="1">
+              <a:lnSpc>
+                <a:spcPct val="90000"/>
+              </a:lnSpc>
+              <a:spcBef>
+                <a:spcPts val="500"/>
+              </a:spcBef>
+              <a:buFont typeface="Arial" panose="020B0604020202020204" pitchFamily="34" charset="0"/>
+              <a:buChar char="•"/>
+              <a:defRPr sz="1800" kern="1200">
+                <a:solidFill>
+                  <a:schemeClr val="tx1"/>
+                </a:solidFill>
+                <a:latin typeface="+mn-lt"/>
+                <a:ea typeface="+mn-ea"/>
+                <a:cs typeface="+mn-cs"/>
+              </a:defRPr>
+            </a:lvl7pPr>
+            <a:lvl8pPr marL="3429000" indent="-228600" algn="l" defTabSz="914400" rtl="0" eaLnBrk="1" latinLnBrk="0" hangingPunct="1">
+              <a:lnSpc>
+                <a:spcPct val="90000"/>
+              </a:lnSpc>
+              <a:spcBef>
+                <a:spcPts val="500"/>
+              </a:spcBef>
+              <a:buFont typeface="Arial" panose="020B0604020202020204" pitchFamily="34" charset="0"/>
+              <a:buChar char="•"/>
+              <a:defRPr sz="1800" kern="1200">
+                <a:solidFill>
+                  <a:schemeClr val="tx1"/>
+                </a:solidFill>
+                <a:latin typeface="+mn-lt"/>
+                <a:ea typeface="+mn-ea"/>
+                <a:cs typeface="+mn-cs"/>
+              </a:defRPr>
+            </a:lvl8pPr>
+            <a:lvl9pPr marL="3886200" indent="-228600" algn="l" defTabSz="914400" rtl="0" eaLnBrk="1" latinLnBrk="0" hangingPunct="1">
+              <a:lnSpc>
+                <a:spcPct val="90000"/>
+              </a:lnSpc>
+              <a:spcBef>
+                <a:spcPts val="500"/>
+              </a:spcBef>
+              <a:buFont typeface="Arial" panose="020B0604020202020204" pitchFamily="34" charset="0"/>
+              <a:buChar char="•"/>
+              <a:defRPr sz="1800" kern="1200">
+                <a:solidFill>
+                  <a:schemeClr val="tx1"/>
+                </a:solidFill>
+                <a:latin typeface="+mn-lt"/>
+                <a:ea typeface="+mn-ea"/>
+                <a:cs typeface="+mn-cs"/>
+              </a:defRPr>
+            </a:lvl9pPr>
+          </a:lstStyle>
+          <a:p>
+            <a:pPr marL="0" indent="0">
+              <a:buFont typeface="Arial" panose="020B0604020202020204" pitchFamily="34" charset="0"/>
+              <a:buNone/>
+            </a:pPr>
+            <a:r>
+              <a:rPr lang="nl-NL" sz="2400" dirty="0" smtClean="0">
+                <a:latin typeface="Times New Roman" panose="02020603050405020304" pitchFamily="18" charset="0"/>
+                <a:cs typeface="Times New Roman" panose="02020603050405020304" pitchFamily="18" charset="0"/>
+              </a:rPr>
+              <a:t>Hallo </a:t>
+            </a:r>
+            <a:r>
+              <a:rPr lang="nl-NL" sz="2400" dirty="0" err="1" smtClean="0">
+                <a:latin typeface="Times New Roman" panose="02020603050405020304" pitchFamily="18" charset="0"/>
+                <a:cs typeface="Times New Roman" panose="02020603050405020304" pitchFamily="18" charset="0"/>
+              </a:rPr>
+              <a:t>lhalahdalhdah</a:t>
+            </a:r>
+            <a:r>
+              <a:rPr lang="nl-NL" sz="2400" dirty="0" smtClean="0">
+                <a:latin typeface="Times New Roman" panose="02020603050405020304" pitchFamily="18" charset="0"/>
+                <a:cs typeface="Times New Roman" panose="02020603050405020304" pitchFamily="18" charset="0"/>
+              </a:rPr>
+              <a:t> </a:t>
+            </a:r>
+            <a:r>
+              <a:rPr lang="nl-NL" sz="2400" dirty="0" err="1" smtClean="0">
+                <a:latin typeface="Times New Roman" panose="02020603050405020304" pitchFamily="18" charset="0"/>
+                <a:cs typeface="Times New Roman" panose="02020603050405020304" pitchFamily="18" charset="0"/>
+              </a:rPr>
+              <a:t>lhadsalhd</a:t>
+            </a:r>
+            <a:endParaRPr lang="nl-NL" sz="2400" b="1" dirty="0" smtClean="0">
+              <a:solidFill>
+                <a:srgbClr val="FFC000"/>
+              </a:solidFill>
+              <a:latin typeface="Times New Roman" panose="02020603050405020304" pitchFamily="18" charset="0"/>
+              <a:cs typeface="Times New Roman" panose="02020603050405020304" pitchFamily="18" charset="0"/>
+            </a:endParaRPr>
+          </a:p>
+          <a:p>
+            <a:pPr marL="0" indent="0">
+              <a:buFont typeface="Arial" panose="020B0604020202020204" pitchFamily="34" charset="0"/>
+              <a:buNone/>
+            </a:pPr>
+            <a:endParaRPr lang="nl-NL" sz="2400" dirty="0" smtClean="0">
+              <a:latin typeface="Times New Roman" panose="02020603050405020304" pitchFamily="18" charset="0"/>
+              <a:cs typeface="Times New Roman" panose="02020603050405020304" pitchFamily="18" charset="0"/>
+            </a:endParaRPr>
+          </a:p>
+          <a:p>
+            <a:pPr marL="457200" lvl="1" indent="0">
+              <a:buFont typeface="Arial" panose="020B0604020202020204" pitchFamily="34" charset="0"/>
+              <a:buNone/>
+            </a:pPr>
+            <a:endParaRPr lang="nl-NL" dirty="0" smtClean="0">
+              <a:latin typeface="Times New Roman" panose="02020603050405020304" pitchFamily="18" charset="0"/>
+              <a:cs typeface="Times New Roman" panose="02020603050405020304" pitchFamily="18" charset="0"/>
+            </a:endParaRPr>
+          </a:p>
+          <a:p>
+            <a:pPr marL="457200" lvl="1" indent="0">
+              <a:buFont typeface="Arial" panose="020B0604020202020204" pitchFamily="34" charset="0"/>
+              <a:buNone/>
+            </a:pPr>
+            <a:endParaRPr lang="nl-NL" dirty="0" smtClean="0">
+              <a:latin typeface="Times New Roman" panose="02020603050405020304" pitchFamily="18" charset="0"/>
+              <a:cs typeface="Times New Roman" panose="02020603050405020304" pitchFamily="18" charset="0"/>
+            </a:endParaRPr>
+          </a:p>
+          <a:p>
+            <a:pPr lvl="1"/>
+            <a:endParaRPr lang="nl-NL" dirty="0">
+              <a:latin typeface="Times New Roman" panose="02020603050405020304" pitchFamily="18" charset="0"/>
+              <a:cs typeface="Times New Roman" panose="02020603050405020304" pitchFamily="18" charset="0"/>
+            </a:endParaRPr>
           </a:p>
         </p:txBody>
       </p:sp>
     </p:spTree>
     <p:extLst>
       <p:ext uri="{BB962C8B-B14F-4D97-AF65-F5344CB8AC3E}">
-        <p14:creationId xmlns:p14="http://schemas.microsoft.com/office/powerpoint/2010/main" val="2299815648"/>
+        <p14:creationId xmlns:p14="http://schemas.microsoft.com/office/powerpoint/2010/main" val="1833670900"/>
       </p:ext>
     </p:extLst>
   </p:cSld>
@@ -3536,8 +4140,49 @@
         </p:blipFill>
         <p:spPr bwMode="auto">
           <a:xfrm>
-            <a:off x="3473823" y="409341"/>
+            <a:off x="180305" y="589644"/>
             <a:ext cx="4867835" cy="5817064"/>
+          </a:xfrm>
+          <a:prstGeom prst="rect">
+            <a:avLst/>
+          </a:prstGeom>
+          <a:noFill/>
+          <a:extLst>
+            <a:ext uri="{909E8E84-426E-40DD-AFC4-6F175D3DCCD1}">
+              <a14:hiddenFill xmlns:a14="http://schemas.microsoft.com/office/drawing/2010/main">
+                <a:solidFill>
+                  <a:srgbClr val="FFFFFF"/>
+                </a:solidFill>
+              </a14:hiddenFill>
+            </a:ext>
+          </a:extLst>
+        </p:spPr>
+      </p:pic>
+      <p:pic>
+        <p:nvPicPr>
+          <p:cNvPr id="1026" name="Picture 2" descr="Git Commit"/>
+          <p:cNvPicPr>
+            <a:picLocks noChangeAspect="1" noChangeArrowheads="1"/>
+          </p:cNvPicPr>
+          <p:nvPr/>
+        </p:nvPicPr>
+        <p:blipFill>
+          <a:blip r:embed="rId3">
+            <a:extLst>
+              <a:ext uri="{28A0092B-C50C-407E-A947-70E740481C1C}">
+                <a14:useLocalDpi xmlns:a14="http://schemas.microsoft.com/office/drawing/2010/main" val="0"/>
+              </a:ext>
+            </a:extLst>
+          </a:blip>
+          <a:srcRect/>
+          <a:stretch>
+            <a:fillRect/>
+          </a:stretch>
+        </p:blipFill>
+        <p:spPr bwMode="auto">
+          <a:xfrm>
+            <a:off x="5215565" y="1564711"/>
+            <a:ext cx="6790327" cy="3866929"/>
           </a:xfrm>
           <a:prstGeom prst="rect">
             <a:avLst/>
@@ -4463,14 +5108,35 @@
                 <a:latin typeface="Times New Roman" panose="02020603050405020304" pitchFamily="18" charset="0"/>
                 <a:cs typeface="Times New Roman" panose="02020603050405020304" pitchFamily="18" charset="0"/>
               </a:rPr>
-              <a:t>Een </a:t>
+              <a:t>Een sequentie van mutaties dat het genoom van </a:t>
+            </a:r>
+            <a:r>
+              <a:rPr lang="nl-NL" sz="2400" i="1" dirty="0" smtClean="0">
+                <a:latin typeface="Times New Roman" panose="02020603050405020304" pitchFamily="18" charset="0"/>
+                <a:cs typeface="Times New Roman" panose="02020603050405020304" pitchFamily="18" charset="0"/>
+              </a:rPr>
+              <a:t>D. </a:t>
+            </a:r>
+            <a:r>
+              <a:rPr lang="nl-NL" sz="2400" i="1" dirty="0" err="1" smtClean="0">
+                <a:latin typeface="Times New Roman" panose="02020603050405020304" pitchFamily="18" charset="0"/>
+                <a:cs typeface="Times New Roman" panose="02020603050405020304" pitchFamily="18" charset="0"/>
+              </a:rPr>
+              <a:t>melanogaster</a:t>
+            </a:r>
+            <a:r>
+              <a:rPr lang="nl-NL" sz="2400" i="1" dirty="0" smtClean="0">
+                <a:latin typeface="Times New Roman" panose="02020603050405020304" pitchFamily="18" charset="0"/>
+                <a:cs typeface="Times New Roman" panose="02020603050405020304" pitchFamily="18" charset="0"/>
+              </a:rPr>
+              <a:t> </a:t>
             </a:r>
             <a:r>
               <a:rPr lang="nl-NL" sz="2400" dirty="0" smtClean="0">
                 <a:latin typeface="Times New Roman" panose="02020603050405020304" pitchFamily="18" charset="0"/>
                 <a:cs typeface="Times New Roman" panose="02020603050405020304" pitchFamily="18" charset="0"/>
               </a:rPr>
-              <a:t>sequentie van mutaties dat het genoom van </a:t>
+              <a:t>in </a:t>
             </a:r>
             <a:r>
               <a:rPr lang="nl-NL" sz="2400" i="1" dirty="0" smtClean="0">
@@ -4484,7 +5150,7 @@
                 <a:latin typeface="Times New Roman" panose="02020603050405020304" pitchFamily="18" charset="0"/>
                 <a:cs typeface="Times New Roman" panose="02020603050405020304" pitchFamily="18" charset="0"/>
               </a:rPr>
-              <a:t>melanogaster</a:t>
+              <a:t>miranda</a:t>
             </a:r>
             <a:r>
               <a:rPr lang="nl-NL" sz="2400" i="1" dirty="0" smtClean="0">
@@ -4498,42 +5164,7 @@
                 <a:latin typeface="Times New Roman" panose="02020603050405020304" pitchFamily="18" charset="0"/>
                 <a:cs typeface="Times New Roman" panose="02020603050405020304" pitchFamily="18" charset="0"/>
               </a:rPr>
-              <a:t>in </a:t>
-            </a:r>
-            <a:r>
-              <a:rPr lang="nl-NL" sz="2400" i="1" dirty="0" smtClean="0">
-                <a:latin typeface="Times New Roman" panose="02020603050405020304" pitchFamily="18" charset="0"/>
-                <a:cs typeface="Times New Roman" panose="02020603050405020304" pitchFamily="18" charset="0"/>
-              </a:rPr>
-              <a:t>D. </a:t>
-            </a:r>
-            <a:r>
-              <a:rPr lang="nl-NL" sz="2400" i="1" dirty="0" err="1" smtClean="0">
-                <a:latin typeface="Times New Roman" panose="02020603050405020304" pitchFamily="18" charset="0"/>
-                <a:cs typeface="Times New Roman" panose="02020603050405020304" pitchFamily="18" charset="0"/>
-              </a:rPr>
-              <a:t>miranda</a:t>
-            </a:r>
-            <a:r>
-              <a:rPr lang="nl-NL" sz="2400" i="1" dirty="0" smtClean="0">
-                <a:latin typeface="Times New Roman" panose="02020603050405020304" pitchFamily="18" charset="0"/>
-                <a:cs typeface="Times New Roman" panose="02020603050405020304" pitchFamily="18" charset="0"/>
-              </a:rPr>
-              <a:t> </a:t>
-            </a:r>
-            <a:r>
-              <a:rPr lang="nl-NL" sz="2400" dirty="0" smtClean="0">
-                <a:latin typeface="Times New Roman" panose="02020603050405020304" pitchFamily="18" charset="0"/>
-                <a:cs typeface="Times New Roman" panose="02020603050405020304" pitchFamily="18" charset="0"/>
-              </a:rPr>
-              <a:t>kan laten </a:t>
-            </a:r>
-            <a:r>
-              <a:rPr lang="nl-NL" sz="2400" dirty="0" smtClean="0">
-                <a:latin typeface="Times New Roman" panose="02020603050405020304" pitchFamily="18" charset="0"/>
-                <a:cs typeface="Times New Roman" panose="02020603050405020304" pitchFamily="18" charset="0"/>
-              </a:rPr>
-              <a:t>veranderen</a:t>
+              <a:t>kan laten veranderen</a:t>
             </a:r>
           </a:p>
           <a:p>
@@ -4582,10 +5213,6 @@
               </a:rPr>
               <a:t>- Zo een laag mogelijke mutatiescore </a:t>
             </a:r>
-            <a:endParaRPr lang="nl-NL" sz="2400" dirty="0" smtClean="0">
-              <a:latin typeface="Times New Roman" panose="02020603050405020304" pitchFamily="18" charset="0"/>
-              <a:cs typeface="Times New Roman" panose="02020603050405020304" pitchFamily="18" charset="0"/>
-            </a:endParaRPr>
           </a:p>
         </p:txBody>
       </p:sp>
@@ -6373,8 +7000,8 @@
         </p:nvSpPr>
         <p:spPr>
           <a:xfrm>
-            <a:off x="838200" y="1825624"/>
-            <a:ext cx="5498432" cy="4857563"/>
+            <a:off x="695460" y="1580926"/>
+            <a:ext cx="5422006" cy="5102261"/>
           </a:xfrm>
         </p:spPr>
         <p:txBody>
@@ -6386,22 +7013,31 @@
             <a:pPr marL="0" indent="0">
               <a:buNone/>
             </a:pPr>
-            <a:r>
-              <a:rPr lang="nl-NL" sz="2400" dirty="0" err="1" smtClean="0">
+            <a:endParaRPr lang="nl-NL" sz="2000" dirty="0" smtClean="0">
+              <a:latin typeface="Times New Roman" panose="02020603050405020304" pitchFamily="18" charset="0"/>
+              <a:cs typeface="Times New Roman" panose="02020603050405020304" pitchFamily="18" charset="0"/>
+            </a:endParaRPr>
+          </a:p>
+          <a:p>
+            <a:pPr marL="0" indent="0">
+              <a:buNone/>
+            </a:pPr>
+            <a:r>
+              <a:rPr lang="nl-NL" sz="2000" dirty="0" err="1" smtClean="0">
                 <a:latin typeface="Times New Roman" panose="02020603050405020304" pitchFamily="18" charset="0"/>
                 <a:cs typeface="Times New Roman" panose="02020603050405020304" pitchFamily="18" charset="0"/>
               </a:rPr>
               <a:t>Prunen</a:t>
             </a:r>
             <a:r>
-              <a:rPr lang="nl-NL" sz="2400" dirty="0" smtClean="0">
+              <a:rPr lang="nl-NL" sz="2000" dirty="0" smtClean="0">
                 <a:latin typeface="Times New Roman" panose="02020603050405020304" pitchFamily="18" charset="0"/>
                 <a:cs typeface="Times New Roman" panose="02020603050405020304" pitchFamily="18" charset="0"/>
               </a:rPr>
               <a:t> </a:t>
             </a:r>
             <a:r>
-              <a:rPr lang="nl-NL" sz="2400" dirty="0">
+              <a:rPr lang="nl-NL" sz="2000" dirty="0">
                 <a:latin typeface="Times New Roman" panose="02020603050405020304" pitchFamily="18" charset="0"/>
                 <a:cs typeface="Times New Roman" panose="02020603050405020304" pitchFamily="18" charset="0"/>
               </a:rPr>
@@ -6413,18 +7049,122 @@
               <a:buNone/>
             </a:pPr>
             <a:r>
-              <a:rPr lang="nl-NL" sz="2400" dirty="0">
+              <a:rPr lang="nl-NL" sz="2000" dirty="0">
                 <a:latin typeface="Times New Roman" panose="02020603050405020304" pitchFamily="18" charset="0"/>
                 <a:cs typeface="Times New Roman" panose="02020603050405020304" pitchFamily="18" charset="0"/>
               </a:rPr>
               <a:t>	</a:t>
             </a:r>
             <a:r>
-              <a:rPr lang="nl-NL" sz="2400" b="1" dirty="0">
-                <a:latin typeface="Times New Roman" panose="02020603050405020304" pitchFamily="18" charset="0"/>
-                <a:cs typeface="Times New Roman" panose="02020603050405020304" pitchFamily="18" charset="0"/>
-              </a:rPr>
-              <a:t>oplossingen tot en met lengte 11</a:t>
+              <a:rPr lang="nl-NL" sz="2000" b="1" dirty="0">
+                <a:latin typeface="Times New Roman" panose="02020603050405020304" pitchFamily="18" charset="0"/>
+                <a:cs typeface="Times New Roman" panose="02020603050405020304" pitchFamily="18" charset="0"/>
+              </a:rPr>
+              <a:t>oplossingen tot en met lengte </a:t>
+            </a:r>
+            <a:r>
+              <a:rPr lang="nl-NL" sz="2000" b="1" dirty="0" smtClean="0">
+                <a:latin typeface="Times New Roman" panose="02020603050405020304" pitchFamily="18" charset="0"/>
+                <a:cs typeface="Times New Roman" panose="02020603050405020304" pitchFamily="18" charset="0"/>
+              </a:rPr>
+              <a:t>10</a:t>
+            </a:r>
+            <a:endParaRPr lang="nl-NL" sz="2000" b="1" dirty="0">
+              <a:latin typeface="Times New Roman" panose="02020603050405020304" pitchFamily="18" charset="0"/>
+              <a:cs typeface="Times New Roman" panose="02020603050405020304" pitchFamily="18" charset="0"/>
+            </a:endParaRPr>
+          </a:p>
+          <a:p>
+            <a:pPr marL="0" indent="0">
+              <a:buNone/>
+            </a:pPr>
+            <a:endParaRPr lang="nl-NL" sz="2000" dirty="0" smtClean="0">
+              <a:latin typeface="Times New Roman" panose="02020603050405020304" pitchFamily="18" charset="0"/>
+              <a:cs typeface="Times New Roman" panose="02020603050405020304" pitchFamily="18" charset="0"/>
+            </a:endParaRPr>
+          </a:p>
+          <a:p>
+            <a:pPr marL="0" indent="0">
+              <a:buNone/>
+            </a:pPr>
+            <a:r>
+              <a:rPr lang="nl-NL" sz="2000" dirty="0" smtClean="0">
+                <a:latin typeface="Times New Roman" panose="02020603050405020304" pitchFamily="18" charset="0"/>
+                <a:cs typeface="Times New Roman" panose="02020603050405020304" pitchFamily="18" charset="0"/>
+              </a:rPr>
+              <a:t>Archief en </a:t>
+            </a:r>
+            <a:r>
+              <a:rPr lang="nl-NL" sz="2000" dirty="0" err="1" smtClean="0">
+                <a:latin typeface="Times New Roman" panose="02020603050405020304" pitchFamily="18" charset="0"/>
+                <a:cs typeface="Times New Roman" panose="02020603050405020304" pitchFamily="18" charset="0"/>
+              </a:rPr>
+              <a:t>prunen</a:t>
+            </a:r>
+            <a:r>
+              <a:rPr lang="nl-NL" sz="2000" dirty="0" smtClean="0">
+                <a:latin typeface="Times New Roman" panose="02020603050405020304" pitchFamily="18" charset="0"/>
+                <a:cs typeface="Times New Roman" panose="02020603050405020304" pitchFamily="18" charset="0"/>
+              </a:rPr>
+              <a:t> op de bovengrens =</a:t>
+            </a:r>
+          </a:p>
+          <a:p>
+            <a:pPr marL="0" indent="0">
+              <a:buNone/>
+            </a:pPr>
+            <a:r>
+              <a:rPr lang="nl-NL" sz="2000" dirty="0">
+                <a:latin typeface="Times New Roman" panose="02020603050405020304" pitchFamily="18" charset="0"/>
+                <a:cs typeface="Times New Roman" panose="02020603050405020304" pitchFamily="18" charset="0"/>
+              </a:rPr>
+              <a:t>	</a:t>
+            </a:r>
+            <a:r>
+              <a:rPr lang="nl-NL" sz="2000" b="1" dirty="0" smtClean="0">
+                <a:latin typeface="Times New Roman" panose="02020603050405020304" pitchFamily="18" charset="0"/>
+                <a:cs typeface="Times New Roman" panose="02020603050405020304" pitchFamily="18" charset="0"/>
+              </a:rPr>
+              <a:t>oplossingen tot en met lengte </a:t>
+            </a:r>
+            <a:r>
+              <a:rPr lang="nl-NL" sz="2000" b="1" dirty="0" smtClean="0">
+                <a:latin typeface="Times New Roman" panose="02020603050405020304" pitchFamily="18" charset="0"/>
+                <a:cs typeface="Times New Roman" panose="02020603050405020304" pitchFamily="18" charset="0"/>
+              </a:rPr>
+              <a:t>10</a:t>
+            </a:r>
+            <a:endParaRPr lang="nl-NL" sz="2000" b="1" dirty="0" smtClean="0">
+              <a:latin typeface="Times New Roman" panose="02020603050405020304" pitchFamily="18" charset="0"/>
+              <a:cs typeface="Times New Roman" panose="02020603050405020304" pitchFamily="18" charset="0"/>
+            </a:endParaRPr>
+          </a:p>
+          <a:p>
+            <a:pPr marL="0" indent="0">
+              <a:buNone/>
+            </a:pPr>
+            <a:endParaRPr lang="nl-NL" sz="2400" b="1" dirty="0" smtClean="0">
+              <a:latin typeface="Times New Roman" panose="02020603050405020304" pitchFamily="18" charset="0"/>
+              <a:cs typeface="Times New Roman" panose="02020603050405020304" pitchFamily="18" charset="0"/>
+            </a:endParaRPr>
+          </a:p>
+          <a:p>
+            <a:pPr marL="0" indent="0">
+              <a:buNone/>
+            </a:pPr>
+            <a:r>
+              <a:rPr lang="nl-NL" sz="1800" b="1" dirty="0" smtClean="0">
+                <a:latin typeface="Times New Roman" panose="02020603050405020304" pitchFamily="18" charset="0"/>
+                <a:cs typeface="Times New Roman" panose="02020603050405020304" pitchFamily="18" charset="0"/>
+              </a:rPr>
+              <a:t>GEHEUGEN </a:t>
+            </a:r>
+            <a:r>
+              <a:rPr lang="nl-NL" sz="1800" b="1" dirty="0" smtClean="0">
+                <a:latin typeface="Times New Roman" panose="02020603050405020304" pitchFamily="18" charset="0"/>
+                <a:cs typeface="Times New Roman" panose="02020603050405020304" pitchFamily="18" charset="0"/>
+              </a:rPr>
+              <a:t>CAPACITEIT ONVOLDOENDE</a:t>
             </a:r>
           </a:p>
           <a:p>
@@ -6437,105 +7177,6 @@
             </a:endParaRPr>
           </a:p>
           <a:p>
-            <a:pPr marL="0" indent="0">
-              <a:buNone/>
-            </a:pPr>
-            <a:r>
-              <a:rPr lang="nl-NL" sz="2400" dirty="0" smtClean="0">
-                <a:latin typeface="Times New Roman" panose="02020603050405020304" pitchFamily="18" charset="0"/>
-                <a:cs typeface="Times New Roman" panose="02020603050405020304" pitchFamily="18" charset="0"/>
-              </a:rPr>
-              <a:t>Archief en </a:t>
-            </a:r>
-            <a:r>
-              <a:rPr lang="nl-NL" sz="2400" dirty="0" err="1" smtClean="0">
-                <a:latin typeface="Times New Roman" panose="02020603050405020304" pitchFamily="18" charset="0"/>
-                <a:cs typeface="Times New Roman" panose="02020603050405020304" pitchFamily="18" charset="0"/>
-              </a:rPr>
-              <a:t>prunen</a:t>
-            </a:r>
-            <a:r>
-              <a:rPr lang="nl-NL" sz="2400" dirty="0" smtClean="0">
-                <a:latin typeface="Times New Roman" panose="02020603050405020304" pitchFamily="18" charset="0"/>
-                <a:cs typeface="Times New Roman" panose="02020603050405020304" pitchFamily="18" charset="0"/>
-              </a:rPr>
-              <a:t> op de bovengrens =</a:t>
-            </a:r>
-          </a:p>
-          <a:p>
-            <a:pPr marL="0" indent="0">
-              <a:buNone/>
-            </a:pPr>
-            <a:r>
-              <a:rPr lang="nl-NL" sz="2400" dirty="0">
-                <a:latin typeface="Times New Roman" panose="02020603050405020304" pitchFamily="18" charset="0"/>
-                <a:cs typeface="Times New Roman" panose="02020603050405020304" pitchFamily="18" charset="0"/>
-              </a:rPr>
-              <a:t>	</a:t>
-            </a:r>
-            <a:r>
-              <a:rPr lang="nl-NL" sz="2400" b="1" dirty="0" smtClean="0">
-                <a:latin typeface="Times New Roman" panose="02020603050405020304" pitchFamily="18" charset="0"/>
-                <a:cs typeface="Times New Roman" panose="02020603050405020304" pitchFamily="18" charset="0"/>
-              </a:rPr>
-              <a:t>oplossingen tot en met lengte 11</a:t>
-            </a:r>
-          </a:p>
-          <a:p>
-            <a:pPr marL="0" indent="0">
-              <a:buNone/>
-            </a:pPr>
-            <a:endParaRPr lang="nl-NL" sz="2400" b="1" dirty="0" smtClean="0">
-              <a:latin typeface="Times New Roman" panose="02020603050405020304" pitchFamily="18" charset="0"/>
-              <a:cs typeface="Times New Roman" panose="02020603050405020304" pitchFamily="18" charset="0"/>
-            </a:endParaRPr>
-          </a:p>
-          <a:p>
-            <a:pPr marL="0" indent="0">
-              <a:buNone/>
-            </a:pPr>
-            <a:endParaRPr lang="nl-NL" sz="2400" b="1" dirty="0">
-              <a:latin typeface="Times New Roman" panose="02020603050405020304" pitchFamily="18" charset="0"/>
-              <a:cs typeface="Times New Roman" panose="02020603050405020304" pitchFamily="18" charset="0"/>
-            </a:endParaRPr>
-          </a:p>
-          <a:p>
-            <a:pPr marL="0" indent="0">
-              <a:buNone/>
-            </a:pPr>
-            <a:r>
-              <a:rPr lang="nl-NL" sz="2000" b="1" dirty="0" smtClean="0">
-                <a:latin typeface="Times New Roman" panose="02020603050405020304" pitchFamily="18" charset="0"/>
-                <a:cs typeface="Times New Roman" panose="02020603050405020304" pitchFamily="18" charset="0"/>
-              </a:rPr>
-              <a:t>GEHEUGEN CAPACITEIT ONVOLDOENDE</a:t>
-            </a:r>
-          </a:p>
-          <a:p>
-            <a:pPr marL="0" indent="0">
-              <a:buNone/>
-            </a:pPr>
-            <a:r>
-              <a:rPr lang="nl-NL" sz="2400" b="1" dirty="0" smtClean="0">
-                <a:solidFill>
-                  <a:srgbClr val="FFC000"/>
-                </a:solidFill>
-                <a:latin typeface="Times New Roman" panose="02020603050405020304" pitchFamily="18" charset="0"/>
-                <a:cs typeface="Times New Roman" panose="02020603050405020304" pitchFamily="18" charset="0"/>
-              </a:rPr>
-              <a:t>Leander time plaatje toevoegen </a:t>
-            </a:r>
-          </a:p>
-          <a:p>
-            <a:pPr marL="0" indent="0">
-              <a:buNone/>
-            </a:pPr>
-            <a:endParaRPr lang="nl-NL" sz="2400" dirty="0" smtClean="0">
-              <a:latin typeface="Times New Roman" panose="02020603050405020304" pitchFamily="18" charset="0"/>
-              <a:cs typeface="Times New Roman" panose="02020603050405020304" pitchFamily="18" charset="0"/>
-            </a:endParaRPr>
-          </a:p>
-          <a:p>
             <a:pPr marL="457200" lvl="1" indent="0">
               <a:buNone/>
             </a:pPr>
@@ -6572,8 +7213,8 @@
         </p:nvSpPr>
         <p:spPr>
           <a:xfrm>
-            <a:off x="838200" y="365125"/>
-            <a:ext cx="5737412" cy="1325563"/>
+            <a:off x="838199" y="365125"/>
+            <a:ext cx="7378521" cy="1325563"/>
           </a:xfrm>
           <a:prstGeom prst="rect">
             <a:avLst/>
@@ -6714,7 +7355,14 @@
                 <a:latin typeface="Times New Roman" panose="02020603050405020304" pitchFamily="18" charset="0"/>
                 <a:cs typeface="Times New Roman" panose="02020603050405020304" pitchFamily="18" charset="0"/>
               </a:rPr>
-              <a:t>DEPTH FIRST</a:t>
+              <a:t>DEPTH </a:t>
+            </a:r>
+            <a:r>
+              <a:rPr lang="nl-NL" sz="3600" dirty="0" smtClean="0">
+                <a:latin typeface="Times New Roman" panose="02020603050405020304" pitchFamily="18" charset="0"/>
+                <a:cs typeface="Times New Roman" panose="02020603050405020304" pitchFamily="18" charset="0"/>
+              </a:rPr>
+              <a:t>FIRST</a:t>
             </a:r>
             <a:endParaRPr lang="nl-NL" sz="3600" dirty="0">
               <a:latin typeface="Times New Roman" panose="02020603050405020304" pitchFamily="18" charset="0"/>
@@ -7393,7 +8041,7 @@
         <p:spPr>
           <a:xfrm>
             <a:off x="838200" y="1825624"/>
-            <a:ext cx="5498432" cy="4857563"/>
+            <a:ext cx="10456572" cy="4857563"/>
           </a:xfrm>
         </p:spPr>
         <p:txBody>
@@ -7405,6 +8053,13 @@
             <a:pPr marL="457200" lvl="1" indent="0">
               <a:buNone/>
             </a:pPr>
+            <a:r>
+              <a:rPr lang="nl-NL" dirty="0" smtClean="0">
+                <a:latin typeface="Times New Roman" panose="02020603050405020304" pitchFamily="18" charset="0"/>
+                <a:cs typeface="Times New Roman" panose="02020603050405020304" pitchFamily="18" charset="0"/>
+              </a:rPr>
+              <a:t>Plek in de queue afhankelijk van score </a:t>
+            </a:r>
             <a:endParaRPr lang="nl-NL" dirty="0" smtClean="0">
               <a:latin typeface="Times New Roman" panose="02020603050405020304" pitchFamily="18" charset="0"/>
               <a:cs typeface="Times New Roman" panose="02020603050405020304" pitchFamily="18" charset="0"/>

</xml_diff>